<commit_message>
Cleanup, added DANE implementation at MS
</commit_message>
<xml_diff>
--- a/SMEXOP/SMEXOP_V1.0.pptx
+++ b/SMEXOP/SMEXOP_V1.0.pptx
@@ -5,7 +5,7 @@
     <p:sldMasterId id="2147484821" r:id="rId4"/>
   </p:sldMasterIdLst>
   <p:notesMasterIdLst>
-    <p:notesMasterId r:id="rId44"/>
+    <p:notesMasterId r:id="rId45"/>
   </p:notesMasterIdLst>
   <p:sldIdLst>
     <p:sldId id="1758" r:id="rId5"/>
@@ -27,10 +27,10 @@
     <p:sldId id="1985" r:id="rId21"/>
     <p:sldId id="1842" r:id="rId22"/>
     <p:sldId id="1979" r:id="rId23"/>
-    <p:sldId id="1989" r:id="rId24"/>
-    <p:sldId id="1987" r:id="rId25"/>
-    <p:sldId id="1978" r:id="rId26"/>
-    <p:sldId id="1986" r:id="rId27"/>
+    <p:sldId id="1987" r:id="rId24"/>
+    <p:sldId id="1978" r:id="rId25"/>
+    <p:sldId id="1986" r:id="rId26"/>
+    <p:sldId id="1989" r:id="rId27"/>
     <p:sldId id="1980" r:id="rId28"/>
     <p:sldId id="1991" r:id="rId29"/>
     <p:sldId id="1992" r:id="rId30"/>
@@ -47,46 +47,40 @@
     <p:sldId id="1999" r:id="rId41"/>
     <p:sldId id="1983" r:id="rId42"/>
     <p:sldId id="2000" r:id="rId43"/>
+    <p:sldId id="2006" r:id="rId44"/>
   </p:sldIdLst>
   <p:sldSz cx="12436475" cy="6994525"/>
   <p:notesSz cx="6858000" cy="9144000"/>
   <p:embeddedFontLst>
     <p:embeddedFont>
-      <p:font typeface="Calibri" panose="020F0502020204030204" pitchFamily="34" charset="0"/>
-      <p:regular r:id="rId45"/>
-      <p:bold r:id="rId46"/>
-      <p:italic r:id="rId47"/>
-      <p:boldItalic r:id="rId48"/>
-    </p:embeddedFont>
-    <p:embeddedFont>
       <p:font typeface="Consolas" panose="020B0609020204030204" pitchFamily="49" charset="0"/>
-      <p:regular r:id="rId49"/>
-      <p:bold r:id="rId50"/>
-      <p:italic r:id="rId51"/>
-      <p:boldItalic r:id="rId52"/>
+      <p:regular r:id="rId46"/>
+      <p:bold r:id="rId47"/>
+      <p:italic r:id="rId48"/>
+      <p:boldItalic r:id="rId49"/>
     </p:embeddedFont>
     <p:embeddedFont>
       <p:font typeface="Lucida Console" panose="020B0609040504020204" pitchFamily="49" charset="0"/>
-      <p:regular r:id="rId53"/>
+      <p:regular r:id="rId50"/>
     </p:embeddedFont>
     <p:embeddedFont>
       <p:font typeface="Open Sans" panose="020B0606030504020204" pitchFamily="34" charset="0"/>
-      <p:regular r:id="rId54"/>
-      <p:bold r:id="rId55"/>
-      <p:italic r:id="rId56"/>
-      <p:boldItalic r:id="rId57"/>
+      <p:regular r:id="rId51"/>
+      <p:bold r:id="rId52"/>
+      <p:italic r:id="rId53"/>
+      <p:boldItalic r:id="rId54"/>
     </p:embeddedFont>
     <p:embeddedFont>
       <p:font typeface="Segoe UI" panose="020B0502040204020203" pitchFamily="34" charset="0"/>
-      <p:regular r:id="rId58"/>
-      <p:bold r:id="rId59"/>
-      <p:italic r:id="rId60"/>
-      <p:boldItalic r:id="rId61"/>
+      <p:regular r:id="rId55"/>
+      <p:bold r:id="rId56"/>
+      <p:italic r:id="rId57"/>
+      <p:boldItalic r:id="rId58"/>
     </p:embeddedFont>
     <p:embeddedFont>
       <p:font typeface="Segoe UI Semibold" panose="020B0702040204020203" pitchFamily="34" charset="0"/>
-      <p:bold r:id="rId62"/>
-      <p:boldItalic r:id="rId63"/>
+      <p:bold r:id="rId59"/>
+      <p:boldItalic r:id="rId60"/>
     </p:embeddedFont>
   </p:embeddedFontLst>
   <p:defaultTextStyle>
@@ -307,7 +301,7 @@
           <a:p>
             <a:fld id="{4AF1DCFC-0A24-40D5-A007-FBB29F036A66}" type="datetimeFigureOut">
               <a:rPr lang="en-US" smtClean="0"/>
-              <a:t>9/19/2023</a:t>
+              <a:t>1/28/2024</a:t>
             </a:fld>
             <a:endParaRPr lang="en-US" dirty="0"/>
           </a:p>
@@ -465,7 +459,7 @@
           <a:p>
             <a:fld id="{D6F27D07-7781-494F-A97B-35FE753DE488}" type="slidenum">
               <a:rPr lang="en-US" smtClean="0"/>
-              <a:t>‹Nr.›</a:t>
+              <a:t>‹#›</a:t>
             </a:fld>
             <a:endParaRPr lang="en-US" dirty="0"/>
           </a:p>
@@ -14724,7 +14718,7 @@
                 </a:solidFill>
                 <a:effectLst/>
               </a:rPr>
-              <a:t>SPF, DKIM, DMARC, MTA-STS und DANE </a:t>
+              <a:t>SPF, DKIM, DMARC und MTA-STS </a:t>
             </a:r>
             <a:r>
               <a:rPr lang="en-US" b="0" i="0" dirty="0" err="1">
@@ -16028,188 +16022,6 @@
 </file>
 
 <file path=ppt/slides/slide20.xml><?xml version="1.0" encoding="utf-8"?>
-<p:sld xmlns:a="http://schemas.openxmlformats.org/drawingml/2006/main" xmlns:r="http://schemas.openxmlformats.org/officeDocument/2006/relationships" xmlns:p="http://schemas.openxmlformats.org/presentationml/2006/main">
-  <p:cSld>
-    <p:spTree>
-      <p:nvGrpSpPr>
-        <p:cNvPr id="1" name=""/>
-        <p:cNvGrpSpPr/>
-        <p:nvPr/>
-      </p:nvGrpSpPr>
-      <p:grpSpPr>
-        <a:xfrm>
-          <a:off x="0" y="0"/>
-          <a:ext cx="0" cy="0"/>
-          <a:chOff x="0" y="0"/>
-          <a:chExt cx="0" cy="0"/>
-        </a:xfrm>
-      </p:grpSpPr>
-      <p:sp>
-        <p:nvSpPr>
-          <p:cNvPr id="2" name="Title 1">
-            <a:extLst>
-              <a:ext uri="{FF2B5EF4-FFF2-40B4-BE49-F238E27FC236}">
-                <a16:creationId xmlns:a16="http://schemas.microsoft.com/office/drawing/2014/main" id="{0ED65DEA-C249-9710-A73B-CCF7240504BF}"/>
-              </a:ext>
-            </a:extLst>
-          </p:cNvPr>
-          <p:cNvSpPr>
-            <a:spLocks noGrp="1"/>
-          </p:cNvSpPr>
-          <p:nvPr>
-            <p:ph type="title"/>
-          </p:nvPr>
-        </p:nvSpPr>
-        <p:spPr/>
-        <p:txBody>
-          <a:bodyPr/>
-          <a:lstStyle/>
-          <a:p>
-            <a:r>
-              <a:rPr lang="de-DE" dirty="0"/>
-              <a:t>Verschachtelung der SPF Records</a:t>
-            </a:r>
-          </a:p>
-        </p:txBody>
-      </p:sp>
-      <p:sp>
-        <p:nvSpPr>
-          <p:cNvPr id="3" name="Text Placeholder 2">
-            <a:extLst>
-              <a:ext uri="{FF2B5EF4-FFF2-40B4-BE49-F238E27FC236}">
-                <a16:creationId xmlns:a16="http://schemas.microsoft.com/office/drawing/2014/main" id="{57933DC4-85AE-53E4-BF8D-9D76ABA5BFD6}"/>
-              </a:ext>
-            </a:extLst>
-          </p:cNvPr>
-          <p:cNvSpPr>
-            <a:spLocks noGrp="1"/>
-          </p:cNvSpPr>
-          <p:nvPr>
-            <p:ph type="body" sz="quarter" idx="10"/>
-          </p:nvPr>
-        </p:nvSpPr>
-        <p:spPr>
-          <a:xfrm>
-            <a:off x="595915" y="1464075"/>
-            <a:ext cx="11239464" cy="4231671"/>
-          </a:xfrm>
-        </p:spPr>
-        <p:txBody>
-          <a:bodyPr/>
-          <a:lstStyle/>
-          <a:p>
-            <a:r>
-              <a:rPr lang="de-DE" dirty="0"/>
-              <a:t>SPF Records können verschachtelt werden</a:t>
-            </a:r>
-          </a:p>
-          <a:p>
-            <a:pPr lvl="1"/>
-            <a:r>
-              <a:rPr lang="de-DE" dirty="0"/>
-              <a:t>Um die Länge des Records zu verringern</a:t>
-            </a:r>
-          </a:p>
-          <a:p>
-            <a:r>
-              <a:rPr lang="de-DE" dirty="0"/>
-              <a:t>Auslagerung der SPF Records in eine eigene Zone (z.B.: spf.protection.outlook.com)</a:t>
-            </a:r>
-          </a:p>
-          <a:p>
-            <a:r>
-              <a:rPr lang="de-DE" dirty="0"/>
-              <a:t>Erlaubt es, Sender aus anderen Domänen zu autorisieren (Newsletter Versand, etc.)</a:t>
-            </a:r>
-          </a:p>
-          <a:p>
-            <a:r>
-              <a:rPr lang="de-DE" dirty="0"/>
-              <a:t>Verschachtelung bedingt zusätzliche DNS-Abfragen</a:t>
-            </a:r>
-          </a:p>
-          <a:p>
-            <a:pPr lvl="1"/>
-            <a:r>
-              <a:rPr lang="de-DE" dirty="0"/>
-              <a:t>Deshalb maximal 10 Verschachtelungen erlaubt (</a:t>
-            </a:r>
-            <a:r>
-              <a:rPr lang="de-DE" dirty="0" err="1"/>
-              <a:t>PermError</a:t>
-            </a:r>
-            <a:r>
-              <a:rPr lang="de-DE" dirty="0"/>
-              <a:t> bei Überschreitung)</a:t>
-            </a:r>
-          </a:p>
-          <a:p>
-            <a:r>
-              <a:rPr lang="de-DE" dirty="0"/>
-              <a:t>Folgende Keywords bedingen zusätzliche DNS-Abfragen:</a:t>
-            </a:r>
-          </a:p>
-          <a:p>
-            <a:pPr lvl="1"/>
-            <a:r>
-              <a:rPr lang="de-DE" dirty="0"/>
-              <a:t>A</a:t>
-            </a:r>
-          </a:p>
-          <a:p>
-            <a:pPr lvl="1"/>
-            <a:r>
-              <a:rPr lang="de-DE" dirty="0"/>
-              <a:t>MX</a:t>
-            </a:r>
-          </a:p>
-          <a:p>
-            <a:pPr lvl="1"/>
-            <a:r>
-              <a:rPr lang="de-DE" dirty="0"/>
-              <a:t>PTR</a:t>
-            </a:r>
-          </a:p>
-          <a:p>
-            <a:pPr lvl="1"/>
-            <a:r>
-              <a:rPr lang="de-DE" dirty="0"/>
-              <a:t>EXISTS</a:t>
-            </a:r>
-          </a:p>
-          <a:p>
-            <a:pPr lvl="1"/>
-            <a:r>
-              <a:rPr lang="de-DE" dirty="0"/>
-              <a:t>INCLUDE</a:t>
-            </a:r>
-          </a:p>
-          <a:p>
-            <a:pPr lvl="1"/>
-            <a:r>
-              <a:rPr lang="de-DE" dirty="0"/>
-              <a:t>REDIRECT</a:t>
-            </a:r>
-          </a:p>
-        </p:txBody>
-      </p:sp>
-    </p:spTree>
-    <p:extLst>
-      <p:ext uri="{BB962C8B-B14F-4D97-AF65-F5344CB8AC3E}">
-        <p14:creationId xmlns:p14="http://schemas.microsoft.com/office/powerpoint/2010/main" val="415205254"/>
-      </p:ext>
-    </p:extLst>
-  </p:cSld>
-  <p:clrMapOvr>
-    <a:masterClrMapping/>
-  </p:clrMapOvr>
-  <p:transition>
-    <p:fade/>
-  </p:transition>
-</p:sld>
-</file>
-
-<file path=ppt/slides/slide21.xml><?xml version="1.0" encoding="utf-8"?>
 <p:sld xmlns:a="http://schemas.openxmlformats.org/drawingml/2006/main" xmlns:r="http://schemas.openxmlformats.org/officeDocument/2006/relationships" xmlns:p="http://schemas.openxmlformats.org/presentationml/2006/main">
   <p:cSld>
     <p:spTree>
@@ -16941,7 +16753,7 @@
 </p:sld>
 </file>
 
-<file path=ppt/slides/slide22.xml><?xml version="1.0" encoding="utf-8"?>
+<file path=ppt/slides/slide21.xml><?xml version="1.0" encoding="utf-8"?>
 <p:sld xmlns:a="http://schemas.openxmlformats.org/drawingml/2006/main" xmlns:r="http://schemas.openxmlformats.org/officeDocument/2006/relationships" xmlns:p="http://schemas.openxmlformats.org/presentationml/2006/main">
   <p:cSld>
     <p:spTree>
@@ -17336,7 +17148,7 @@
 </p:sld>
 </file>
 
-<file path=ppt/slides/slide23.xml><?xml version="1.0" encoding="utf-8"?>
+<file path=ppt/slides/slide22.xml><?xml version="1.0" encoding="utf-8"?>
 <p:sld xmlns:a="http://schemas.openxmlformats.org/drawingml/2006/main" xmlns:r="http://schemas.openxmlformats.org/officeDocument/2006/relationships" xmlns:p="http://schemas.openxmlformats.org/presentationml/2006/main">
   <p:cSld>
     <p:spTree>
@@ -17430,44 +17242,112 @@
               <a:t>v=spf1 </a:t>
             </a:r>
             <a:r>
+              <a:rPr lang="de-AT" dirty="0" err="1">
+                <a:solidFill>
+                  <a:srgbClr val="339933"/>
+                </a:solidFill>
+              </a:rPr>
+              <a:t>include</a:t>
+            </a:r>
+            <a:r>
+              <a:rPr lang="de-AT" dirty="0">
+                <a:solidFill>
+                  <a:srgbClr val="339933"/>
+                </a:solidFill>
+              </a:rPr>
+              <a:t>:</a:t>
+            </a:r>
+            <a:r>
+              <a:rPr lang="de-AT" dirty="0"/>
+              <a:t>_spf-a.microsoft.com </a:t>
+            </a:r>
+            <a:r>
+              <a:rPr lang="de-AT" dirty="0" err="1">
+                <a:solidFill>
+                  <a:srgbClr val="339933"/>
+                </a:solidFill>
+              </a:rPr>
+              <a:t>include</a:t>
+            </a:r>
+            <a:r>
+              <a:rPr lang="de-AT" dirty="0">
+                <a:solidFill>
+                  <a:srgbClr val="339933"/>
+                </a:solidFill>
+              </a:rPr>
+              <a:t>:</a:t>
+            </a:r>
+            <a:r>
+              <a:rPr lang="de-AT" dirty="0"/>
+              <a:t>_spf-b.microsoft.com </a:t>
+            </a:r>
+            <a:r>
+              <a:rPr lang="de-AT" dirty="0" err="1">
+                <a:solidFill>
+                  <a:srgbClr val="339933"/>
+                </a:solidFill>
+              </a:rPr>
+              <a:t>include</a:t>
+            </a:r>
+            <a:r>
+              <a:rPr lang="de-AT" dirty="0">
+                <a:solidFill>
+                  <a:srgbClr val="339933"/>
+                </a:solidFill>
+              </a:rPr>
+              <a:t>:</a:t>
+            </a:r>
+            <a:r>
+              <a:rPr lang="de-AT" dirty="0"/>
+              <a:t>_spf-c.microsoft.com </a:t>
+            </a:r>
+            <a:r>
+              <a:rPr lang="de-AT" dirty="0" err="1">
+                <a:solidFill>
+                  <a:srgbClr val="339933"/>
+                </a:solidFill>
+              </a:rPr>
+              <a:t>include</a:t>
+            </a:r>
+            <a:r>
+              <a:rPr lang="de-AT" dirty="0">
+                <a:solidFill>
+                  <a:srgbClr val="339933"/>
+                </a:solidFill>
+              </a:rPr>
+              <a:t>:</a:t>
+            </a:r>
+            <a:r>
+              <a:rPr lang="de-AT" dirty="0"/>
+              <a:t>_spf-ssg-a.msft.net </a:t>
+            </a:r>
+            <a:r>
+              <a:rPr lang="de-AT" dirty="0" err="1">
+                <a:solidFill>
+                  <a:srgbClr val="339933"/>
+                </a:solidFill>
+              </a:rPr>
+              <a:t>include:</a:t>
+            </a:r>
+            <a:r>
               <a:rPr lang="de-AT" dirty="0" err="1"/>
-              <a:t>include</a:t>
+              <a:t>spf-a.hotmail.com</a:t>
             </a:r>
             <a:r>
               <a:rPr lang="de-AT" dirty="0"/>
-              <a:t>:_spf-a.microsoft.com </a:t>
-            </a:r>
-            <a:r>
-              <a:rPr lang="de-AT" dirty="0" err="1"/>
-              <a:t>include</a:t>
+              <a:t> </a:t>
+            </a:r>
+            <a:r>
+              <a:rPr lang="de-AT" dirty="0">
+                <a:solidFill>
+                  <a:srgbClr val="339933"/>
+                </a:solidFill>
+              </a:rPr>
+              <a:t>include:</a:t>
             </a:r>
             <a:r>
               <a:rPr lang="de-AT" dirty="0"/>
-              <a:t>:_spf-b.microsoft.com </a:t>
-            </a:r>
-            <a:r>
-              <a:rPr lang="de-AT" dirty="0" err="1"/>
-              <a:t>include</a:t>
-            </a:r>
-            <a:r>
-              <a:rPr lang="de-AT" dirty="0"/>
-              <a:t>:_spf-c.microsoft.com </a:t>
-            </a:r>
-            <a:r>
-              <a:rPr lang="de-AT" dirty="0" err="1"/>
-              <a:t>include</a:t>
-            </a:r>
-            <a:r>
-              <a:rPr lang="de-AT" dirty="0"/>
-              <a:t>:_spf-ssg-a.msft.net </a:t>
-            </a:r>
-            <a:r>
-              <a:rPr lang="de-AT" dirty="0" err="1"/>
-              <a:t>include:spf-a.hotmail.com</a:t>
-            </a:r>
-            <a:r>
-              <a:rPr lang="de-AT" dirty="0"/>
-              <a:t> include:_spf1-meo.microsoft.com </a:t>
+              <a:t>_spf1-meo.microsoft.com </a:t>
             </a:r>
             <a:r>
               <a:rPr lang="de-AT" dirty="0">
@@ -17494,7 +17374,19 @@
           <a:p>
             <a:r>
               <a:rPr lang="de-AT" dirty="0"/>
-              <a:t>v=spf1 redirect=_spf.google.com</a:t>
+              <a:t>v=spf1 </a:t>
+            </a:r>
+            <a:r>
+              <a:rPr lang="de-AT" dirty="0">
+                <a:solidFill>
+                  <a:srgbClr val="339933"/>
+                </a:solidFill>
+              </a:rPr>
+              <a:t>redirect</a:t>
+            </a:r>
+            <a:r>
+              <a:rPr lang="de-AT" dirty="0"/>
+              <a:t>=_spf.google.com</a:t>
             </a:r>
           </a:p>
           <a:p>
@@ -17503,12 +17395,48 @@
               <a:t>v=spf1 </a:t>
             </a:r>
             <a:r>
-              <a:rPr lang="de-AT" dirty="0" err="1"/>
+              <a:rPr lang="de-AT" dirty="0" err="1">
+                <a:solidFill>
+                  <a:srgbClr val="339933"/>
+                </a:solidFill>
+              </a:rPr>
               <a:t>include</a:t>
             </a:r>
             <a:r>
+              <a:rPr lang="de-AT" dirty="0">
+                <a:solidFill>
+                  <a:srgbClr val="339933"/>
+                </a:solidFill>
+              </a:rPr>
+              <a:t>:</a:t>
+            </a:r>
+            <a:r>
               <a:rPr lang="de-AT" dirty="0"/>
-              <a:t>:_netblocks.google.com include:_netblocks2.google.com include:_netblocks3.google.com </a:t>
+              <a:t>_netblocks.google.com </a:t>
+            </a:r>
+            <a:r>
+              <a:rPr lang="de-AT" dirty="0">
+                <a:solidFill>
+                  <a:srgbClr val="339933"/>
+                </a:solidFill>
+              </a:rPr>
+              <a:t>include:</a:t>
+            </a:r>
+            <a:r>
+              <a:rPr lang="de-AT" dirty="0"/>
+              <a:t>_netblocks2.google.com </a:t>
+            </a:r>
+            <a:r>
+              <a:rPr lang="de-AT" dirty="0">
+                <a:solidFill>
+                  <a:srgbClr val="339933"/>
+                </a:solidFill>
+              </a:rPr>
+              <a:t>include:</a:t>
+            </a:r>
+            <a:r>
+              <a:rPr lang="de-AT" dirty="0"/>
+              <a:t>_netblocks3.google.com </a:t>
             </a:r>
             <a:r>
               <a:rPr lang="de-AT" dirty="0">
@@ -17551,7 +17479,79 @@
                   <a:schemeClr val="tx1"/>
                 </a:solidFill>
               </a:rPr>
-              <a:t>v=spf1 mx </a:t>
+              <a:t>v=spf1 </a:t>
+            </a:r>
+            <a:r>
+              <a:rPr lang="de-AT" dirty="0">
+                <a:solidFill>
+                  <a:srgbClr val="339933"/>
+                </a:solidFill>
+              </a:rPr>
+              <a:t>mx</a:t>
+            </a:r>
+            <a:r>
+              <a:rPr lang="de-AT" dirty="0">
+                <a:solidFill>
+                  <a:schemeClr val="tx1"/>
+                </a:solidFill>
+              </a:rPr>
+              <a:t> </a:t>
+            </a:r>
+            <a:r>
+              <a:rPr lang="de-AT" dirty="0" err="1">
+                <a:solidFill>
+                  <a:srgbClr val="339933"/>
+                </a:solidFill>
+              </a:rPr>
+              <a:t>include</a:t>
+            </a:r>
+            <a:r>
+              <a:rPr lang="de-AT" dirty="0">
+                <a:solidFill>
+                  <a:srgbClr val="339933"/>
+                </a:solidFill>
+              </a:rPr>
+              <a:t>:</a:t>
+            </a:r>
+            <a:r>
+              <a:rPr lang="de-AT" dirty="0">
+                <a:solidFill>
+                  <a:schemeClr val="tx1"/>
+                </a:solidFill>
+              </a:rPr>
+              <a:t>_spf.hp.com </a:t>
+            </a:r>
+            <a:r>
+              <a:rPr lang="de-AT" dirty="0" err="1">
+                <a:solidFill>
+                  <a:srgbClr val="339933"/>
+                </a:solidFill>
+              </a:rPr>
+              <a:t>include</a:t>
+            </a:r>
+            <a:r>
+              <a:rPr lang="de-AT" dirty="0">
+                <a:solidFill>
+                  <a:srgbClr val="339933"/>
+                </a:solidFill>
+              </a:rPr>
+              <a:t>:</a:t>
+            </a:r>
+            <a:r>
+              <a:rPr lang="de-AT" dirty="0">
+                <a:solidFill>
+                  <a:schemeClr val="tx1"/>
+                </a:solidFill>
+              </a:rPr>
+              <a:t>_spf.salesforce.com </a:t>
+            </a:r>
+            <a:r>
+              <a:rPr lang="de-AT" dirty="0" err="1">
+                <a:solidFill>
+                  <a:srgbClr val="339933"/>
+                </a:solidFill>
+              </a:rPr>
+              <a:t>include:</a:t>
             </a:r>
             <a:r>
               <a:rPr lang="de-AT" dirty="0" err="1">
@@ -17559,39 +17559,7 @@
                   <a:schemeClr val="tx1"/>
                 </a:solidFill>
               </a:rPr>
-              <a:t>include</a:t>
-            </a:r>
-            <a:r>
-              <a:rPr lang="de-AT" dirty="0">
-                <a:solidFill>
-                  <a:schemeClr val="tx1"/>
-                </a:solidFill>
-              </a:rPr>
-              <a:t>:_spf.hp.com </a:t>
-            </a:r>
-            <a:r>
-              <a:rPr lang="de-AT" dirty="0" err="1">
-                <a:solidFill>
-                  <a:schemeClr val="tx1"/>
-                </a:solidFill>
-              </a:rPr>
-              <a:t>include</a:t>
-            </a:r>
-            <a:r>
-              <a:rPr lang="de-AT" dirty="0">
-                <a:solidFill>
-                  <a:schemeClr val="tx1"/>
-                </a:solidFill>
-              </a:rPr>
-              <a:t>:_spf.salesforce.com </a:t>
-            </a:r>
-            <a:r>
-              <a:rPr lang="de-AT" dirty="0" err="1">
-                <a:solidFill>
-                  <a:schemeClr val="tx1"/>
-                </a:solidFill>
-              </a:rPr>
-              <a:t>include:us</a:t>
+              <a:t>us</a:t>
             </a:r>
             <a:r>
               <a:rPr lang="de-AT" dirty="0">
@@ -17604,10 +17572,18 @@
             <a:r>
               <a:rPr lang="de-AT" dirty="0" err="1">
                 <a:solidFill>
+                  <a:srgbClr val="339933"/>
+                </a:solidFill>
+              </a:rPr>
+              <a:t>include:</a:t>
+            </a:r>
+            <a:r>
+              <a:rPr lang="de-AT" dirty="0" err="1">
+                <a:solidFill>
                   <a:schemeClr val="tx1"/>
                 </a:solidFill>
               </a:rPr>
-              <a:t>include:spf.protection.outlook.com</a:t>
+              <a:t>spf.protection.outlook.com</a:t>
             </a:r>
             <a:r>
               <a:rPr lang="de-AT" dirty="0">
@@ -17620,10 +17596,18 @@
             <a:r>
               <a:rPr lang="de-AT" dirty="0" err="1">
                 <a:solidFill>
+                  <a:srgbClr val="339933"/>
+                </a:solidFill>
+              </a:rPr>
+              <a:t>include:</a:t>
+            </a:r>
+            <a:r>
+              <a:rPr lang="de-AT" dirty="0" err="1">
+                <a:solidFill>
                   <a:schemeClr val="tx1"/>
                 </a:solidFill>
               </a:rPr>
-              <a:t>include:standardregisterSPF.smtp.com</a:t>
+              <a:t>standardregisterSPF.smtp.com</a:t>
             </a:r>
             <a:r>
               <a:rPr lang="de-AT" dirty="0">
@@ -17631,7 +17615,103 @@
                   <a:schemeClr val="tx1"/>
                 </a:solidFill>
               </a:rPr>
-              <a:t> ip4:205.219.85.237 ip4:74.209.251.23 ip4:198.245.88.159 ip4:198.245.88.160 ip4:198.245.88.161 ip4:198.245.88.162 </a:t>
+              <a:t> </a:t>
+            </a:r>
+            <a:r>
+              <a:rPr lang="de-AT" dirty="0">
+                <a:solidFill>
+                  <a:srgbClr val="339933"/>
+                </a:solidFill>
+              </a:rPr>
+              <a:t>ip4:</a:t>
+            </a:r>
+            <a:r>
+              <a:rPr lang="de-AT" dirty="0">
+                <a:solidFill>
+                  <a:schemeClr val="tx1"/>
+                </a:solidFill>
+              </a:rPr>
+              <a:t>205.219.85.237 </a:t>
+            </a:r>
+            <a:r>
+              <a:rPr lang="de-AT" dirty="0">
+                <a:solidFill>
+                  <a:srgbClr val="339933"/>
+                </a:solidFill>
+              </a:rPr>
+              <a:t>ip4:</a:t>
+            </a:r>
+            <a:r>
+              <a:rPr lang="de-AT" dirty="0">
+                <a:solidFill>
+                  <a:schemeClr val="tx1"/>
+                </a:solidFill>
+              </a:rPr>
+              <a:t>74.209.251.23 </a:t>
+            </a:r>
+            <a:r>
+              <a:rPr lang="de-AT" dirty="0">
+                <a:solidFill>
+                  <a:srgbClr val="339933"/>
+                </a:solidFill>
+              </a:rPr>
+              <a:t>ip4:</a:t>
+            </a:r>
+            <a:r>
+              <a:rPr lang="de-AT" dirty="0">
+                <a:solidFill>
+                  <a:schemeClr val="tx1"/>
+                </a:solidFill>
+              </a:rPr>
+              <a:t>198.245.88.159 </a:t>
+            </a:r>
+            <a:r>
+              <a:rPr lang="de-AT" dirty="0">
+                <a:solidFill>
+                  <a:srgbClr val="339933"/>
+                </a:solidFill>
+              </a:rPr>
+              <a:t>ip4:</a:t>
+            </a:r>
+            <a:r>
+              <a:rPr lang="de-AT" dirty="0">
+                <a:solidFill>
+                  <a:schemeClr val="tx1"/>
+                </a:solidFill>
+              </a:rPr>
+              <a:t>198.245.88.160 </a:t>
+            </a:r>
+            <a:r>
+              <a:rPr lang="de-AT" dirty="0">
+                <a:solidFill>
+                  <a:srgbClr val="339933"/>
+                </a:solidFill>
+              </a:rPr>
+              <a:t>ip4:</a:t>
+            </a:r>
+            <a:r>
+              <a:rPr lang="de-AT" dirty="0">
+                <a:solidFill>
+                  <a:schemeClr val="tx1"/>
+                </a:solidFill>
+              </a:rPr>
+              <a:t>198.245.88.161 </a:t>
+            </a:r>
+            <a:r>
+              <a:rPr lang="de-AT" dirty="0">
+                <a:solidFill>
+                  <a:srgbClr val="339933"/>
+                </a:solidFill>
+              </a:rPr>
+              <a:t>ip4:</a:t>
+            </a:r>
+            <a:r>
+              <a:rPr lang="de-AT" dirty="0">
+                <a:solidFill>
+                  <a:schemeClr val="tx1"/>
+                </a:solidFill>
+              </a:rPr>
+              <a:t>198.245.88.162 </a:t>
             </a:r>
             <a:r>
               <a:rPr lang="de-AT" dirty="0">
@@ -17648,6 +17728,188 @@
     <p:extLst>
       <p:ext uri="{BB962C8B-B14F-4D97-AF65-F5344CB8AC3E}">
         <p14:creationId xmlns:p14="http://schemas.microsoft.com/office/powerpoint/2010/main" val="1617690428"/>
+      </p:ext>
+    </p:extLst>
+  </p:cSld>
+  <p:clrMapOvr>
+    <a:masterClrMapping/>
+  </p:clrMapOvr>
+  <p:transition>
+    <p:fade/>
+  </p:transition>
+</p:sld>
+</file>
+
+<file path=ppt/slides/slide23.xml><?xml version="1.0" encoding="utf-8"?>
+<p:sld xmlns:a="http://schemas.openxmlformats.org/drawingml/2006/main" xmlns:r="http://schemas.openxmlformats.org/officeDocument/2006/relationships" xmlns:p="http://schemas.openxmlformats.org/presentationml/2006/main">
+  <p:cSld>
+    <p:spTree>
+      <p:nvGrpSpPr>
+        <p:cNvPr id="1" name=""/>
+        <p:cNvGrpSpPr/>
+        <p:nvPr/>
+      </p:nvGrpSpPr>
+      <p:grpSpPr>
+        <a:xfrm>
+          <a:off x="0" y="0"/>
+          <a:ext cx="0" cy="0"/>
+          <a:chOff x="0" y="0"/>
+          <a:chExt cx="0" cy="0"/>
+        </a:xfrm>
+      </p:grpSpPr>
+      <p:sp>
+        <p:nvSpPr>
+          <p:cNvPr id="2" name="Title 1">
+            <a:extLst>
+              <a:ext uri="{FF2B5EF4-FFF2-40B4-BE49-F238E27FC236}">
+                <a16:creationId xmlns:a16="http://schemas.microsoft.com/office/drawing/2014/main" id="{0ED65DEA-C249-9710-A73B-CCF7240504BF}"/>
+              </a:ext>
+            </a:extLst>
+          </p:cNvPr>
+          <p:cNvSpPr>
+            <a:spLocks noGrp="1"/>
+          </p:cNvSpPr>
+          <p:nvPr>
+            <p:ph type="title"/>
+          </p:nvPr>
+        </p:nvSpPr>
+        <p:spPr/>
+        <p:txBody>
+          <a:bodyPr/>
+          <a:lstStyle/>
+          <a:p>
+            <a:r>
+              <a:rPr lang="de-DE" dirty="0"/>
+              <a:t>Verschachtelung der SPF Records</a:t>
+            </a:r>
+          </a:p>
+        </p:txBody>
+      </p:sp>
+      <p:sp>
+        <p:nvSpPr>
+          <p:cNvPr id="3" name="Text Placeholder 2">
+            <a:extLst>
+              <a:ext uri="{FF2B5EF4-FFF2-40B4-BE49-F238E27FC236}">
+                <a16:creationId xmlns:a16="http://schemas.microsoft.com/office/drawing/2014/main" id="{57933DC4-85AE-53E4-BF8D-9D76ABA5BFD6}"/>
+              </a:ext>
+            </a:extLst>
+          </p:cNvPr>
+          <p:cNvSpPr>
+            <a:spLocks noGrp="1"/>
+          </p:cNvSpPr>
+          <p:nvPr>
+            <p:ph type="body" sz="quarter" idx="10"/>
+          </p:nvPr>
+        </p:nvSpPr>
+        <p:spPr>
+          <a:xfrm>
+            <a:off x="595915" y="1464075"/>
+            <a:ext cx="11239464" cy="4231671"/>
+          </a:xfrm>
+        </p:spPr>
+        <p:txBody>
+          <a:bodyPr/>
+          <a:lstStyle/>
+          <a:p>
+            <a:r>
+              <a:rPr lang="de-DE" dirty="0"/>
+              <a:t>SPF Records können verschachtelt werden</a:t>
+            </a:r>
+          </a:p>
+          <a:p>
+            <a:pPr lvl="1"/>
+            <a:r>
+              <a:rPr lang="de-DE" dirty="0"/>
+              <a:t>Um die Länge des Records zu verringern</a:t>
+            </a:r>
+          </a:p>
+          <a:p>
+            <a:r>
+              <a:rPr lang="de-DE" dirty="0"/>
+              <a:t>Auslagerung der SPF Records in eine eigene Zone (z.B.: spf.protection.outlook.com)</a:t>
+            </a:r>
+          </a:p>
+          <a:p>
+            <a:r>
+              <a:rPr lang="de-DE" dirty="0"/>
+              <a:t>Erlaubt es, Sender aus anderen Domänen zu autorisieren (Newsletter Versand, etc.)</a:t>
+            </a:r>
+          </a:p>
+          <a:p>
+            <a:r>
+              <a:rPr lang="de-DE" dirty="0"/>
+              <a:t>Verschachtelung bedingt zusätzliche DNS-Abfragen</a:t>
+            </a:r>
+          </a:p>
+          <a:p>
+            <a:pPr lvl="1"/>
+            <a:r>
+              <a:rPr lang="de-DE" dirty="0"/>
+              <a:t>Deshalb maximal 10 Verschachtelungen erlaubt (</a:t>
+            </a:r>
+            <a:r>
+              <a:rPr lang="de-DE" dirty="0" err="1"/>
+              <a:t>PermError</a:t>
+            </a:r>
+            <a:r>
+              <a:rPr lang="de-DE" dirty="0"/>
+              <a:t> bei Überschreitung)</a:t>
+            </a:r>
+          </a:p>
+          <a:p>
+            <a:r>
+              <a:rPr lang="de-DE" dirty="0"/>
+              <a:t>Folgende Keywords bedingen zusätzliche DNS-Abfragen:</a:t>
+            </a:r>
+          </a:p>
+          <a:p>
+            <a:pPr lvl="1"/>
+            <a:r>
+              <a:rPr lang="de-DE" dirty="0"/>
+              <a:t>A</a:t>
+            </a:r>
+          </a:p>
+          <a:p>
+            <a:pPr lvl="1"/>
+            <a:r>
+              <a:rPr lang="de-DE" dirty="0"/>
+              <a:t>MX</a:t>
+            </a:r>
+          </a:p>
+          <a:p>
+            <a:pPr lvl="1"/>
+            <a:r>
+              <a:rPr lang="de-DE" dirty="0"/>
+              <a:t>PTR</a:t>
+            </a:r>
+          </a:p>
+          <a:p>
+            <a:pPr lvl="1"/>
+            <a:r>
+              <a:rPr lang="de-DE" dirty="0"/>
+              <a:t>EXISTS</a:t>
+            </a:r>
+          </a:p>
+          <a:p>
+            <a:pPr lvl="1"/>
+            <a:r>
+              <a:rPr lang="de-DE" dirty="0"/>
+              <a:t>INCLUDE</a:t>
+            </a:r>
+          </a:p>
+          <a:p>
+            <a:pPr lvl="1"/>
+            <a:r>
+              <a:rPr lang="de-DE" dirty="0"/>
+              <a:t>REDIRECT</a:t>
+            </a:r>
+          </a:p>
+        </p:txBody>
+      </p:sp>
+    </p:spTree>
+    <p:extLst>
+      <p:ext uri="{BB962C8B-B14F-4D97-AF65-F5344CB8AC3E}">
+        <p14:creationId xmlns:p14="http://schemas.microsoft.com/office/powerpoint/2010/main" val="415205254"/>
       </p:ext>
     </p:extLst>
   </p:cSld>
@@ -17991,7 +18253,23 @@
                   <a:schemeClr val="tx1"/>
                 </a:solidFill>
               </a:rPr>
-              <a:t>myetc.at -&gt; selector1-myetc-at._domainkey.ntxbocgat.onmicrosoft.com</a:t>
+              <a:t>myetc.at </a:t>
+            </a:r>
+            <a:r>
+              <a:rPr lang="de-DE" sz="1800" dirty="0">
+                <a:solidFill>
+                  <a:srgbClr val="C00000"/>
+                </a:solidFill>
+              </a:rPr>
+              <a:t>-&gt;</a:t>
+            </a:r>
+            <a:r>
+              <a:rPr lang="de-DE" sz="1800" dirty="0">
+                <a:solidFill>
+                  <a:schemeClr val="tx1"/>
+                </a:solidFill>
+              </a:rPr>
+              <a:t> selector1-myetc-at._domainkey. myetcat.onmicrosoft.com</a:t>
             </a:r>
           </a:p>
           <a:p>
@@ -18026,7 +18304,23 @@
                   <a:schemeClr val="tx1"/>
                 </a:solidFill>
               </a:rPr>
-              <a:t>myetc.at -&gt; dkim2.mcsv.net</a:t>
+              <a:t>myetc.at </a:t>
+            </a:r>
+            <a:r>
+              <a:rPr lang="de-DE" sz="2000" dirty="0">
+                <a:solidFill>
+                  <a:srgbClr val="C00000"/>
+                </a:solidFill>
+              </a:rPr>
+              <a:t>-&gt;</a:t>
+            </a:r>
+            <a:r>
+              <a:rPr lang="de-DE" sz="2000" dirty="0">
+                <a:solidFill>
+                  <a:schemeClr val="tx1"/>
+                </a:solidFill>
+              </a:rPr>
+              <a:t> dkim2.mcsv.net</a:t>
             </a:r>
           </a:p>
         </p:txBody>
@@ -18149,7 +18443,7 @@
             </a:r>
             <a:r>
               <a:rPr lang="de-DE" dirty="0"/>
-              <a:t> die selbst DKIM beherrschen</a:t>
+              <a:t> die selbst DKIM unterstützen</a:t>
             </a:r>
           </a:p>
           <a:p>
@@ -18712,7 +19006,7 @@
           <p:nvPr>
             <p:extLst>
               <p:ext uri="{D42A27DB-BD31-4B8C-83A1-F6EECF244321}">
-                <p14:modId xmlns:p14="http://schemas.microsoft.com/office/powerpoint/2010/main" val="2414809775"/>
+                <p14:modId xmlns:p14="http://schemas.microsoft.com/office/powerpoint/2010/main" val="1552381041"/>
               </p:ext>
             </p:extLst>
           </p:nvPr>
@@ -18889,7 +19183,7 @@
                       </a:r>
                       <a:r>
                         <a:rPr lang="de-DE" sz="1400" dirty="0"/>
-                        <a:t> der Nachrichten die entsprechend „p“ gefiltert werden</a:t>
+                        <a:t> der Nachrichten die entsprechend der Policy („p“) gefiltert werden</a:t>
                       </a:r>
                     </a:p>
                   </a:txBody>
@@ -19843,7 +20137,7 @@
           <a:p>
             <a:r>
               <a:rPr lang="de-DE" dirty="0"/>
-              <a:t>Seit 10.8.23 befolgt EOP den DMARC DNS </a:t>
+              <a:t>Seit 10.8.2023 befolgt EOP den DMARC DNS </a:t>
             </a:r>
             <a:r>
               <a:rPr lang="de-DE" dirty="0" err="1"/>
@@ -20178,9 +20472,9 @@
         <p:grpSpPr>
           <a:xfrm>
             <a:off x="3324406" y="5294523"/>
-            <a:ext cx="8515117" cy="1600423"/>
+            <a:ext cx="8663378" cy="1600423"/>
             <a:chOff x="3324406" y="5294523"/>
-            <a:chExt cx="8515117" cy="1600423"/>
+            <a:chExt cx="8663378" cy="1600423"/>
           </a:xfrm>
         </p:grpSpPr>
         <p:pic>
@@ -20222,13 +20516,15 @@
                 </a:ext>
               </a:extLst>
             </p:cNvPr>
-            <p:cNvCxnSpPr/>
+            <p:cNvCxnSpPr>
+              <a:cxnSpLocks/>
+            </p:cNvCxnSpPr>
             <p:nvPr/>
           </p:nvCxnSpPr>
           <p:spPr>
             <a:xfrm flipH="1">
               <a:off x="8488392" y="5736566"/>
-              <a:ext cx="1138687" cy="103517"/>
+              <a:ext cx="814965" cy="170458"/>
             </a:xfrm>
             <a:prstGeom prst="straightConnector1">
               <a:avLst/>
@@ -20270,8 +20566,8 @@
           </p:nvSpPr>
           <p:spPr>
             <a:xfrm>
-              <a:off x="9303357" y="5428789"/>
-              <a:ext cx="2536166" cy="615553"/>
+              <a:off x="9368922" y="5527703"/>
+              <a:ext cx="2618862" cy="307777"/>
             </a:xfrm>
             <a:prstGeom prst="rect">
               <a:avLst/>
@@ -21773,7 +22069,7 @@
         <p:spPr>
           <a:xfrm>
             <a:off x="595915" y="1464075"/>
-            <a:ext cx="11239464" cy="3779624"/>
+            <a:ext cx="11239464" cy="4332148"/>
           </a:xfrm>
         </p:spPr>
         <p:txBody>
@@ -21864,6 +22160,16 @@
                 <a:hlinkClick r:id="rId2"/>
               </a:rPr>
               <a:t>https://www.microsoft.com/en-us/microsoft-365/roadmap?filters=Exchange%2CIn%20development</a:t>
+            </a:r>
+            <a:endParaRPr lang="de-AT" dirty="0"/>
+          </a:p>
+          <a:p>
+            <a:pPr lvl="1"/>
+            <a:r>
+              <a:rPr lang="de-AT" dirty="0">
+                <a:hlinkClick r:id="rId3"/>
+              </a:rPr>
+              <a:t>https://techcommunity.microsoft.com/t5/exchange-team-blog/implementing-inbound-smtp-dane-with-dnssec-for-exchange-online/ba-p/3939694</a:t>
             </a:r>
             <a:endParaRPr lang="de-AT" dirty="0"/>
           </a:p>
@@ -21902,7 +22208,7 @@
           <a:p>
             <a:r>
               <a:rPr lang="de-DE" dirty="0">
-                <a:hlinkClick r:id="rId3"/>
+                <a:hlinkClick r:id="rId4"/>
               </a:rPr>
               <a:t>https://learn.microsoft.com/en-us/purview/how-smtp-dane-works#what-are-the-components-of-dane</a:t>
             </a:r>
@@ -22160,6 +22466,408 @@
     <p:extLst>
       <p:ext uri="{BB962C8B-B14F-4D97-AF65-F5344CB8AC3E}">
         <p14:creationId xmlns:p14="http://schemas.microsoft.com/office/powerpoint/2010/main" val="2886627387"/>
+      </p:ext>
+    </p:extLst>
+  </p:cSld>
+  <p:clrMapOvr>
+    <a:masterClrMapping/>
+  </p:clrMapOvr>
+  <p:transition>
+    <p:fade/>
+  </p:transition>
+</p:sld>
+</file>
+
+<file path=ppt/slides/slide40.xml><?xml version="1.0" encoding="utf-8"?>
+<p:sld xmlns:a="http://schemas.openxmlformats.org/drawingml/2006/main" xmlns:r="http://schemas.openxmlformats.org/officeDocument/2006/relationships" xmlns:p="http://schemas.openxmlformats.org/presentationml/2006/main">
+  <p:cSld>
+    <p:spTree>
+      <p:nvGrpSpPr>
+        <p:cNvPr id="1" name=""/>
+        <p:cNvGrpSpPr/>
+        <p:nvPr/>
+      </p:nvGrpSpPr>
+      <p:grpSpPr>
+        <a:xfrm>
+          <a:off x="0" y="0"/>
+          <a:ext cx="0" cy="0"/>
+          <a:chOff x="0" y="0"/>
+          <a:chExt cx="0" cy="0"/>
+        </a:xfrm>
+      </p:grpSpPr>
+      <p:sp>
+        <p:nvSpPr>
+          <p:cNvPr id="2" name="Title 1">
+            <a:extLst>
+              <a:ext uri="{FF2B5EF4-FFF2-40B4-BE49-F238E27FC236}">
+                <a16:creationId xmlns:a16="http://schemas.microsoft.com/office/drawing/2014/main" id="{525A5377-EA0F-DB2A-3805-900B3E606466}"/>
+              </a:ext>
+            </a:extLst>
+          </p:cNvPr>
+          <p:cNvSpPr>
+            <a:spLocks noGrp="1"/>
+          </p:cNvSpPr>
+          <p:nvPr>
+            <p:ph type="title"/>
+          </p:nvPr>
+        </p:nvSpPr>
+        <p:spPr/>
+        <p:txBody>
+          <a:bodyPr/>
+          <a:lstStyle/>
+          <a:p>
+            <a:r>
+              <a:rPr lang="de-DE" dirty="0"/>
+              <a:t>DANE-Implementierung in EOP</a:t>
+            </a:r>
+          </a:p>
+        </p:txBody>
+      </p:sp>
+      <p:sp>
+        <p:nvSpPr>
+          <p:cNvPr id="3" name="Text Placeholder 2">
+            <a:extLst>
+              <a:ext uri="{FF2B5EF4-FFF2-40B4-BE49-F238E27FC236}">
+                <a16:creationId xmlns:a16="http://schemas.microsoft.com/office/drawing/2014/main" id="{854184DC-22C1-4A57-8CCF-D88340E93CB2}"/>
+              </a:ext>
+            </a:extLst>
+          </p:cNvPr>
+          <p:cNvSpPr>
+            <a:spLocks noGrp="1"/>
+          </p:cNvSpPr>
+          <p:nvPr>
+            <p:ph type="body" sz="quarter" idx="10"/>
+          </p:nvPr>
+        </p:nvSpPr>
+        <p:spPr>
+          <a:xfrm>
+            <a:off x="595915" y="1464075"/>
+            <a:ext cx="11239464" cy="4771627"/>
+          </a:xfrm>
+        </p:spPr>
+        <p:txBody>
+          <a:bodyPr/>
+          <a:lstStyle/>
+          <a:p>
+            <a:r>
+              <a:rPr lang="de-DE" dirty="0"/>
+              <a:t>Beding Umstellung auf neue Zieldomain </a:t>
+            </a:r>
+            <a:r>
+              <a:rPr lang="de-DE" b="1" dirty="0"/>
+              <a:t>„</a:t>
+            </a:r>
+            <a:r>
+              <a:rPr lang="de-DE" b="1" dirty="0" err="1"/>
+              <a:t>mx.microsoft</a:t>
+            </a:r>
+            <a:r>
+              <a:rPr lang="de-DE" b="1" dirty="0"/>
+              <a:t>“</a:t>
+            </a:r>
+            <a:r>
+              <a:rPr lang="de-DE" dirty="0"/>
+              <a:t> im MX </a:t>
+            </a:r>
+            <a:r>
+              <a:rPr lang="de-DE" dirty="0" err="1"/>
+              <a:t>Record</a:t>
+            </a:r>
+            <a:r>
+              <a:rPr lang="de-DE" dirty="0"/>
+              <a:t> (Unterstützt DNSSEC)</a:t>
+            </a:r>
+          </a:p>
+          <a:p>
+            <a:r>
+              <a:rPr lang="de-DE" dirty="0"/>
+              <a:t>Altes Format für MX-Ziel:</a:t>
+            </a:r>
+          </a:p>
+          <a:p>
+            <a:endParaRPr lang="de-DE" dirty="0"/>
+          </a:p>
+          <a:p>
+            <a:r>
+              <a:rPr lang="de-DE" dirty="0"/>
+              <a:t>Neues Format für MX-Ziel: </a:t>
+            </a:r>
+          </a:p>
+          <a:p>
+            <a:endParaRPr lang="de-DE" dirty="0">
+              <a:solidFill>
+                <a:schemeClr val="tx1"/>
+              </a:solidFill>
+            </a:endParaRPr>
+          </a:p>
+          <a:p>
+            <a:endParaRPr lang="de-DE" dirty="0">
+              <a:solidFill>
+                <a:schemeClr val="tx1"/>
+              </a:solidFill>
+            </a:endParaRPr>
+          </a:p>
+          <a:p>
+            <a:r>
+              <a:rPr lang="de-DE" dirty="0">
+                <a:solidFill>
+                  <a:schemeClr val="tx1"/>
+                </a:solidFill>
+              </a:rPr>
+              <a:t>Graph API zur Abfrage der DNS Records:</a:t>
+            </a:r>
+          </a:p>
+          <a:p>
+            <a:r>
+              <a:rPr lang="de-DE" dirty="0">
+                <a:hlinkClick r:id="rId2"/>
+              </a:rPr>
+              <a:t>https://learn.microsoft.com/graph/api/domain-list-serviceconfigurationrecords?view=graph-rest-1.0&amp;tabs=http</a:t>
+            </a:r>
+            <a:endParaRPr lang="de-DE" dirty="0"/>
+          </a:p>
+          <a:p>
+            <a:endParaRPr lang="de-DE" b="1" dirty="0">
+              <a:solidFill>
+                <a:schemeClr val="tx1"/>
+              </a:solidFill>
+            </a:endParaRPr>
+          </a:p>
+          <a:p>
+            <a:r>
+              <a:rPr lang="de-DE" b="1" dirty="0">
+                <a:solidFill>
+                  <a:schemeClr val="tx1"/>
+                </a:solidFill>
+              </a:rPr>
+              <a:t>Timeline für Umstellung:</a:t>
+            </a:r>
+          </a:p>
+          <a:p>
+            <a:r>
+              <a:rPr lang="de-DE" dirty="0"/>
+              <a:t>03/2024: Public Preview mit Opt-In Möglichkeit</a:t>
+            </a:r>
+          </a:p>
+          <a:p>
+            <a:r>
+              <a:rPr lang="de-DE" dirty="0"/>
+              <a:t>07-12/2024 : General Availability und sukzessive Umstellung aller Tenants</a:t>
+            </a:r>
+          </a:p>
+        </p:txBody>
+      </p:sp>
+      <p:sp>
+        <p:nvSpPr>
+          <p:cNvPr id="5" name="TextBox 4">
+            <a:extLst>
+              <a:ext uri="{FF2B5EF4-FFF2-40B4-BE49-F238E27FC236}">
+                <a16:creationId xmlns:a16="http://schemas.microsoft.com/office/drawing/2014/main" id="{BFF07E57-D03D-B37E-F1A3-DFF39446AB0E}"/>
+              </a:ext>
+            </a:extLst>
+          </p:cNvPr>
+          <p:cNvSpPr txBox="1"/>
+          <p:nvPr/>
+        </p:nvSpPr>
+        <p:spPr>
+          <a:xfrm>
+            <a:off x="3968496" y="1794643"/>
+            <a:ext cx="5148072" cy="369332"/>
+          </a:xfrm>
+          <a:prstGeom prst="rect">
+            <a:avLst/>
+          </a:prstGeom>
+          <a:noFill/>
+        </p:spPr>
+        <p:txBody>
+          <a:bodyPr wrap="square" lIns="0" tIns="0" rIns="0" bIns="0" rtlCol="0">
+            <a:spAutoFit/>
+          </a:bodyPr>
+          <a:lstStyle/>
+          <a:p>
+            <a:r>
+              <a:rPr lang="de-DE" sz="2400" dirty="0"/>
+              <a:t>myetc-at.</a:t>
+            </a:r>
+            <a:r>
+              <a:rPr lang="de-DE" sz="2400" dirty="0">
+                <a:solidFill>
+                  <a:srgbClr val="339933"/>
+                </a:solidFill>
+              </a:rPr>
+              <a:t>mail.protection.outlook.com</a:t>
+            </a:r>
+          </a:p>
+        </p:txBody>
+      </p:sp>
+      <p:grpSp>
+        <p:nvGrpSpPr>
+          <p:cNvPr id="9" name="Group 8">
+            <a:extLst>
+              <a:ext uri="{FF2B5EF4-FFF2-40B4-BE49-F238E27FC236}">
+                <a16:creationId xmlns:a16="http://schemas.microsoft.com/office/drawing/2014/main" id="{9242F1D0-6B35-16C8-A3C5-1B14B1CFDE00}"/>
+              </a:ext>
+            </a:extLst>
+          </p:cNvPr>
+          <p:cNvGrpSpPr/>
+          <p:nvPr/>
+        </p:nvGrpSpPr>
+        <p:grpSpPr>
+          <a:xfrm>
+            <a:off x="3968496" y="2528545"/>
+            <a:ext cx="4359415" cy="840708"/>
+            <a:chOff x="3968496" y="2939026"/>
+            <a:chExt cx="4359415" cy="840708"/>
+          </a:xfrm>
+        </p:grpSpPr>
+        <p:sp>
+          <p:nvSpPr>
+            <p:cNvPr id="4" name="TextBox 3">
+              <a:extLst>
+                <a:ext uri="{FF2B5EF4-FFF2-40B4-BE49-F238E27FC236}">
+                  <a16:creationId xmlns:a16="http://schemas.microsoft.com/office/drawing/2014/main" id="{7247C7A8-E26E-3464-DB7E-68B2DDE4D774}"/>
+                </a:ext>
+              </a:extLst>
+            </p:cNvPr>
+            <p:cNvSpPr txBox="1"/>
+            <p:nvPr/>
+          </p:nvSpPr>
+          <p:spPr>
+            <a:xfrm>
+              <a:off x="3968496" y="2939026"/>
+              <a:ext cx="4098786" cy="369332"/>
+            </a:xfrm>
+            <a:prstGeom prst="rect">
+              <a:avLst/>
+            </a:prstGeom>
+            <a:noFill/>
+          </p:spPr>
+          <p:txBody>
+            <a:bodyPr wrap="square" lIns="0" tIns="0" rIns="0" bIns="0" rtlCol="0">
+              <a:spAutoFit/>
+            </a:bodyPr>
+            <a:lstStyle/>
+            <a:p>
+              <a:r>
+                <a:rPr lang="de-DE" sz="2400" dirty="0" err="1"/>
+                <a:t>myetc-at.</a:t>
+              </a:r>
+              <a:r>
+                <a:rPr lang="de-DE" sz="2400" dirty="0" err="1">
+                  <a:solidFill>
+                    <a:srgbClr val="FF0000"/>
+                  </a:solidFill>
+                </a:rPr>
+                <a:t>abc-yz</a:t>
+              </a:r>
+              <a:r>
+                <a:rPr lang="de-DE" sz="2400" dirty="0" err="1"/>
+                <a:t>.</a:t>
+              </a:r>
+              <a:r>
+                <a:rPr lang="de-DE" sz="2400" dirty="0" err="1">
+                  <a:solidFill>
+                    <a:srgbClr val="339933"/>
+                  </a:solidFill>
+                </a:rPr>
+                <a:t>mx.microsoft</a:t>
+              </a:r>
+              <a:endParaRPr lang="de-DE" sz="2400" dirty="0">
+                <a:solidFill>
+                  <a:srgbClr val="339933"/>
+                </a:solidFill>
+              </a:endParaRPr>
+            </a:p>
+          </p:txBody>
+        </p:sp>
+        <p:sp>
+          <p:nvSpPr>
+            <p:cNvPr id="6" name="TextBox 5">
+              <a:extLst>
+                <a:ext uri="{FF2B5EF4-FFF2-40B4-BE49-F238E27FC236}">
+                  <a16:creationId xmlns:a16="http://schemas.microsoft.com/office/drawing/2014/main" id="{81831FF0-4C1A-AAA1-E916-D7A744EC57EB}"/>
+                </a:ext>
+              </a:extLst>
+            </p:cNvPr>
+            <p:cNvSpPr txBox="1"/>
+            <p:nvPr/>
+          </p:nvSpPr>
+          <p:spPr>
+            <a:xfrm>
+              <a:off x="6215647" y="3471957"/>
+              <a:ext cx="2112264" cy="307777"/>
+            </a:xfrm>
+            <a:prstGeom prst="rect">
+              <a:avLst/>
+            </a:prstGeom>
+            <a:noFill/>
+          </p:spPr>
+          <p:txBody>
+            <a:bodyPr wrap="square" lIns="0" tIns="0" rIns="0" bIns="0" rtlCol="0">
+              <a:spAutoFit/>
+            </a:bodyPr>
+            <a:lstStyle/>
+            <a:p>
+              <a:pPr algn="l"/>
+              <a:r>
+                <a:rPr lang="de-DE" sz="2000" dirty="0">
+                  <a:solidFill>
+                    <a:srgbClr val="FF0000"/>
+                  </a:solidFill>
+                </a:rPr>
+                <a:t>Random Identifier</a:t>
+              </a:r>
+            </a:p>
+          </p:txBody>
+        </p:sp>
+        <p:cxnSp>
+          <p:nvCxnSpPr>
+            <p:cNvPr id="8" name="Straight Arrow Connector 7">
+              <a:extLst>
+                <a:ext uri="{FF2B5EF4-FFF2-40B4-BE49-F238E27FC236}">
+                  <a16:creationId xmlns:a16="http://schemas.microsoft.com/office/drawing/2014/main" id="{1C08AE13-C8FF-A795-3DA2-E060F316D137}"/>
+                </a:ext>
+              </a:extLst>
+            </p:cNvPr>
+            <p:cNvCxnSpPr/>
+            <p:nvPr/>
+          </p:nvCxnSpPr>
+          <p:spPr>
+            <a:xfrm flipH="1" flipV="1">
+              <a:off x="5742432" y="3308358"/>
+              <a:ext cx="365760" cy="312666"/>
+            </a:xfrm>
+            <a:prstGeom prst="straightConnector1">
+              <a:avLst/>
+            </a:prstGeom>
+            <a:ln>
+              <a:solidFill>
+                <a:srgbClr val="FF0000"/>
+              </a:solidFill>
+              <a:headEnd type="none" w="lg" len="med"/>
+              <a:tailEnd type="triangle"/>
+            </a:ln>
+          </p:spPr>
+          <p:style>
+            <a:lnRef idx="1">
+              <a:schemeClr val="accent1"/>
+            </a:lnRef>
+            <a:fillRef idx="0">
+              <a:schemeClr val="accent1"/>
+            </a:fillRef>
+            <a:effectRef idx="0">
+              <a:schemeClr val="accent1"/>
+            </a:effectRef>
+            <a:fontRef idx="minor">
+              <a:schemeClr val="tx1"/>
+            </a:fontRef>
+          </p:style>
+        </p:cxnSp>
+      </p:grpSp>
+    </p:spTree>
+    <p:extLst>
+      <p:ext uri="{BB962C8B-B14F-4D97-AF65-F5344CB8AC3E}">
+        <p14:creationId xmlns:p14="http://schemas.microsoft.com/office/powerpoint/2010/main" val="1252773324"/>
       </p:ext>
     </p:extLst>
   </p:cSld>
@@ -23691,18 +24399,6 @@
 </file>
 
 <file path=customXml/item2.xml><?xml version="1.0" encoding="utf-8"?>
-<p:properties xmlns:p="http://schemas.microsoft.com/office/2006/metadata/properties" xmlns:xsi="http://www.w3.org/2001/XMLSchema-instance" xmlns:pc="http://schemas.microsoft.com/office/infopath/2007/PartnerControls">
-  <documentManagement>
-    <MediaServiceKeyPoints xmlns="6e26bd3e-26a1-49ef-a711-f93878600d1b" xsi:nil="true"/>
-    <lcf76f155ced4ddcb4097134ff3c332f xmlns="6e26bd3e-26a1-49ef-a711-f93878600d1b">
-      <Terms xmlns="http://schemas.microsoft.com/office/infopath/2007/PartnerControls"/>
-    </lcf76f155ced4ddcb4097134ff3c332f>
-    <TaxCatchAll xmlns="3b7c1a63-589f-43fc-8fe7-5d1c1c7abab8" xsi:nil="true"/>
-  </documentManagement>
-</p:properties>
-</file>
-
-<file path=customXml/item3.xml><?xml version="1.0" encoding="utf-8"?>
 <ct:contentTypeSchema xmlns:ct="http://schemas.microsoft.com/office/2006/metadata/contentType" xmlns:ma="http://schemas.microsoft.com/office/2006/metadata/properties/metaAttributes" ct:_="" ma:_="" ma:contentTypeName="Dokument" ma:contentTypeID="0x010100ED6F75BC7090174AA980D673A413155B" ma:contentTypeVersion="17" ma:contentTypeDescription="Ein neues Dokument erstellen." ma:contentTypeScope="" ma:versionID="d79b8df0974a88a32e0e6d1a937553f8">
   <xsd:schema xmlns:xsd="http://www.w3.org/2001/XMLSchema" xmlns:xs="http://www.w3.org/2001/XMLSchema" xmlns:p="http://schemas.microsoft.com/office/2006/metadata/properties" xmlns:ns2="6e26bd3e-26a1-49ef-a711-f93878600d1b" xmlns:ns3="3b7c1a63-589f-43fc-8fe7-5d1c1c7abab8" targetNamespace="http://schemas.microsoft.com/office/2006/metadata/properties" ma:root="true" ma:fieldsID="607ef667033e2fcc1d49a25f9c3e70d4" ns2:_="" ns3:_="">
     <xsd:import namespace="6e26bd3e-26a1-49ef-a711-f93878600d1b"/>
@@ -23945,6 +24641,18 @@
 </ct:contentTypeSchema>
 </file>
 
+<file path=customXml/item3.xml><?xml version="1.0" encoding="utf-8"?>
+<p:properties xmlns:p="http://schemas.microsoft.com/office/2006/metadata/properties" xmlns:xsi="http://www.w3.org/2001/XMLSchema-instance" xmlns:pc="http://schemas.microsoft.com/office/infopath/2007/PartnerControls">
+  <documentManagement>
+    <MediaServiceKeyPoints xmlns="6e26bd3e-26a1-49ef-a711-f93878600d1b" xsi:nil="true"/>
+    <lcf76f155ced4ddcb4097134ff3c332f xmlns="6e26bd3e-26a1-49ef-a711-f93878600d1b">
+      <Terms xmlns="http://schemas.microsoft.com/office/infopath/2007/PartnerControls"/>
+    </lcf76f155ced4ddcb4097134ff3c332f>
+    <TaxCatchAll xmlns="3b7c1a63-589f-43fc-8fe7-5d1c1c7abab8" xsi:nil="true"/>
+  </documentManagement>
+</p:properties>
+</file>
+
 <file path=customXml/itemProps1.xml><?xml version="1.0" encoding="utf-8"?>
 <ds:datastoreItem xmlns:ds="http://schemas.openxmlformats.org/officeDocument/2006/customXml" ds:itemID="{B763F203-3722-4D22-B31D-AA35DA0DC141}">
   <ds:schemaRefs>
@@ -23954,6 +24662,25 @@
 </file>
 
 <file path=customXml/itemProps2.xml><?xml version="1.0" encoding="utf-8"?>
+<ds:datastoreItem xmlns:ds="http://schemas.openxmlformats.org/officeDocument/2006/customXml" ds:itemID="{FCA9AEA5-5559-4622-9EEA-EA3011963D02}">
+  <ds:schemaRefs>
+    <ds:schemaRef ds:uri="http://schemas.microsoft.com/office/2006/metadata/contentType"/>
+    <ds:schemaRef ds:uri="http://schemas.microsoft.com/office/2006/metadata/properties/metaAttributes"/>
+    <ds:schemaRef ds:uri="http://www.w3.org/2001/XMLSchema"/>
+    <ds:schemaRef ds:uri="http://schemas.microsoft.com/office/2006/metadata/properties"/>
+    <ds:schemaRef ds:uri="6e26bd3e-26a1-49ef-a711-f93878600d1b"/>
+    <ds:schemaRef ds:uri="3b7c1a63-589f-43fc-8fe7-5d1c1c7abab8"/>
+    <ds:schemaRef ds:uri="http://schemas.microsoft.com/office/2006/documentManagement/types"/>
+    <ds:schemaRef ds:uri="http://schemas.microsoft.com/office/infopath/2007/PartnerControls"/>
+    <ds:schemaRef ds:uri="http://schemas.openxmlformats.org/package/2006/metadata/core-properties"/>
+    <ds:schemaRef ds:uri="http://purl.org/dc/elements/1.1/"/>
+    <ds:schemaRef ds:uri="http://purl.org/dc/terms/"/>
+    <ds:schemaRef ds:uri="http://schemas.microsoft.com/internal/obd"/>
+  </ds:schemaRefs>
+</ds:datastoreItem>
+</file>
+
+<file path=customXml/itemProps3.xml><?xml version="1.0" encoding="utf-8"?>
 <ds:datastoreItem xmlns:ds="http://schemas.openxmlformats.org/officeDocument/2006/customXml" ds:itemID="{95D36474-37E5-4DEF-97CF-193944B34282}">
   <ds:schemaRefs>
     <ds:schemaRef ds:uri="http://schemas.openxmlformats.org/package/2006/metadata/core-properties"/>
@@ -23971,23 +24698,4 @@
     <ds:schemaRef ds:uri="3b7c1a63-589f-43fc-8fe7-5d1c1c7abab8"/>
   </ds:schemaRefs>
 </ds:datastoreItem>
-</file>
-
-<file path=customXml/itemProps3.xml><?xml version="1.0" encoding="utf-8"?>
-<ds:datastoreItem xmlns:ds="http://schemas.openxmlformats.org/officeDocument/2006/customXml" ds:itemID="{FCA9AEA5-5559-4622-9EEA-EA3011963D02}">
-  <ds:schemaRefs>
-    <ds:schemaRef ds:uri="http://schemas.microsoft.com/office/2006/metadata/contentType"/>
-    <ds:schemaRef ds:uri="http://schemas.microsoft.com/office/2006/metadata/properties/metaAttributes"/>
-    <ds:schemaRef ds:uri="http://www.w3.org/2001/XMLSchema"/>
-    <ds:schemaRef ds:uri="http://schemas.microsoft.com/office/2006/metadata/properties"/>
-    <ds:schemaRef ds:uri="6e26bd3e-26a1-49ef-a711-f93878600d1b"/>
-    <ds:schemaRef ds:uri="3b7c1a63-589f-43fc-8fe7-5d1c1c7abab8"/>
-    <ds:schemaRef ds:uri="http://schemas.microsoft.com/office/2006/documentManagement/types"/>
-    <ds:schemaRef ds:uri="http://schemas.microsoft.com/office/infopath/2007/PartnerControls"/>
-    <ds:schemaRef ds:uri="http://schemas.openxmlformats.org/package/2006/metadata/core-properties"/>
-    <ds:schemaRef ds:uri="http://purl.org/dc/elements/1.1/"/>
-    <ds:schemaRef ds:uri="http://purl.org/dc/terms/"/>
-    <ds:schemaRef ds:uri="http://schemas.microsoft.com/internal/obd"/>
-  </ds:schemaRefs>
-</ds:datastoreItem>
 </file>
</xml_diff>

<commit_message>
SPF Macros and BIMI
</commit_message>
<xml_diff>
--- a/SMEXOP/SMEXOP_V1.0.pptx
+++ b/SMEXOP/SMEXOP_V1.0.pptx
@@ -5,7 +5,7 @@
     <p:sldMasterId id="2147484821" r:id="rId4"/>
   </p:sldMasterIdLst>
   <p:notesMasterIdLst>
-    <p:notesMasterId r:id="rId45"/>
+    <p:notesMasterId r:id="rId48"/>
   </p:notesMasterIdLst>
   <p:sldIdLst>
     <p:sldId id="1758" r:id="rId5"/>
@@ -31,56 +31,59 @@
     <p:sldId id="1978" r:id="rId25"/>
     <p:sldId id="1986" r:id="rId26"/>
     <p:sldId id="1989" r:id="rId27"/>
-    <p:sldId id="1980" r:id="rId28"/>
-    <p:sldId id="1991" r:id="rId29"/>
-    <p:sldId id="1992" r:id="rId30"/>
-    <p:sldId id="1993" r:id="rId31"/>
-    <p:sldId id="1981" r:id="rId32"/>
-    <p:sldId id="2004" r:id="rId33"/>
-    <p:sldId id="2003" r:id="rId34"/>
-    <p:sldId id="1997" r:id="rId35"/>
-    <p:sldId id="1995" r:id="rId36"/>
-    <p:sldId id="1984" r:id="rId37"/>
-    <p:sldId id="2005" r:id="rId38"/>
-    <p:sldId id="1998" r:id="rId39"/>
-    <p:sldId id="1982" r:id="rId40"/>
-    <p:sldId id="1999" r:id="rId41"/>
-    <p:sldId id="1983" r:id="rId42"/>
-    <p:sldId id="2000" r:id="rId43"/>
-    <p:sldId id="2006" r:id="rId44"/>
+    <p:sldId id="2008" r:id="rId28"/>
+    <p:sldId id="2009" r:id="rId29"/>
+    <p:sldId id="1980" r:id="rId30"/>
+    <p:sldId id="1991" r:id="rId31"/>
+    <p:sldId id="1992" r:id="rId32"/>
+    <p:sldId id="1993" r:id="rId33"/>
+    <p:sldId id="1981" r:id="rId34"/>
+    <p:sldId id="2004" r:id="rId35"/>
+    <p:sldId id="2003" r:id="rId36"/>
+    <p:sldId id="1997" r:id="rId37"/>
+    <p:sldId id="1995" r:id="rId38"/>
+    <p:sldId id="1984" r:id="rId39"/>
+    <p:sldId id="2005" r:id="rId40"/>
+    <p:sldId id="1998" r:id="rId41"/>
+    <p:sldId id="1982" r:id="rId42"/>
+    <p:sldId id="1999" r:id="rId43"/>
+    <p:sldId id="1983" r:id="rId44"/>
+    <p:sldId id="2000" r:id="rId45"/>
+    <p:sldId id="2006" r:id="rId46"/>
+    <p:sldId id="2007" r:id="rId47"/>
   </p:sldIdLst>
   <p:sldSz cx="12436475" cy="6994525"/>
   <p:notesSz cx="6858000" cy="9144000"/>
   <p:embeddedFontLst>
     <p:embeddedFont>
       <p:font typeface="Consolas" panose="020B0609020204030204" pitchFamily="49" charset="0"/>
-      <p:regular r:id="rId46"/>
-      <p:bold r:id="rId47"/>
-      <p:italic r:id="rId48"/>
-      <p:boldItalic r:id="rId49"/>
+      <p:regular r:id="rId49"/>
+      <p:bold r:id="rId50"/>
+      <p:italic r:id="rId51"/>
+      <p:boldItalic r:id="rId52"/>
     </p:embeddedFont>
     <p:embeddedFont>
       <p:font typeface="Lucida Console" panose="020B0609040504020204" pitchFamily="49" charset="0"/>
-      <p:regular r:id="rId50"/>
+      <p:regular r:id="rId53"/>
     </p:embeddedFont>
     <p:embeddedFont>
       <p:font typeface="Open Sans" panose="020B0606030504020204" pitchFamily="34" charset="0"/>
-      <p:regular r:id="rId51"/>
-      <p:bold r:id="rId52"/>
-      <p:italic r:id="rId53"/>
-      <p:boldItalic r:id="rId54"/>
+      <p:regular r:id="rId54"/>
+      <p:bold r:id="rId55"/>
+      <p:italic r:id="rId56"/>
+      <p:boldItalic r:id="rId57"/>
     </p:embeddedFont>
     <p:embeddedFont>
       <p:font typeface="Segoe UI" panose="020B0502040204020203" pitchFamily="34" charset="0"/>
-      <p:regular r:id="rId55"/>
-      <p:bold r:id="rId56"/>
-      <p:italic r:id="rId57"/>
-      <p:boldItalic r:id="rId58"/>
+      <p:regular r:id="rId58"/>
+      <p:bold r:id="rId59"/>
+      <p:italic r:id="rId60"/>
+      <p:boldItalic r:id="rId61"/>
     </p:embeddedFont>
     <p:embeddedFont>
       <p:font typeface="Segoe UI Semibold" panose="020B0702040204020203" pitchFamily="34" charset="0"/>
-      <p:bold r:id="rId59"/>
-      <p:boldItalic r:id="rId60"/>
+      <p:bold r:id="rId62"/>
+      <p:boldItalic r:id="rId63"/>
     </p:embeddedFont>
   </p:embeddedFontLst>
   <p:defaultTextStyle>
@@ -17941,6 +17944,1078 @@
       </p:grpSpPr>
       <p:sp>
         <p:nvSpPr>
+          <p:cNvPr id="2" name="Title 1">
+            <a:extLst>
+              <a:ext uri="{FF2B5EF4-FFF2-40B4-BE49-F238E27FC236}">
+                <a16:creationId xmlns:a16="http://schemas.microsoft.com/office/drawing/2014/main" id="{FF3F2F24-7B16-F538-688B-E99840900E9E}"/>
+              </a:ext>
+            </a:extLst>
+          </p:cNvPr>
+          <p:cNvSpPr>
+            <a:spLocks noGrp="1"/>
+          </p:cNvSpPr>
+          <p:nvPr>
+            <p:ph type="title"/>
+          </p:nvPr>
+        </p:nvSpPr>
+        <p:spPr/>
+        <p:txBody>
+          <a:bodyPr/>
+          <a:lstStyle/>
+          <a:p>
+            <a:r>
+              <a:rPr lang="de-DE" dirty="0"/>
+              <a:t>SPF </a:t>
+            </a:r>
+            <a:r>
+              <a:rPr lang="de-DE" dirty="0" err="1"/>
+              <a:t>Macros</a:t>
+            </a:r>
+            <a:endParaRPr lang="de-DE" dirty="0"/>
+          </a:p>
+        </p:txBody>
+      </p:sp>
+      <p:sp>
+        <p:nvSpPr>
+          <p:cNvPr id="3" name="Text Placeholder 2">
+            <a:extLst>
+              <a:ext uri="{FF2B5EF4-FFF2-40B4-BE49-F238E27FC236}">
+                <a16:creationId xmlns:a16="http://schemas.microsoft.com/office/drawing/2014/main" id="{7DCF55EB-C525-01BF-B9AF-6C8497BE3EBB}"/>
+              </a:ext>
+            </a:extLst>
+          </p:cNvPr>
+          <p:cNvSpPr>
+            <a:spLocks noGrp="1"/>
+          </p:cNvSpPr>
+          <p:nvPr>
+            <p:ph type="body" sz="quarter" idx="10"/>
+          </p:nvPr>
+        </p:nvSpPr>
+        <p:spPr>
+          <a:xfrm>
+            <a:off x="595915" y="1464075"/>
+            <a:ext cx="11239464" cy="2197461"/>
+          </a:xfrm>
+        </p:spPr>
+        <p:txBody>
+          <a:bodyPr/>
+          <a:lstStyle/>
+          <a:p>
+            <a:r>
+              <a:rPr lang="de-DE" dirty="0"/>
+              <a:t>Platzhalter, um den SPF-</a:t>
+            </a:r>
+            <a:r>
+              <a:rPr lang="de-DE" dirty="0" err="1"/>
+              <a:t>Record</a:t>
+            </a:r>
+            <a:r>
+              <a:rPr lang="de-DE" dirty="0"/>
+              <a:t> dynamisch zu gestalten</a:t>
+            </a:r>
+          </a:p>
+          <a:p>
+            <a:r>
+              <a:rPr lang="de-DE" dirty="0"/>
+              <a:t>Definiert in </a:t>
+            </a:r>
+            <a:r>
+              <a:rPr lang="de-DE" dirty="0">
+                <a:hlinkClick r:id="rId2"/>
+              </a:rPr>
+              <a:t>RFC 7208 </a:t>
+            </a:r>
+            <a:r>
+              <a:rPr lang="de-DE" dirty="0" err="1">
+                <a:hlinkClick r:id="rId2"/>
+              </a:rPr>
+              <a:t>Section</a:t>
+            </a:r>
+            <a:r>
+              <a:rPr lang="de-DE" dirty="0">
+                <a:hlinkClick r:id="rId2"/>
+              </a:rPr>
+              <a:t> 7</a:t>
+            </a:r>
+            <a:endParaRPr lang="de-DE" dirty="0"/>
+          </a:p>
+          <a:p>
+            <a:endParaRPr lang="de-DE" dirty="0"/>
+          </a:p>
+          <a:p>
+            <a:r>
+              <a:rPr lang="de-DE" dirty="0"/>
+              <a:t>Beispiel POST.AT</a:t>
+            </a:r>
+          </a:p>
+          <a:p>
+            <a:endParaRPr lang="de-DE" dirty="0"/>
+          </a:p>
+          <a:p>
+            <a:endParaRPr lang="de-DE" dirty="0"/>
+          </a:p>
+        </p:txBody>
+      </p:sp>
+      <p:grpSp>
+        <p:nvGrpSpPr>
+          <p:cNvPr id="17" name="Group 16">
+            <a:extLst>
+              <a:ext uri="{FF2B5EF4-FFF2-40B4-BE49-F238E27FC236}">
+                <a16:creationId xmlns:a16="http://schemas.microsoft.com/office/drawing/2014/main" id="{45170487-9680-750D-856C-7F6F99885D70}"/>
+              </a:ext>
+            </a:extLst>
+          </p:cNvPr>
+          <p:cNvGrpSpPr/>
+          <p:nvPr/>
+        </p:nvGrpSpPr>
+        <p:grpSpPr>
+          <a:xfrm>
+            <a:off x="1008139" y="3227832"/>
+            <a:ext cx="10415016" cy="1477330"/>
+            <a:chOff x="1008139" y="2697480"/>
+            <a:chExt cx="10415016" cy="1477330"/>
+          </a:xfrm>
+        </p:grpSpPr>
+        <p:sp>
+          <p:nvSpPr>
+            <p:cNvPr id="4" name="TextBox 3">
+              <a:extLst>
+                <a:ext uri="{FF2B5EF4-FFF2-40B4-BE49-F238E27FC236}">
+                  <a16:creationId xmlns:a16="http://schemas.microsoft.com/office/drawing/2014/main" id="{F7202796-66D2-F5DB-6FA7-F8255B9ACEE7}"/>
+                </a:ext>
+              </a:extLst>
+            </p:cNvPr>
+            <p:cNvSpPr txBox="1"/>
+            <p:nvPr/>
+          </p:nvSpPr>
+          <p:spPr>
+            <a:xfrm>
+              <a:off x="1008139" y="2697480"/>
+              <a:ext cx="10415016" cy="492443"/>
+            </a:xfrm>
+            <a:prstGeom prst="rect">
+              <a:avLst/>
+            </a:prstGeom>
+            <a:noFill/>
+          </p:spPr>
+          <p:txBody>
+            <a:bodyPr wrap="square" lIns="0" tIns="0" rIns="0" bIns="0" rtlCol="0">
+              <a:spAutoFit/>
+            </a:bodyPr>
+            <a:lstStyle/>
+            <a:p>
+              <a:pPr algn="l"/>
+              <a:r>
+                <a:rPr lang="de-DE" sz="3200" dirty="0">
+                  <a:gradFill>
+                    <a:gsLst>
+                      <a:gs pos="2917">
+                        <a:schemeClr val="tx1"/>
+                      </a:gs>
+                      <a:gs pos="30000">
+                        <a:schemeClr val="tx1"/>
+                      </a:gs>
+                    </a:gsLst>
+                    <a:lin ang="5400000" scaled="0"/>
+                  </a:gradFill>
+                </a:rPr>
+                <a:t>"v=spf1 </a:t>
+              </a:r>
+              <a:r>
+                <a:rPr lang="de-DE" sz="3200" dirty="0" err="1">
+                  <a:gradFill>
+                    <a:gsLst>
+                      <a:gs pos="2917">
+                        <a:schemeClr val="tx1"/>
+                      </a:gs>
+                      <a:gs pos="30000">
+                        <a:schemeClr val="tx1"/>
+                      </a:gs>
+                    </a:gsLst>
+                    <a:lin ang="5400000" scaled="0"/>
+                  </a:gradFill>
+                </a:rPr>
+                <a:t>include</a:t>
+              </a:r>
+              <a:r>
+                <a:rPr lang="de-DE" sz="3200" dirty="0">
+                  <a:gradFill>
+                    <a:gsLst>
+                      <a:gs pos="2917">
+                        <a:schemeClr val="tx1"/>
+                      </a:gs>
+                      <a:gs pos="30000">
+                        <a:schemeClr val="tx1"/>
+                      </a:gs>
+                    </a:gsLst>
+                    <a:lin ang="5400000" scaled="0"/>
+                  </a:gradFill>
+                </a:rPr>
+                <a:t>:</a:t>
+              </a:r>
+              <a:r>
+                <a:rPr lang="de-DE" sz="3200" dirty="0">
+                  <a:solidFill>
+                    <a:srgbClr val="339933"/>
+                  </a:solidFill>
+                </a:rPr>
+                <a:t>%{</a:t>
+              </a:r>
+              <a:r>
+                <a:rPr lang="de-DE" sz="3200" dirty="0" err="1">
+                  <a:solidFill>
+                    <a:srgbClr val="339933"/>
+                  </a:solidFill>
+                </a:rPr>
+                <a:t>ir</a:t>
+              </a:r>
+              <a:r>
+                <a:rPr lang="de-DE" sz="3200" dirty="0">
+                  <a:solidFill>
+                    <a:srgbClr val="339933"/>
+                  </a:solidFill>
+                </a:rPr>
+                <a:t>}.%{v}.%{d}</a:t>
+              </a:r>
+              <a:r>
+                <a:rPr lang="de-DE" sz="3200" dirty="0">
+                  <a:gradFill>
+                    <a:gsLst>
+                      <a:gs pos="2917">
+                        <a:schemeClr val="tx1"/>
+                      </a:gs>
+                      <a:gs pos="30000">
+                        <a:schemeClr val="tx1"/>
+                      </a:gs>
+                    </a:gsLst>
+                    <a:lin ang="5400000" scaled="0"/>
+                  </a:gradFill>
+                </a:rPr>
+                <a:t>.spf.has.pphosted.com -all"</a:t>
+              </a:r>
+            </a:p>
+          </p:txBody>
+        </p:sp>
+        <p:sp>
+          <p:nvSpPr>
+            <p:cNvPr id="5" name="TextBox 4">
+              <a:extLst>
+                <a:ext uri="{FF2B5EF4-FFF2-40B4-BE49-F238E27FC236}">
+                  <a16:creationId xmlns:a16="http://schemas.microsoft.com/office/drawing/2014/main" id="{95E0B2AE-124F-AFD4-0852-A2D5943E5DEE}"/>
+                </a:ext>
+              </a:extLst>
+            </p:cNvPr>
+            <p:cNvSpPr txBox="1"/>
+            <p:nvPr/>
+          </p:nvSpPr>
+          <p:spPr>
+            <a:xfrm>
+              <a:off x="1426464" y="3411062"/>
+              <a:ext cx="2871216" cy="307777"/>
+            </a:xfrm>
+            <a:prstGeom prst="rect">
+              <a:avLst/>
+            </a:prstGeom>
+            <a:noFill/>
+          </p:spPr>
+          <p:txBody>
+            <a:bodyPr wrap="square" lIns="0" tIns="0" rIns="0" bIns="0" rtlCol="0">
+              <a:spAutoFit/>
+            </a:bodyPr>
+            <a:lstStyle/>
+            <a:p>
+              <a:pPr algn="l"/>
+              <a:r>
+                <a:rPr lang="de-DE" sz="2000" dirty="0">
+                  <a:solidFill>
+                    <a:srgbClr val="339933"/>
+                  </a:solidFill>
+                </a:rPr>
+                <a:t>Source IP (reverse Order)</a:t>
+              </a:r>
+            </a:p>
+          </p:txBody>
+        </p:sp>
+        <p:sp>
+          <p:nvSpPr>
+            <p:cNvPr id="6" name="TextBox 5">
+              <a:extLst>
+                <a:ext uri="{FF2B5EF4-FFF2-40B4-BE49-F238E27FC236}">
+                  <a16:creationId xmlns:a16="http://schemas.microsoft.com/office/drawing/2014/main" id="{B7A561B4-4F66-CCCC-C086-F4418DD13E24}"/>
+                </a:ext>
+              </a:extLst>
+            </p:cNvPr>
+            <p:cNvSpPr txBox="1"/>
+            <p:nvPr/>
+          </p:nvSpPr>
+          <p:spPr>
+            <a:xfrm>
+              <a:off x="3860983" y="3867033"/>
+              <a:ext cx="2965069" cy="307777"/>
+            </a:xfrm>
+            <a:prstGeom prst="rect">
+              <a:avLst/>
+            </a:prstGeom>
+            <a:noFill/>
+          </p:spPr>
+          <p:txBody>
+            <a:bodyPr wrap="square" lIns="0" tIns="0" rIns="0" bIns="0" rtlCol="0">
+              <a:spAutoFit/>
+            </a:bodyPr>
+            <a:lstStyle/>
+            <a:p>
+              <a:pPr algn="l"/>
+              <a:r>
+                <a:rPr lang="de-DE" sz="2000" dirty="0">
+                  <a:solidFill>
+                    <a:srgbClr val="339933"/>
+                  </a:solidFill>
+                </a:rPr>
+                <a:t>Statischer „in-</a:t>
+              </a:r>
+              <a:r>
+                <a:rPr lang="de-DE" sz="2000" dirty="0" err="1">
+                  <a:solidFill>
+                    <a:srgbClr val="339933"/>
+                  </a:solidFill>
+                </a:rPr>
+                <a:t>addr</a:t>
+              </a:r>
+              <a:r>
+                <a:rPr lang="de-DE" sz="2000" dirty="0">
+                  <a:solidFill>
+                    <a:srgbClr val="339933"/>
+                  </a:solidFill>
+                </a:rPr>
+                <a:t>“ String</a:t>
+              </a:r>
+            </a:p>
+          </p:txBody>
+        </p:sp>
+        <p:sp>
+          <p:nvSpPr>
+            <p:cNvPr id="7" name="TextBox 6">
+              <a:extLst>
+                <a:ext uri="{FF2B5EF4-FFF2-40B4-BE49-F238E27FC236}">
+                  <a16:creationId xmlns:a16="http://schemas.microsoft.com/office/drawing/2014/main" id="{FD35D866-BDAC-7968-DD2C-56B4E22794EA}"/>
+                </a:ext>
+              </a:extLst>
+            </p:cNvPr>
+            <p:cNvSpPr txBox="1"/>
+            <p:nvPr/>
+          </p:nvSpPr>
+          <p:spPr>
+            <a:xfrm>
+              <a:off x="6389356" y="3411061"/>
+              <a:ext cx="4492003" cy="307777"/>
+            </a:xfrm>
+            <a:prstGeom prst="rect">
+              <a:avLst/>
+            </a:prstGeom>
+            <a:noFill/>
+          </p:spPr>
+          <p:txBody>
+            <a:bodyPr wrap="square" lIns="0" tIns="0" rIns="0" bIns="0" rtlCol="0">
+              <a:spAutoFit/>
+            </a:bodyPr>
+            <a:lstStyle/>
+            <a:p>
+              <a:pPr algn="l"/>
+              <a:r>
+                <a:rPr lang="de-DE" sz="2000" dirty="0">
+                  <a:solidFill>
+                    <a:srgbClr val="339933"/>
+                  </a:solidFill>
+                </a:rPr>
+                <a:t>Autoritative Domäne der SPF-Richtlinie</a:t>
+              </a:r>
+            </a:p>
+          </p:txBody>
+        </p:sp>
+        <p:cxnSp>
+          <p:nvCxnSpPr>
+            <p:cNvPr id="9" name="Straight Arrow Connector 8">
+              <a:extLst>
+                <a:ext uri="{FF2B5EF4-FFF2-40B4-BE49-F238E27FC236}">
+                  <a16:creationId xmlns:a16="http://schemas.microsoft.com/office/drawing/2014/main" id="{DD6317E8-7B30-6F02-7D4C-9D7E1EA6EE06}"/>
+                </a:ext>
+              </a:extLst>
+            </p:cNvPr>
+            <p:cNvCxnSpPr>
+              <a:cxnSpLocks/>
+              <a:stCxn id="5" idx="0"/>
+            </p:cNvCxnSpPr>
+            <p:nvPr/>
+          </p:nvCxnSpPr>
+          <p:spPr>
+            <a:xfrm flipV="1">
+              <a:off x="2862072" y="3171687"/>
+              <a:ext cx="1378331" cy="239375"/>
+            </a:xfrm>
+            <a:prstGeom prst="straightConnector1">
+              <a:avLst/>
+            </a:prstGeom>
+            <a:ln>
+              <a:solidFill>
+                <a:srgbClr val="339933"/>
+              </a:solidFill>
+              <a:headEnd type="none" w="lg" len="med"/>
+              <a:tailEnd type="triangle"/>
+            </a:ln>
+          </p:spPr>
+          <p:style>
+            <a:lnRef idx="1">
+              <a:schemeClr val="accent1"/>
+            </a:lnRef>
+            <a:fillRef idx="0">
+              <a:schemeClr val="accent1"/>
+            </a:fillRef>
+            <a:effectRef idx="0">
+              <a:schemeClr val="accent1"/>
+            </a:effectRef>
+            <a:fontRef idx="minor">
+              <a:schemeClr val="tx1"/>
+            </a:fontRef>
+          </p:style>
+        </p:cxnSp>
+        <p:cxnSp>
+          <p:nvCxnSpPr>
+            <p:cNvPr id="11" name="Straight Arrow Connector 10">
+              <a:extLst>
+                <a:ext uri="{FF2B5EF4-FFF2-40B4-BE49-F238E27FC236}">
+                  <a16:creationId xmlns:a16="http://schemas.microsoft.com/office/drawing/2014/main" id="{9C565427-7C98-EF1D-F468-035551C86E17}"/>
+                </a:ext>
+              </a:extLst>
+            </p:cNvPr>
+            <p:cNvCxnSpPr>
+              <a:cxnSpLocks/>
+            </p:cNvCxnSpPr>
+            <p:nvPr/>
+          </p:nvCxnSpPr>
+          <p:spPr>
+            <a:xfrm flipH="1" flipV="1">
+              <a:off x="5343517" y="3189923"/>
+              <a:ext cx="1" cy="600226"/>
+            </a:xfrm>
+            <a:prstGeom prst="straightConnector1">
+              <a:avLst/>
+            </a:prstGeom>
+            <a:ln>
+              <a:solidFill>
+                <a:srgbClr val="339933"/>
+              </a:solidFill>
+              <a:headEnd type="none" w="lg" len="med"/>
+              <a:tailEnd type="triangle"/>
+            </a:ln>
+          </p:spPr>
+          <p:style>
+            <a:lnRef idx="1">
+              <a:schemeClr val="accent1"/>
+            </a:lnRef>
+            <a:fillRef idx="0">
+              <a:schemeClr val="accent1"/>
+            </a:fillRef>
+            <a:effectRef idx="0">
+              <a:schemeClr val="accent1"/>
+            </a:effectRef>
+            <a:fontRef idx="minor">
+              <a:schemeClr val="tx1"/>
+            </a:fontRef>
+          </p:style>
+        </p:cxnSp>
+        <p:cxnSp>
+          <p:nvCxnSpPr>
+            <p:cNvPr id="14" name="Straight Arrow Connector 13">
+              <a:extLst>
+                <a:ext uri="{FF2B5EF4-FFF2-40B4-BE49-F238E27FC236}">
+                  <a16:creationId xmlns:a16="http://schemas.microsoft.com/office/drawing/2014/main" id="{A1CCFF0B-7F31-DEDC-46E0-1906B95BA3CB}"/>
+                </a:ext>
+              </a:extLst>
+            </p:cNvPr>
+            <p:cNvCxnSpPr>
+              <a:cxnSpLocks/>
+              <a:stCxn id="7" idx="0"/>
+            </p:cNvCxnSpPr>
+            <p:nvPr/>
+          </p:nvCxnSpPr>
+          <p:spPr>
+            <a:xfrm flipH="1" flipV="1">
+              <a:off x="6215647" y="3189923"/>
+              <a:ext cx="2419711" cy="221138"/>
+            </a:xfrm>
+            <a:prstGeom prst="straightConnector1">
+              <a:avLst/>
+            </a:prstGeom>
+            <a:ln>
+              <a:solidFill>
+                <a:srgbClr val="339933"/>
+              </a:solidFill>
+              <a:headEnd type="none" w="lg" len="med"/>
+              <a:tailEnd type="triangle"/>
+            </a:ln>
+          </p:spPr>
+          <p:style>
+            <a:lnRef idx="1">
+              <a:schemeClr val="accent1"/>
+            </a:lnRef>
+            <a:fillRef idx="0">
+              <a:schemeClr val="accent1"/>
+            </a:fillRef>
+            <a:effectRef idx="0">
+              <a:schemeClr val="accent1"/>
+            </a:effectRef>
+            <a:fontRef idx="minor">
+              <a:schemeClr val="tx1"/>
+            </a:fontRef>
+          </p:style>
+        </p:cxnSp>
+      </p:grpSp>
+    </p:spTree>
+    <p:extLst>
+      <p:ext uri="{BB962C8B-B14F-4D97-AF65-F5344CB8AC3E}">
+        <p14:creationId xmlns:p14="http://schemas.microsoft.com/office/powerpoint/2010/main" val="1374729980"/>
+      </p:ext>
+    </p:extLst>
+  </p:cSld>
+  <p:clrMapOvr>
+    <a:masterClrMapping/>
+  </p:clrMapOvr>
+  <p:transition>
+    <p:fade/>
+  </p:transition>
+</p:sld>
+</file>
+
+<file path=ppt/slides/slide25.xml><?xml version="1.0" encoding="utf-8"?>
+<p:sld xmlns:a="http://schemas.openxmlformats.org/drawingml/2006/main" xmlns:r="http://schemas.openxmlformats.org/officeDocument/2006/relationships" xmlns:p="http://schemas.openxmlformats.org/presentationml/2006/main">
+  <p:cSld>
+    <p:spTree>
+      <p:nvGrpSpPr>
+        <p:cNvPr id="1" name=""/>
+        <p:cNvGrpSpPr/>
+        <p:nvPr/>
+      </p:nvGrpSpPr>
+      <p:grpSpPr>
+        <a:xfrm>
+          <a:off x="0" y="0"/>
+          <a:ext cx="0" cy="0"/>
+          <a:chOff x="0" y="0"/>
+          <a:chExt cx="0" cy="0"/>
+        </a:xfrm>
+      </p:grpSpPr>
+      <p:sp>
+        <p:nvSpPr>
+          <p:cNvPr id="2" name="Title 1">
+            <a:extLst>
+              <a:ext uri="{FF2B5EF4-FFF2-40B4-BE49-F238E27FC236}">
+                <a16:creationId xmlns:a16="http://schemas.microsoft.com/office/drawing/2014/main" id="{253D39A9-8C4D-9875-B2C2-1F452CF28C93}"/>
+              </a:ext>
+            </a:extLst>
+          </p:cNvPr>
+          <p:cNvSpPr>
+            <a:spLocks noGrp="1"/>
+          </p:cNvSpPr>
+          <p:nvPr>
+            <p:ph type="title"/>
+          </p:nvPr>
+        </p:nvSpPr>
+        <p:spPr/>
+        <p:txBody>
+          <a:bodyPr/>
+          <a:lstStyle/>
+          <a:p>
+            <a:r>
+              <a:rPr lang="de-DE" dirty="0"/>
+              <a:t>SPF </a:t>
+            </a:r>
+            <a:r>
+              <a:rPr lang="de-DE" dirty="0" err="1"/>
+              <a:t>Macro</a:t>
+            </a:r>
+            <a:r>
+              <a:rPr lang="de-DE" dirty="0"/>
+              <a:t> Platzhalter</a:t>
+            </a:r>
+          </a:p>
+        </p:txBody>
+      </p:sp>
+      <p:graphicFrame>
+        <p:nvGraphicFramePr>
+          <p:cNvPr id="4" name="Table 3">
+            <a:extLst>
+              <a:ext uri="{FF2B5EF4-FFF2-40B4-BE49-F238E27FC236}">
+                <a16:creationId xmlns:a16="http://schemas.microsoft.com/office/drawing/2014/main" id="{628333AA-E433-C5A9-EC13-221CB06545CD}"/>
+              </a:ext>
+            </a:extLst>
+          </p:cNvPr>
+          <p:cNvGraphicFramePr>
+            <a:graphicFrameLocks noGrp="1"/>
+          </p:cNvGraphicFramePr>
+          <p:nvPr>
+            <p:extLst>
+              <p:ext uri="{D42A27DB-BD31-4B8C-83A1-F6EECF244321}">
+                <p14:modId xmlns:p14="http://schemas.microsoft.com/office/powerpoint/2010/main" val="614359555"/>
+              </p:ext>
+            </p:extLst>
+          </p:nvPr>
+        </p:nvGraphicFramePr>
+        <p:xfrm>
+          <a:off x="2072746" y="1777792"/>
+          <a:ext cx="8290984" cy="3712210"/>
+        </p:xfrm>
+        <a:graphic>
+          <a:graphicData uri="http://schemas.openxmlformats.org/drawingml/2006/table">
+            <a:tbl>
+              <a:tblPr firstRow="1" bandRow="1">
+                <a:tableStyleId>{5C22544A-7EE6-4342-B048-85BDC9FD1C3A}</a:tableStyleId>
+              </a:tblPr>
+              <a:tblGrid>
+                <a:gridCol w="1017926">
+                  <a:extLst>
+                    <a:ext uri="{9D8B030D-6E8A-4147-A177-3AD203B41FA5}">
+                      <a16:colId xmlns:a16="http://schemas.microsoft.com/office/drawing/2014/main" val="3089028256"/>
+                    </a:ext>
+                  </a:extLst>
+                </a:gridCol>
+                <a:gridCol w="7273058">
+                  <a:extLst>
+                    <a:ext uri="{9D8B030D-6E8A-4147-A177-3AD203B41FA5}">
+                      <a16:colId xmlns:a16="http://schemas.microsoft.com/office/drawing/2014/main" val="549014472"/>
+                    </a:ext>
+                  </a:extLst>
+                </a:gridCol>
+              </a:tblGrid>
+              <a:tr h="370840">
+                <a:tc>
+                  <a:txBody>
+                    <a:bodyPr/>
+                    <a:lstStyle/>
+                    <a:p>
+                      <a:pPr algn="ctr"/>
+                      <a:r>
+                        <a:rPr lang="de-DE" dirty="0" err="1"/>
+                        <a:t>Macro</a:t>
+                      </a:r>
+                      <a:endParaRPr lang="de-DE" dirty="0"/>
+                    </a:p>
+                  </a:txBody>
+                  <a:tcPr anchor="ctr"/>
+                </a:tc>
+                <a:tc>
+                  <a:txBody>
+                    <a:bodyPr/>
+                    <a:lstStyle/>
+                    <a:p>
+                      <a:r>
+                        <a:rPr lang="de-DE" noProof="0" dirty="0"/>
+                        <a:t>Bedeutung</a:t>
+                      </a:r>
+                    </a:p>
+                  </a:txBody>
+                  <a:tcPr/>
+                </a:tc>
+                <a:extLst>
+                  <a:ext uri="{0D108BD9-81ED-4DB2-BD59-A6C34878D82A}">
+                    <a16:rowId xmlns:a16="http://schemas.microsoft.com/office/drawing/2014/main" val="190463916"/>
+                  </a:ext>
+                </a:extLst>
+              </a:tr>
+              <a:tr h="370840">
+                <a:tc>
+                  <a:txBody>
+                    <a:bodyPr/>
+                    <a:lstStyle/>
+                    <a:p>
+                      <a:pPr algn="ctr"/>
+                      <a:r>
+                        <a:rPr lang="de-DE" dirty="0"/>
+                        <a:t>%{s}</a:t>
+                      </a:r>
+                    </a:p>
+                  </a:txBody>
+                  <a:tcPr anchor="ctr"/>
+                </a:tc>
+                <a:tc>
+                  <a:txBody>
+                    <a:bodyPr/>
+                    <a:lstStyle/>
+                    <a:p>
+                      <a:r>
+                        <a:rPr lang="de-DE" noProof="0" dirty="0"/>
+                        <a:t>Der Absender der zu empfangenden Email. e.g. joe@example.com.</a:t>
+                      </a:r>
+                    </a:p>
+                  </a:txBody>
+                  <a:tcPr/>
+                </a:tc>
+                <a:extLst>
+                  <a:ext uri="{0D108BD9-81ED-4DB2-BD59-A6C34878D82A}">
+                    <a16:rowId xmlns:a16="http://schemas.microsoft.com/office/drawing/2014/main" val="480839123"/>
+                  </a:ext>
+                </a:extLst>
+              </a:tr>
+              <a:tr h="370840">
+                <a:tc>
+                  <a:txBody>
+                    <a:bodyPr/>
+                    <a:lstStyle/>
+                    <a:p>
+                      <a:pPr algn="ctr"/>
+                      <a:r>
+                        <a:rPr lang="de-DE" dirty="0"/>
+                        <a:t>%{l}</a:t>
+                      </a:r>
+                    </a:p>
+                  </a:txBody>
+                  <a:tcPr anchor="ctr"/>
+                </a:tc>
+                <a:tc>
+                  <a:txBody>
+                    <a:bodyPr/>
+                    <a:lstStyle/>
+                    <a:p>
+                      <a:r>
+                        <a:rPr lang="de-DE" noProof="0" dirty="0"/>
+                        <a:t>Der Name des Absenders, e.g. </a:t>
+                      </a:r>
+                      <a:r>
+                        <a:rPr lang="de-DE" noProof="0" dirty="0" err="1"/>
+                        <a:t>joe</a:t>
+                      </a:r>
+                      <a:endParaRPr lang="de-DE" noProof="0" dirty="0"/>
+                    </a:p>
+                  </a:txBody>
+                  <a:tcPr/>
+                </a:tc>
+                <a:extLst>
+                  <a:ext uri="{0D108BD9-81ED-4DB2-BD59-A6C34878D82A}">
+                    <a16:rowId xmlns:a16="http://schemas.microsoft.com/office/drawing/2014/main" val="2655614981"/>
+                  </a:ext>
+                </a:extLst>
+              </a:tr>
+              <a:tr h="370840">
+                <a:tc>
+                  <a:txBody>
+                    <a:bodyPr/>
+                    <a:lstStyle/>
+                    <a:p>
+                      <a:pPr algn="ctr"/>
+                      <a:r>
+                        <a:rPr lang="de-DE" dirty="0"/>
+                        <a:t>%{o}</a:t>
+                      </a:r>
+                    </a:p>
+                  </a:txBody>
+                  <a:tcPr anchor="ctr"/>
+                </a:tc>
+                <a:tc>
+                  <a:txBody>
+                    <a:bodyPr/>
+                    <a:lstStyle/>
+                    <a:p>
+                      <a:r>
+                        <a:rPr lang="de-DE" noProof="0" dirty="0"/>
+                        <a:t>Domäne des Absenders</a:t>
+                      </a:r>
+                    </a:p>
+                  </a:txBody>
+                  <a:tcPr/>
+                </a:tc>
+                <a:extLst>
+                  <a:ext uri="{0D108BD9-81ED-4DB2-BD59-A6C34878D82A}">
+                    <a16:rowId xmlns:a16="http://schemas.microsoft.com/office/drawing/2014/main" val="1595282138"/>
+                  </a:ext>
+                </a:extLst>
+              </a:tr>
+              <a:tr h="370840">
+                <a:tc>
+                  <a:txBody>
+                    <a:bodyPr/>
+                    <a:lstStyle/>
+                    <a:p>
+                      <a:pPr algn="ctr"/>
+                      <a:r>
+                        <a:rPr lang="de-DE" dirty="0"/>
+                        <a:t>%{d}</a:t>
+                      </a:r>
+                    </a:p>
+                  </a:txBody>
+                  <a:tcPr anchor="ctr"/>
+                </a:tc>
+                <a:tc>
+                  <a:txBody>
+                    <a:bodyPr/>
+                    <a:lstStyle/>
+                    <a:p>
+                      <a:r>
+                        <a:rPr lang="de-DE" noProof="0" dirty="0"/>
+                        <a:t>Die autoritative Domäne der aktuellen SPF </a:t>
+                      </a:r>
+                      <a:r>
+                        <a:rPr lang="de-DE" noProof="0" dirty="0" err="1"/>
+                        <a:t>Richtilinie</a:t>
+                      </a:r>
+                      <a:endParaRPr lang="de-DE" noProof="0" dirty="0"/>
+                    </a:p>
+                  </a:txBody>
+                  <a:tcPr/>
+                </a:tc>
+                <a:extLst>
+                  <a:ext uri="{0D108BD9-81ED-4DB2-BD59-A6C34878D82A}">
+                    <a16:rowId xmlns:a16="http://schemas.microsoft.com/office/drawing/2014/main" val="4221636510"/>
+                  </a:ext>
+                </a:extLst>
+              </a:tr>
+              <a:tr h="370840">
+                <a:tc>
+                  <a:txBody>
+                    <a:bodyPr/>
+                    <a:lstStyle/>
+                    <a:p>
+                      <a:pPr algn="ctr"/>
+                      <a:r>
+                        <a:rPr lang="de-DE" dirty="0"/>
+                        <a:t>%{i}</a:t>
+                      </a:r>
+                    </a:p>
+                  </a:txBody>
+                  <a:tcPr anchor="ctr"/>
+                </a:tc>
+                <a:tc>
+                  <a:txBody>
+                    <a:bodyPr/>
+                    <a:lstStyle/>
+                    <a:p>
+                      <a:r>
+                        <a:rPr lang="de-DE" noProof="0" dirty="0"/>
+                        <a:t>Die Quell-IP der Nachricht</a:t>
+                      </a:r>
+                    </a:p>
+                  </a:txBody>
+                  <a:tcPr/>
+                </a:tc>
+                <a:extLst>
+                  <a:ext uri="{0D108BD9-81ED-4DB2-BD59-A6C34878D82A}">
+                    <a16:rowId xmlns:a16="http://schemas.microsoft.com/office/drawing/2014/main" val="3211720426"/>
+                  </a:ext>
+                </a:extLst>
+              </a:tr>
+              <a:tr h="370840">
+                <a:tc>
+                  <a:txBody>
+                    <a:bodyPr/>
+                    <a:lstStyle/>
+                    <a:p>
+                      <a:pPr algn="ctr"/>
+                      <a:r>
+                        <a:rPr lang="de-DE" dirty="0"/>
+                        <a:t>%{p}</a:t>
+                      </a:r>
+                    </a:p>
+                  </a:txBody>
+                  <a:tcPr anchor="ctr"/>
+                </a:tc>
+                <a:tc>
+                  <a:txBody>
+                    <a:bodyPr/>
+                    <a:lstStyle/>
+                    <a:p>
+                      <a:r>
+                        <a:rPr lang="de-DE" noProof="0" dirty="0"/>
+                        <a:t>Die validierte Reverse-Lookup Domäne der Quell-IP</a:t>
+                      </a:r>
+                    </a:p>
+                  </a:txBody>
+                  <a:tcPr/>
+                </a:tc>
+                <a:extLst>
+                  <a:ext uri="{0D108BD9-81ED-4DB2-BD59-A6C34878D82A}">
+                    <a16:rowId xmlns:a16="http://schemas.microsoft.com/office/drawing/2014/main" val="2814321009"/>
+                  </a:ext>
+                </a:extLst>
+              </a:tr>
+              <a:tr h="370840">
+                <a:tc>
+                  <a:txBody>
+                    <a:bodyPr/>
+                    <a:lstStyle/>
+                    <a:p>
+                      <a:pPr algn="ctr"/>
+                      <a:r>
+                        <a:rPr lang="de-DE" dirty="0"/>
+                        <a:t>%{v}</a:t>
+                      </a:r>
+                    </a:p>
+                  </a:txBody>
+                  <a:tcPr anchor="ctr"/>
+                </a:tc>
+                <a:tc>
+                  <a:txBody>
+                    <a:bodyPr/>
+                    <a:lstStyle/>
+                    <a:p>
+                      <a:r>
+                        <a:rPr lang="de-DE" noProof="0" dirty="0"/>
+                        <a:t>Statischer „in-</a:t>
+                      </a:r>
+                      <a:r>
+                        <a:rPr lang="de-DE" noProof="0" dirty="0" err="1"/>
+                        <a:t>addr</a:t>
+                      </a:r>
+                      <a:r>
+                        <a:rPr lang="de-DE" noProof="0" dirty="0"/>
+                        <a:t>“ String (für Reverse Lookup)</a:t>
+                      </a:r>
+                    </a:p>
+                  </a:txBody>
+                  <a:tcPr/>
+                </a:tc>
+                <a:extLst>
+                  <a:ext uri="{0D108BD9-81ED-4DB2-BD59-A6C34878D82A}">
+                    <a16:rowId xmlns:a16="http://schemas.microsoft.com/office/drawing/2014/main" val="3236108336"/>
+                  </a:ext>
+                </a:extLst>
+              </a:tr>
+              <a:tr h="370840">
+                <a:tc>
+                  <a:txBody>
+                    <a:bodyPr/>
+                    <a:lstStyle/>
+                    <a:p>
+                      <a:pPr algn="ctr"/>
+                      <a:r>
+                        <a:rPr lang="de-DE" dirty="0"/>
+                        <a:t>%{h}</a:t>
+                      </a:r>
+                    </a:p>
+                  </a:txBody>
+                  <a:tcPr anchor="ctr"/>
+                </a:tc>
+                <a:tc>
+                  <a:txBody>
+                    <a:bodyPr/>
+                    <a:lstStyle/>
+                    <a:p>
+                      <a:r>
+                        <a:rPr lang="en-US" noProof="0" dirty="0" err="1"/>
+                        <a:t>Domäne</a:t>
+                      </a:r>
+                      <a:r>
+                        <a:rPr lang="en-US" noProof="0" dirty="0"/>
+                        <a:t> die </a:t>
+                      </a:r>
+                      <a:r>
+                        <a:rPr lang="en-US" noProof="0" dirty="0" err="1"/>
+                        <a:t>im</a:t>
+                      </a:r>
+                      <a:r>
+                        <a:rPr lang="en-US" noProof="0" dirty="0"/>
+                        <a:t> SMTP HELO or EHLO command </a:t>
+                      </a:r>
+                      <a:r>
+                        <a:rPr lang="en-US" noProof="0" dirty="0" err="1"/>
+                        <a:t>benutzt</a:t>
+                      </a:r>
+                      <a:r>
+                        <a:rPr lang="en-US" noProof="0" dirty="0"/>
+                        <a:t> </a:t>
+                      </a:r>
+                      <a:r>
+                        <a:rPr lang="en-US" noProof="0" dirty="0" err="1"/>
+                        <a:t>wird</a:t>
+                      </a:r>
+                      <a:endParaRPr lang="de-DE" noProof="0" dirty="0"/>
+                    </a:p>
+                  </a:txBody>
+                  <a:tcPr/>
+                </a:tc>
+                <a:extLst>
+                  <a:ext uri="{0D108BD9-81ED-4DB2-BD59-A6C34878D82A}">
+                    <a16:rowId xmlns:a16="http://schemas.microsoft.com/office/drawing/2014/main" val="3511241766"/>
+                  </a:ext>
+                </a:extLst>
+              </a:tr>
+              <a:tr h="370840">
+                <a:tc>
+                  <a:txBody>
+                    <a:bodyPr/>
+                    <a:lstStyle/>
+                    <a:p>
+                      <a:pPr algn="ctr"/>
+                      <a:r>
+                        <a:rPr lang="de-DE" dirty="0"/>
+                        <a:t>r</a:t>
+                      </a:r>
+                    </a:p>
+                  </a:txBody>
+                  <a:tcPr anchor="ctr"/>
+                </a:tc>
+                <a:tc>
+                  <a:txBody>
+                    <a:bodyPr/>
+                    <a:lstStyle/>
+                    <a:p>
+                      <a:r>
+                        <a:rPr lang="de-DE" noProof="0" dirty="0"/>
+                        <a:t>Zusätzlicher </a:t>
+                      </a:r>
+                      <a:r>
+                        <a:rPr lang="de-DE" noProof="0" dirty="0" err="1"/>
+                        <a:t>Modifier</a:t>
+                      </a:r>
+                      <a:r>
+                        <a:rPr lang="de-DE" noProof="0" dirty="0"/>
+                        <a:t> für Umgekehrte Evaluierung</a:t>
+                      </a:r>
+                    </a:p>
+                  </a:txBody>
+                  <a:tcPr/>
+                </a:tc>
+                <a:extLst>
+                  <a:ext uri="{0D108BD9-81ED-4DB2-BD59-A6C34878D82A}">
+                    <a16:rowId xmlns:a16="http://schemas.microsoft.com/office/drawing/2014/main" val="2290087415"/>
+                  </a:ext>
+                </a:extLst>
+              </a:tr>
+            </a:tbl>
+          </a:graphicData>
+        </a:graphic>
+      </p:graphicFrame>
+    </p:spTree>
+    <p:extLst>
+      <p:ext uri="{BB962C8B-B14F-4D97-AF65-F5344CB8AC3E}">
+        <p14:creationId xmlns:p14="http://schemas.microsoft.com/office/powerpoint/2010/main" val="2720347774"/>
+      </p:ext>
+    </p:extLst>
+  </p:cSld>
+  <p:clrMapOvr>
+    <a:masterClrMapping/>
+  </p:clrMapOvr>
+  <p:transition>
+    <p:fade/>
+  </p:transition>
+</p:sld>
+</file>
+
+<file path=ppt/slides/slide26.xml><?xml version="1.0" encoding="utf-8"?>
+<p:sld xmlns:a="http://schemas.openxmlformats.org/drawingml/2006/main" xmlns:r="http://schemas.openxmlformats.org/officeDocument/2006/relationships" xmlns:p="http://schemas.openxmlformats.org/presentationml/2006/main">
+  <p:cSld>
+    <p:spTree>
+      <p:nvGrpSpPr>
+        <p:cNvPr id="1" name=""/>
+        <p:cNvGrpSpPr/>
+        <p:nvPr/>
+      </p:nvGrpSpPr>
+      <p:grpSpPr>
+        <a:xfrm>
+          <a:off x="0" y="0"/>
+          <a:ext cx="0" cy="0"/>
+          <a:chOff x="0" y="0"/>
+          <a:chExt cx="0" cy="0"/>
+        </a:xfrm>
+      </p:grpSpPr>
+      <p:sp>
+        <p:nvSpPr>
           <p:cNvPr id="2" name="Titel 1">
             <a:extLst>
               <a:ext uri="{FF2B5EF4-FFF2-40B4-BE49-F238E27FC236}">
@@ -18103,7 +19178,7 @@
 </p:sld>
 </file>
 
-<file path=ppt/slides/slide25.xml><?xml version="1.0" encoding="utf-8"?>
+<file path=ppt/slides/slide27.xml><?xml version="1.0" encoding="utf-8"?>
 <p:sld xmlns:a="http://schemas.openxmlformats.org/drawingml/2006/main" xmlns:r="http://schemas.openxmlformats.org/officeDocument/2006/relationships" xmlns:p="http://schemas.openxmlformats.org/presentationml/2006/main">
   <p:cSld>
     <p:spTree>
@@ -18341,7 +19416,7 @@
 </p:sld>
 </file>
 
-<file path=ppt/slides/slide26.xml><?xml version="1.0" encoding="utf-8"?>
+<file path=ppt/slides/slide28.xml><?xml version="1.0" encoding="utf-8"?>
 <p:sld xmlns:a="http://schemas.openxmlformats.org/drawingml/2006/main" xmlns:r="http://schemas.openxmlformats.org/officeDocument/2006/relationships" xmlns:p="http://schemas.openxmlformats.org/presentationml/2006/main">
   <p:cSld>
     <p:spTree>
@@ -18510,7 +19585,7 @@
 </p:sld>
 </file>
 
-<file path=ppt/slides/slide27.xml><?xml version="1.0" encoding="utf-8"?>
+<file path=ppt/slides/slide29.xml><?xml version="1.0" encoding="utf-8"?>
 <p:sld xmlns:a="http://schemas.openxmlformats.org/drawingml/2006/main" xmlns:r="http://schemas.openxmlformats.org/officeDocument/2006/relationships" xmlns:p="http://schemas.openxmlformats.org/presentationml/2006/main">
   <p:cSld>
     <p:spTree>
@@ -18680,7 +19755,80 @@
 </p:sld>
 </file>
 
-<file path=ppt/slides/slide28.xml><?xml version="1.0" encoding="utf-8"?>
+<file path=ppt/slides/slide3.xml><?xml version="1.0" encoding="utf-8"?>
+<p:sld xmlns:a="http://schemas.openxmlformats.org/drawingml/2006/main" xmlns:r="http://schemas.openxmlformats.org/officeDocument/2006/relationships" xmlns:p="http://schemas.openxmlformats.org/presentationml/2006/main">
+  <p:cSld>
+    <p:spTree>
+      <p:nvGrpSpPr>
+        <p:cNvPr id="1" name=""/>
+        <p:cNvGrpSpPr/>
+        <p:nvPr/>
+      </p:nvGrpSpPr>
+      <p:grpSpPr>
+        <a:xfrm>
+          <a:off x="0" y="0"/>
+          <a:ext cx="0" cy="0"/>
+          <a:chOff x="0" y="0"/>
+          <a:chExt cx="0" cy="0"/>
+        </a:xfrm>
+      </p:grpSpPr>
+      <p:sp>
+        <p:nvSpPr>
+          <p:cNvPr id="4" name="Title 3">
+            <a:extLst>
+              <a:ext uri="{FF2B5EF4-FFF2-40B4-BE49-F238E27FC236}">
+                <a16:creationId xmlns:a16="http://schemas.microsoft.com/office/drawing/2014/main" id="{841CB59B-EF9E-4E47-BF33-B8075EB6C7A1}"/>
+              </a:ext>
+            </a:extLst>
+          </p:cNvPr>
+          <p:cNvSpPr>
+            <a:spLocks noGrp="1"/>
+          </p:cNvSpPr>
+          <p:nvPr>
+            <p:ph type="title"/>
+          </p:nvPr>
+        </p:nvSpPr>
+        <p:spPr>
+          <a:xfrm>
+            <a:off x="437277" y="1966763"/>
+            <a:ext cx="6000845" cy="2444900"/>
+          </a:xfrm>
+        </p:spPr>
+        <p:txBody>
+          <a:bodyPr/>
+          <a:lstStyle/>
+          <a:p>
+            <a:r>
+              <a:rPr lang="de-DE" noProof="0" dirty="0"/>
+              <a:t>Modul 01:</a:t>
+            </a:r>
+            <a:br>
+              <a:rPr lang="de-DE" noProof="0" dirty="0"/>
+            </a:br>
+            <a:r>
+              <a:rPr lang="de-DE" noProof="0" dirty="0"/>
+              <a:t>Überblick/Architektur</a:t>
+            </a:r>
+          </a:p>
+        </p:txBody>
+      </p:sp>
+    </p:spTree>
+    <p:extLst>
+      <p:ext uri="{BB962C8B-B14F-4D97-AF65-F5344CB8AC3E}">
+        <p14:creationId xmlns:p14="http://schemas.microsoft.com/office/powerpoint/2010/main" val="3018641981"/>
+      </p:ext>
+    </p:extLst>
+  </p:cSld>
+  <p:clrMapOvr>
+    <a:masterClrMapping/>
+  </p:clrMapOvr>
+  <p:transition>
+    <p:fade/>
+  </p:transition>
+</p:sld>
+</file>
+
+<file path=ppt/slides/slide30.xml><?xml version="1.0" encoding="utf-8"?>
 <p:sld xmlns:a="http://schemas.openxmlformats.org/drawingml/2006/main" xmlns:r="http://schemas.openxmlformats.org/officeDocument/2006/relationships" xmlns:p="http://schemas.openxmlformats.org/presentationml/2006/main">
   <p:cSld>
     <p:spTree>
@@ -18911,7 +20059,7 @@
 </p:sld>
 </file>
 
-<file path=ppt/slides/slide29.xml><?xml version="1.0" encoding="utf-8"?>
+<file path=ppt/slides/slide31.xml><?xml version="1.0" encoding="utf-8"?>
 <p:sld xmlns:a="http://schemas.openxmlformats.org/drawingml/2006/main" xmlns:r="http://schemas.openxmlformats.org/officeDocument/2006/relationships" xmlns:p="http://schemas.openxmlformats.org/presentationml/2006/main">
   <p:cSld>
     <p:spTree>
@@ -19566,80 +20714,7 @@
 </p:sld>
 </file>
 
-<file path=ppt/slides/slide3.xml><?xml version="1.0" encoding="utf-8"?>
-<p:sld xmlns:a="http://schemas.openxmlformats.org/drawingml/2006/main" xmlns:r="http://schemas.openxmlformats.org/officeDocument/2006/relationships" xmlns:p="http://schemas.openxmlformats.org/presentationml/2006/main">
-  <p:cSld>
-    <p:spTree>
-      <p:nvGrpSpPr>
-        <p:cNvPr id="1" name=""/>
-        <p:cNvGrpSpPr/>
-        <p:nvPr/>
-      </p:nvGrpSpPr>
-      <p:grpSpPr>
-        <a:xfrm>
-          <a:off x="0" y="0"/>
-          <a:ext cx="0" cy="0"/>
-          <a:chOff x="0" y="0"/>
-          <a:chExt cx="0" cy="0"/>
-        </a:xfrm>
-      </p:grpSpPr>
-      <p:sp>
-        <p:nvSpPr>
-          <p:cNvPr id="4" name="Title 3">
-            <a:extLst>
-              <a:ext uri="{FF2B5EF4-FFF2-40B4-BE49-F238E27FC236}">
-                <a16:creationId xmlns:a16="http://schemas.microsoft.com/office/drawing/2014/main" id="{841CB59B-EF9E-4E47-BF33-B8075EB6C7A1}"/>
-              </a:ext>
-            </a:extLst>
-          </p:cNvPr>
-          <p:cNvSpPr>
-            <a:spLocks noGrp="1"/>
-          </p:cNvSpPr>
-          <p:nvPr>
-            <p:ph type="title"/>
-          </p:nvPr>
-        </p:nvSpPr>
-        <p:spPr>
-          <a:xfrm>
-            <a:off x="437277" y="1966763"/>
-            <a:ext cx="6000845" cy="2444900"/>
-          </a:xfrm>
-        </p:spPr>
-        <p:txBody>
-          <a:bodyPr/>
-          <a:lstStyle/>
-          <a:p>
-            <a:r>
-              <a:rPr lang="de-DE" noProof="0" dirty="0"/>
-              <a:t>Modul 01:</a:t>
-            </a:r>
-            <a:br>
-              <a:rPr lang="de-DE" noProof="0" dirty="0"/>
-            </a:br>
-            <a:r>
-              <a:rPr lang="de-DE" noProof="0" dirty="0"/>
-              <a:t>Überblick/Architektur</a:t>
-            </a:r>
-          </a:p>
-        </p:txBody>
-      </p:sp>
-    </p:spTree>
-    <p:extLst>
-      <p:ext uri="{BB962C8B-B14F-4D97-AF65-F5344CB8AC3E}">
-        <p14:creationId xmlns:p14="http://schemas.microsoft.com/office/powerpoint/2010/main" val="3018641981"/>
-      </p:ext>
-    </p:extLst>
-  </p:cSld>
-  <p:clrMapOvr>
-    <a:masterClrMapping/>
-  </p:clrMapOvr>
-  <p:transition>
-    <p:fade/>
-  </p:transition>
-</p:sld>
-</file>
-
-<file path=ppt/slides/slide30.xml><?xml version="1.0" encoding="utf-8"?>
+<file path=ppt/slides/slide32.xml><?xml version="1.0" encoding="utf-8"?>
 <p:sld xmlns:a="http://schemas.openxmlformats.org/drawingml/2006/main" xmlns:r="http://schemas.openxmlformats.org/officeDocument/2006/relationships" xmlns:p="http://schemas.openxmlformats.org/presentationml/2006/main">
   <p:cSld>
     <p:spTree>
@@ -19952,7 +21027,7 @@
 </p:sld>
 </file>
 
-<file path=ppt/slides/slide31.xml><?xml version="1.0" encoding="utf-8"?>
+<file path=ppt/slides/slide33.xml><?xml version="1.0" encoding="utf-8"?>
 <p:sld xmlns:a="http://schemas.openxmlformats.org/drawingml/2006/main" xmlns:r="http://schemas.openxmlformats.org/officeDocument/2006/relationships" xmlns:p="http://schemas.openxmlformats.org/presentationml/2006/main">
   <p:cSld>
     <p:spTree>
@@ -20044,7 +21119,7 @@
 </p:sld>
 </file>
 
-<file path=ppt/slides/slide32.xml><?xml version="1.0" encoding="utf-8"?>
+<file path=ppt/slides/slide34.xml><?xml version="1.0" encoding="utf-8"?>
 <p:sld xmlns:a="http://schemas.openxmlformats.org/drawingml/2006/main" xmlns:r="http://schemas.openxmlformats.org/officeDocument/2006/relationships" xmlns:p="http://schemas.openxmlformats.org/presentationml/2006/main">
   <p:cSld>
     <p:spTree>
@@ -20231,7 +21306,7 @@
 </p:sld>
 </file>
 
-<file path=ppt/slides/slide33.xml><?xml version="1.0" encoding="utf-8"?>
+<file path=ppt/slides/slide35.xml><?xml version="1.0" encoding="utf-8"?>
 <p:sld xmlns:a="http://schemas.openxmlformats.org/drawingml/2006/main" xmlns:r="http://schemas.openxmlformats.org/officeDocument/2006/relationships" xmlns:p="http://schemas.openxmlformats.org/presentationml/2006/main">
   <p:cSld>
     <p:spTree>
@@ -20994,7 +22069,7 @@
 </p:sld>
 </file>
 
-<file path=ppt/slides/slide34.xml><?xml version="1.0" encoding="utf-8"?>
+<file path=ppt/slides/slide36.xml><?xml version="1.0" encoding="utf-8"?>
 <p:sld xmlns:a="http://schemas.openxmlformats.org/drawingml/2006/main" xmlns:r="http://schemas.openxmlformats.org/officeDocument/2006/relationships" xmlns:p="http://schemas.openxmlformats.org/presentationml/2006/main">
   <p:cSld>
     <p:spTree>
@@ -21224,7 +22299,7 @@
 </p:sld>
 </file>
 
-<file path=ppt/slides/slide35.xml><?xml version="1.0" encoding="utf-8"?>
+<file path=ppt/slides/slide37.xml><?xml version="1.0" encoding="utf-8"?>
 <p:sld xmlns:a="http://schemas.openxmlformats.org/drawingml/2006/main" xmlns:r="http://schemas.openxmlformats.org/officeDocument/2006/relationships" xmlns:p="http://schemas.openxmlformats.org/presentationml/2006/main">
   <p:cSld>
     <p:spTree>
@@ -21337,7 +22412,7 @@
 </p:sld>
 </file>
 
-<file path=ppt/slides/slide36.xml><?xml version="1.0" encoding="utf-8"?>
+<file path=ppt/slides/slide38.xml><?xml version="1.0" encoding="utf-8"?>
 <p:sld xmlns:a="http://schemas.openxmlformats.org/drawingml/2006/main" xmlns:r="http://schemas.openxmlformats.org/officeDocument/2006/relationships" xmlns:p="http://schemas.openxmlformats.org/presentationml/2006/main">
   <p:cSld>
     <p:spTree>
@@ -21652,7 +22727,7 @@
 </p:sld>
 </file>
 
-<file path=ppt/slides/slide37.xml><?xml version="1.0" encoding="utf-8"?>
+<file path=ppt/slides/slide39.xml><?xml version="1.0" encoding="utf-8"?>
 <p:sld xmlns:a="http://schemas.openxmlformats.org/drawingml/2006/main" xmlns:r="http://schemas.openxmlformats.org/officeDocument/2006/relationships" xmlns:p="http://schemas.openxmlformats.org/presentationml/2006/main">
   <p:cSld>
     <p:spTree>
@@ -22000,7 +23075,157 @@
 </p:sld>
 </file>
 
-<file path=ppt/slides/slide38.xml><?xml version="1.0" encoding="utf-8"?>
+<file path=ppt/slides/slide4.xml><?xml version="1.0" encoding="utf-8"?>
+<p:sld xmlns:a="http://schemas.openxmlformats.org/drawingml/2006/main" xmlns:r="http://schemas.openxmlformats.org/officeDocument/2006/relationships" xmlns:p="http://schemas.openxmlformats.org/presentationml/2006/main">
+  <p:cSld>
+    <p:spTree>
+      <p:nvGrpSpPr>
+        <p:cNvPr id="1" name=""/>
+        <p:cNvGrpSpPr/>
+        <p:nvPr/>
+      </p:nvGrpSpPr>
+      <p:grpSpPr>
+        <a:xfrm>
+          <a:off x="0" y="0"/>
+          <a:ext cx="0" cy="0"/>
+          <a:chOff x="0" y="0"/>
+          <a:chExt cx="0" cy="0"/>
+        </a:xfrm>
+      </p:grpSpPr>
+      <p:sp>
+        <p:nvSpPr>
+          <p:cNvPr id="9" name="Title 8">
+            <a:extLst>
+              <a:ext uri="{FF2B5EF4-FFF2-40B4-BE49-F238E27FC236}">
+                <a16:creationId xmlns:a16="http://schemas.microsoft.com/office/drawing/2014/main" id="{38119FA4-F7C9-920C-19B6-CA74C5A6C013}"/>
+              </a:ext>
+            </a:extLst>
+          </p:cNvPr>
+          <p:cNvSpPr>
+            <a:spLocks noGrp="1"/>
+          </p:cNvSpPr>
+          <p:nvPr>
+            <p:ph type="title"/>
+          </p:nvPr>
+        </p:nvSpPr>
+        <p:spPr/>
+        <p:txBody>
+          <a:bodyPr/>
+          <a:lstStyle/>
+          <a:p>
+            <a:r>
+              <a:rPr lang="de-DE" noProof="0" dirty="0"/>
+              <a:t>Exchange Online </a:t>
+            </a:r>
+            <a:r>
+              <a:rPr lang="de-DE" noProof="0" dirty="0" err="1"/>
+              <a:t>Protection</a:t>
+            </a:r>
+            <a:r>
+              <a:rPr lang="de-DE" noProof="0" dirty="0"/>
+              <a:t> (EOP) Portfolio</a:t>
+            </a:r>
+          </a:p>
+        </p:txBody>
+      </p:sp>
+      <p:sp>
+        <p:nvSpPr>
+          <p:cNvPr id="24" name="Text Placeholder 23">
+            <a:extLst>
+              <a:ext uri="{FF2B5EF4-FFF2-40B4-BE49-F238E27FC236}">
+                <a16:creationId xmlns:a16="http://schemas.microsoft.com/office/drawing/2014/main" id="{0ED4F7FF-5C75-5FE1-619E-FAF399231CA1}"/>
+              </a:ext>
+            </a:extLst>
+          </p:cNvPr>
+          <p:cNvSpPr>
+            <a:spLocks noGrp="1"/>
+          </p:cNvSpPr>
+          <p:nvPr>
+            <p:ph type="body" sz="quarter" idx="10"/>
+          </p:nvPr>
+        </p:nvSpPr>
+        <p:spPr>
+          <a:xfrm>
+            <a:off x="595915" y="1464075"/>
+            <a:ext cx="11239464" cy="2348143"/>
+          </a:xfrm>
+        </p:spPr>
+        <p:txBody>
+          <a:bodyPr/>
+          <a:lstStyle/>
+          <a:p>
+            <a:r>
+              <a:rPr lang="de-DE" noProof="0" dirty="0"/>
+              <a:t>Email Hygiene in der Microsoft 365 Cloud</a:t>
+            </a:r>
+          </a:p>
+          <a:p>
+            <a:r>
+              <a:rPr lang="de-DE" noProof="0" dirty="0"/>
+              <a:t>Lösung für mehrere Szenarien</a:t>
+            </a:r>
+          </a:p>
+          <a:p>
+            <a:pPr lvl="1"/>
+            <a:r>
+              <a:rPr lang="de-DE" noProof="0" dirty="0"/>
+              <a:t>Nur Exchange Online Postfächer</a:t>
+            </a:r>
+          </a:p>
+          <a:p>
+            <a:pPr lvl="1"/>
+            <a:r>
+              <a:rPr lang="de-DE" noProof="0" dirty="0"/>
+              <a:t>Hybrid Umgebungen</a:t>
+            </a:r>
+          </a:p>
+          <a:p>
+            <a:pPr lvl="1"/>
+            <a:r>
+              <a:rPr lang="de-DE" noProof="0" dirty="0"/>
+              <a:t>Nur Exchange On </a:t>
+            </a:r>
+            <a:r>
+              <a:rPr lang="de-DE" noProof="0" dirty="0" err="1"/>
+              <a:t>Premises</a:t>
+            </a:r>
+            <a:r>
+              <a:rPr lang="de-DE" noProof="0" dirty="0"/>
+              <a:t> Postfächer</a:t>
+            </a:r>
+          </a:p>
+          <a:p>
+            <a:r>
+              <a:rPr lang="de-DE" noProof="0" dirty="0"/>
+              <a:t>Funktionen abhängig von der Lizenz</a:t>
+            </a:r>
+          </a:p>
+          <a:p>
+            <a:pPr lvl="1"/>
+            <a:r>
+              <a:rPr lang="de-DE" noProof="0" dirty="0"/>
+              <a:t>Wichtig! Unterscheidung zwischen „EOP“ und „Microsoft Defender for Office 365“</a:t>
+            </a:r>
+          </a:p>
+        </p:txBody>
+      </p:sp>
+    </p:spTree>
+    <p:extLst>
+      <p:ext uri="{BB962C8B-B14F-4D97-AF65-F5344CB8AC3E}">
+        <p14:creationId xmlns:p14="http://schemas.microsoft.com/office/powerpoint/2010/main" val="2886627387"/>
+      </p:ext>
+    </p:extLst>
+  </p:cSld>
+  <p:clrMapOvr>
+    <a:masterClrMapping/>
+  </p:clrMapOvr>
+  <p:transition>
+    <p:fade/>
+  </p:transition>
+</p:sld>
+</file>
+
+<file path=ppt/slides/slide40.xml><?xml version="1.0" encoding="utf-8"?>
 <p:sld xmlns:a="http://schemas.openxmlformats.org/drawingml/2006/main" xmlns:r="http://schemas.openxmlformats.org/officeDocument/2006/relationships" xmlns:p="http://schemas.openxmlformats.org/presentationml/2006/main">
   <p:cSld>
     <p:spTree>
@@ -22232,7 +23457,7 @@
 </p:sld>
 </file>
 
-<file path=ppt/slides/slide39.xml><?xml version="1.0" encoding="utf-8"?>
+<file path=ppt/slides/slide41.xml><?xml version="1.0" encoding="utf-8"?>
 <p:sld xmlns:a="http://schemas.openxmlformats.org/drawingml/2006/main" xmlns:r="http://schemas.openxmlformats.org/officeDocument/2006/relationships" xmlns:p="http://schemas.openxmlformats.org/presentationml/2006/main">
   <p:cSld>
     <p:spTree>
@@ -22328,157 +23553,7 @@
 </p:sld>
 </file>
 
-<file path=ppt/slides/slide4.xml><?xml version="1.0" encoding="utf-8"?>
-<p:sld xmlns:a="http://schemas.openxmlformats.org/drawingml/2006/main" xmlns:r="http://schemas.openxmlformats.org/officeDocument/2006/relationships" xmlns:p="http://schemas.openxmlformats.org/presentationml/2006/main">
-  <p:cSld>
-    <p:spTree>
-      <p:nvGrpSpPr>
-        <p:cNvPr id="1" name=""/>
-        <p:cNvGrpSpPr/>
-        <p:nvPr/>
-      </p:nvGrpSpPr>
-      <p:grpSpPr>
-        <a:xfrm>
-          <a:off x="0" y="0"/>
-          <a:ext cx="0" cy="0"/>
-          <a:chOff x="0" y="0"/>
-          <a:chExt cx="0" cy="0"/>
-        </a:xfrm>
-      </p:grpSpPr>
-      <p:sp>
-        <p:nvSpPr>
-          <p:cNvPr id="9" name="Title 8">
-            <a:extLst>
-              <a:ext uri="{FF2B5EF4-FFF2-40B4-BE49-F238E27FC236}">
-                <a16:creationId xmlns:a16="http://schemas.microsoft.com/office/drawing/2014/main" id="{38119FA4-F7C9-920C-19B6-CA74C5A6C013}"/>
-              </a:ext>
-            </a:extLst>
-          </p:cNvPr>
-          <p:cNvSpPr>
-            <a:spLocks noGrp="1"/>
-          </p:cNvSpPr>
-          <p:nvPr>
-            <p:ph type="title"/>
-          </p:nvPr>
-        </p:nvSpPr>
-        <p:spPr/>
-        <p:txBody>
-          <a:bodyPr/>
-          <a:lstStyle/>
-          <a:p>
-            <a:r>
-              <a:rPr lang="de-DE" noProof="0" dirty="0"/>
-              <a:t>Exchange Online </a:t>
-            </a:r>
-            <a:r>
-              <a:rPr lang="de-DE" noProof="0" dirty="0" err="1"/>
-              <a:t>Protection</a:t>
-            </a:r>
-            <a:r>
-              <a:rPr lang="de-DE" noProof="0" dirty="0"/>
-              <a:t> (EOP) Portfolio</a:t>
-            </a:r>
-          </a:p>
-        </p:txBody>
-      </p:sp>
-      <p:sp>
-        <p:nvSpPr>
-          <p:cNvPr id="24" name="Text Placeholder 23">
-            <a:extLst>
-              <a:ext uri="{FF2B5EF4-FFF2-40B4-BE49-F238E27FC236}">
-                <a16:creationId xmlns:a16="http://schemas.microsoft.com/office/drawing/2014/main" id="{0ED4F7FF-5C75-5FE1-619E-FAF399231CA1}"/>
-              </a:ext>
-            </a:extLst>
-          </p:cNvPr>
-          <p:cNvSpPr>
-            <a:spLocks noGrp="1"/>
-          </p:cNvSpPr>
-          <p:nvPr>
-            <p:ph type="body" sz="quarter" idx="10"/>
-          </p:nvPr>
-        </p:nvSpPr>
-        <p:spPr>
-          <a:xfrm>
-            <a:off x="595915" y="1464075"/>
-            <a:ext cx="11239464" cy="2348143"/>
-          </a:xfrm>
-        </p:spPr>
-        <p:txBody>
-          <a:bodyPr/>
-          <a:lstStyle/>
-          <a:p>
-            <a:r>
-              <a:rPr lang="de-DE" noProof="0" dirty="0"/>
-              <a:t>Email Hygiene in der Microsoft 365 Cloud</a:t>
-            </a:r>
-          </a:p>
-          <a:p>
-            <a:r>
-              <a:rPr lang="de-DE" noProof="0" dirty="0"/>
-              <a:t>Lösung für mehrere Szenarien</a:t>
-            </a:r>
-          </a:p>
-          <a:p>
-            <a:pPr lvl="1"/>
-            <a:r>
-              <a:rPr lang="de-DE" noProof="0" dirty="0"/>
-              <a:t>Nur Exchange Online Postfächer</a:t>
-            </a:r>
-          </a:p>
-          <a:p>
-            <a:pPr lvl="1"/>
-            <a:r>
-              <a:rPr lang="de-DE" noProof="0" dirty="0"/>
-              <a:t>Hybrid Umgebungen</a:t>
-            </a:r>
-          </a:p>
-          <a:p>
-            <a:pPr lvl="1"/>
-            <a:r>
-              <a:rPr lang="de-DE" noProof="0" dirty="0"/>
-              <a:t>Nur Exchange On </a:t>
-            </a:r>
-            <a:r>
-              <a:rPr lang="de-DE" noProof="0" dirty="0" err="1"/>
-              <a:t>Premises</a:t>
-            </a:r>
-            <a:r>
-              <a:rPr lang="de-DE" noProof="0" dirty="0"/>
-              <a:t> Postfächer</a:t>
-            </a:r>
-          </a:p>
-          <a:p>
-            <a:r>
-              <a:rPr lang="de-DE" noProof="0" dirty="0"/>
-              <a:t>Funktionen abhängig von der Lizenz</a:t>
-            </a:r>
-          </a:p>
-          <a:p>
-            <a:pPr lvl="1"/>
-            <a:r>
-              <a:rPr lang="de-DE" noProof="0" dirty="0"/>
-              <a:t>Wichtig! Unterscheidung zwischen „EOP“ und „Microsoft Defender for Office 365“</a:t>
-            </a:r>
-          </a:p>
-        </p:txBody>
-      </p:sp>
-    </p:spTree>
-    <p:extLst>
-      <p:ext uri="{BB962C8B-B14F-4D97-AF65-F5344CB8AC3E}">
-        <p14:creationId xmlns:p14="http://schemas.microsoft.com/office/powerpoint/2010/main" val="2886627387"/>
-      </p:ext>
-    </p:extLst>
-  </p:cSld>
-  <p:clrMapOvr>
-    <a:masterClrMapping/>
-  </p:clrMapOvr>
-  <p:transition>
-    <p:fade/>
-  </p:transition>
-</p:sld>
-</file>
-
-<file path=ppt/slides/slide40.xml><?xml version="1.0" encoding="utf-8"?>
+<file path=ppt/slides/slide42.xml><?xml version="1.0" encoding="utf-8"?>
 <p:sld xmlns:a="http://schemas.openxmlformats.org/drawingml/2006/main" xmlns:r="http://schemas.openxmlformats.org/officeDocument/2006/relationships" xmlns:p="http://schemas.openxmlformats.org/presentationml/2006/main">
   <p:cSld>
     <p:spTree>
@@ -22868,6 +23943,530 @@
     <p:extLst>
       <p:ext uri="{BB962C8B-B14F-4D97-AF65-F5344CB8AC3E}">
         <p14:creationId xmlns:p14="http://schemas.microsoft.com/office/powerpoint/2010/main" val="1252773324"/>
+      </p:ext>
+    </p:extLst>
+  </p:cSld>
+  <p:clrMapOvr>
+    <a:masterClrMapping/>
+  </p:clrMapOvr>
+  <p:transition>
+    <p:fade/>
+  </p:transition>
+</p:sld>
+</file>
+
+<file path=ppt/slides/slide43.xml><?xml version="1.0" encoding="utf-8"?>
+<p:sld xmlns:a="http://schemas.openxmlformats.org/drawingml/2006/main" xmlns:r="http://schemas.openxmlformats.org/officeDocument/2006/relationships" xmlns:p="http://schemas.openxmlformats.org/presentationml/2006/main">
+  <p:cSld>
+    <p:spTree>
+      <p:nvGrpSpPr>
+        <p:cNvPr id="1" name=""/>
+        <p:cNvGrpSpPr/>
+        <p:nvPr/>
+      </p:nvGrpSpPr>
+      <p:grpSpPr>
+        <a:xfrm>
+          <a:off x="0" y="0"/>
+          <a:ext cx="0" cy="0"/>
+          <a:chOff x="0" y="0"/>
+          <a:chExt cx="0" cy="0"/>
+        </a:xfrm>
+      </p:grpSpPr>
+      <p:sp>
+        <p:nvSpPr>
+          <p:cNvPr id="2" name="Title 1">
+            <a:extLst>
+              <a:ext uri="{FF2B5EF4-FFF2-40B4-BE49-F238E27FC236}">
+                <a16:creationId xmlns:a16="http://schemas.microsoft.com/office/drawing/2014/main" id="{F968B895-DCA8-639C-EA1A-6FFCA8C04327}"/>
+              </a:ext>
+            </a:extLst>
+          </p:cNvPr>
+          <p:cNvSpPr>
+            <a:spLocks noGrp="1"/>
+          </p:cNvSpPr>
+          <p:nvPr>
+            <p:ph type="title"/>
+          </p:nvPr>
+        </p:nvSpPr>
+        <p:spPr>
+          <a:xfrm>
+            <a:off x="600059" y="519291"/>
+            <a:ext cx="11239464" cy="439479"/>
+          </a:xfrm>
+        </p:spPr>
+        <p:txBody>
+          <a:bodyPr/>
+          <a:lstStyle/>
+          <a:p>
+            <a:r>
+              <a:rPr lang="de-DE" dirty="0"/>
+              <a:t>Brand </a:t>
+            </a:r>
+            <a:r>
+              <a:rPr lang="de-DE" dirty="0" err="1"/>
+              <a:t>Indicators</a:t>
+            </a:r>
+            <a:r>
+              <a:rPr lang="de-DE" dirty="0"/>
+              <a:t> for Message </a:t>
+            </a:r>
+            <a:r>
+              <a:rPr lang="de-DE" dirty="0" err="1"/>
+              <a:t>Identification</a:t>
+            </a:r>
+            <a:r>
+              <a:rPr lang="de-DE" dirty="0"/>
+              <a:t> (BIMI)</a:t>
+            </a:r>
+          </a:p>
+        </p:txBody>
+      </p:sp>
+      <p:sp>
+        <p:nvSpPr>
+          <p:cNvPr id="3" name="Text Placeholder 2">
+            <a:extLst>
+              <a:ext uri="{FF2B5EF4-FFF2-40B4-BE49-F238E27FC236}">
+                <a16:creationId xmlns:a16="http://schemas.microsoft.com/office/drawing/2014/main" id="{E60EC72F-FF53-0FDD-688D-6B55C0057B96}"/>
+              </a:ext>
+            </a:extLst>
+          </p:cNvPr>
+          <p:cNvSpPr>
+            <a:spLocks noGrp="1"/>
+          </p:cNvSpPr>
+          <p:nvPr>
+            <p:ph type="body" sz="quarter" idx="10"/>
+          </p:nvPr>
+        </p:nvSpPr>
+        <p:spPr>
+          <a:xfrm>
+            <a:off x="595915" y="1464075"/>
+            <a:ext cx="11239464" cy="4759060"/>
+          </a:xfrm>
+        </p:spPr>
+        <p:txBody>
+          <a:bodyPr/>
+          <a:lstStyle/>
+          <a:p>
+            <a:r>
+              <a:rPr lang="de-DE" dirty="0"/>
+              <a:t>Anzeige von Firmenlogos in der Kopfzeile einer Nachricht</a:t>
+            </a:r>
+          </a:p>
+          <a:p>
+            <a:r>
+              <a:rPr lang="de-DE" dirty="0"/>
+              <a:t>Weitere Maßnahme, um Phishing zu reduzieren</a:t>
+            </a:r>
+          </a:p>
+          <a:p>
+            <a:r>
+              <a:rPr lang="de-DE" dirty="0"/>
+              <a:t>Erfordert, dass SPF/DKIM/DMARC konfiguriert sind!</a:t>
+            </a:r>
+          </a:p>
+          <a:p>
+            <a:endParaRPr lang="de-DE" dirty="0"/>
+          </a:p>
+          <a:p>
+            <a:r>
+              <a:rPr lang="de-DE" b="1" dirty="0"/>
+              <a:t>Implementierung</a:t>
+            </a:r>
+            <a:r>
+              <a:rPr lang="de-DE" dirty="0"/>
+              <a:t>:</a:t>
+            </a:r>
+          </a:p>
+          <a:p>
+            <a:r>
+              <a:rPr lang="de-DE" dirty="0"/>
+              <a:t>Firma erzeugt </a:t>
+            </a:r>
+            <a:r>
+              <a:rPr lang="de-DE" u="sng" dirty="0"/>
+              <a:t>SVG</a:t>
+            </a:r>
+            <a:r>
+              <a:rPr lang="de-DE" dirty="0"/>
+              <a:t>-Datei ihres Logos nach </a:t>
+            </a:r>
+            <a:r>
+              <a:rPr lang="de-AT" b="0" i="0" u="none" strike="noStrike" dirty="0">
+                <a:solidFill>
+                  <a:srgbClr val="2EA3F2"/>
+                </a:solidFill>
+                <a:effectLst/>
+                <a:latin typeface="Open Sans" panose="020B0606030504020204" pitchFamily="34" charset="0"/>
+                <a:hlinkClick r:id="rId2"/>
+              </a:rPr>
+              <a:t>Tiny PS </a:t>
+            </a:r>
+            <a:r>
+              <a:rPr lang="de-AT" b="0" i="0" u="none" strike="noStrike" dirty="0" err="1">
+                <a:solidFill>
+                  <a:srgbClr val="2EA3F2"/>
+                </a:solidFill>
+                <a:effectLst/>
+                <a:latin typeface="Open Sans" panose="020B0606030504020204" pitchFamily="34" charset="0"/>
+                <a:hlinkClick r:id="rId2"/>
+              </a:rPr>
+              <a:t>Specification</a:t>
+            </a:r>
+            <a:endParaRPr lang="de-DE" dirty="0"/>
+          </a:p>
+          <a:p>
+            <a:r>
+              <a:rPr lang="de-DE" dirty="0"/>
+              <a:t>SVG-Datei wird mittels </a:t>
+            </a:r>
+            <a:r>
+              <a:rPr lang="de-AT" b="1" i="0" dirty="0" err="1">
+                <a:solidFill>
+                  <a:srgbClr val="333333"/>
+                </a:solidFill>
+                <a:effectLst/>
+                <a:latin typeface="SegoeUI"/>
+              </a:rPr>
+              <a:t>Verified</a:t>
+            </a:r>
+            <a:r>
+              <a:rPr lang="de-AT" b="1" i="0" dirty="0">
+                <a:solidFill>
+                  <a:srgbClr val="333333"/>
+                </a:solidFill>
+                <a:effectLst/>
+                <a:latin typeface="SegoeUI"/>
+              </a:rPr>
+              <a:t> Mark Certificate </a:t>
+            </a:r>
+            <a:r>
+              <a:rPr lang="de-AT" b="0" i="0" dirty="0">
+                <a:solidFill>
+                  <a:srgbClr val="333333"/>
+                </a:solidFill>
+                <a:effectLst/>
+                <a:latin typeface="SegoeUI"/>
+              </a:rPr>
+              <a:t>(VMC) </a:t>
+            </a:r>
+            <a:r>
+              <a:rPr lang="de-DE" dirty="0"/>
+              <a:t>in Zertifikat eingebettet</a:t>
+            </a:r>
+          </a:p>
+          <a:p>
+            <a:pPr lvl="1"/>
+            <a:r>
+              <a:rPr lang="de-DE" dirty="0"/>
+              <a:t>Verhindert Spoofing</a:t>
+            </a:r>
+          </a:p>
+          <a:p>
+            <a:r>
+              <a:rPr lang="de-DE" dirty="0"/>
+              <a:t>DNS TXT </a:t>
+            </a:r>
+            <a:r>
+              <a:rPr lang="de-DE" dirty="0" err="1"/>
+              <a:t>Record</a:t>
+            </a:r>
+            <a:r>
+              <a:rPr lang="de-DE" dirty="0"/>
+              <a:t> publizieren: </a:t>
+            </a:r>
+            <a:r>
+              <a:rPr lang="de-DE" dirty="0">
+                <a:solidFill>
+                  <a:srgbClr val="C00000"/>
+                </a:solidFill>
+              </a:rPr>
+              <a:t>default._bimi</a:t>
+            </a:r>
+            <a:r>
+              <a:rPr lang="de-DE" dirty="0"/>
+              <a:t>.myetc.at </a:t>
+            </a:r>
+          </a:p>
+          <a:p>
+            <a:endParaRPr lang="de-DE" dirty="0"/>
+          </a:p>
+          <a:p>
+            <a:endParaRPr lang="de-DE" dirty="0"/>
+          </a:p>
+          <a:p>
+            <a:endParaRPr lang="de-DE" dirty="0"/>
+          </a:p>
+          <a:p>
+            <a:r>
+              <a:rPr lang="de-DE" dirty="0"/>
+              <a:t>Derzeit keine Unterstützung für eingehende Nachrichten bei Microsoft (kein ETA)</a:t>
+            </a:r>
+          </a:p>
+        </p:txBody>
+      </p:sp>
+      <p:pic>
+        <p:nvPicPr>
+          <p:cNvPr id="6" name="Picture 5">
+            <a:extLst>
+              <a:ext uri="{FF2B5EF4-FFF2-40B4-BE49-F238E27FC236}">
+                <a16:creationId xmlns:a16="http://schemas.microsoft.com/office/drawing/2014/main" id="{39FF2361-1F13-4937-A9D3-89F7CFBD1317}"/>
+              </a:ext>
+            </a:extLst>
+          </p:cNvPr>
+          <p:cNvPicPr>
+            <a:picLocks noChangeAspect="1"/>
+          </p:cNvPicPr>
+          <p:nvPr/>
+        </p:nvPicPr>
+        <p:blipFill>
+          <a:blip r:embed="rId3"/>
+          <a:stretch>
+            <a:fillRect/>
+          </a:stretch>
+        </p:blipFill>
+        <p:spPr>
+          <a:xfrm>
+            <a:off x="8997697" y="1137990"/>
+            <a:ext cx="2476067" cy="2359272"/>
+          </a:xfrm>
+          <a:prstGeom prst="rect">
+            <a:avLst/>
+          </a:prstGeom>
+        </p:spPr>
+      </p:pic>
+      <p:grpSp>
+        <p:nvGrpSpPr>
+          <p:cNvPr id="14" name="Group 13">
+            <a:extLst>
+              <a:ext uri="{FF2B5EF4-FFF2-40B4-BE49-F238E27FC236}">
+                <a16:creationId xmlns:a16="http://schemas.microsoft.com/office/drawing/2014/main" id="{DC3D91C7-A063-6300-A473-CF9EE2A8CEEC}"/>
+              </a:ext>
+            </a:extLst>
+          </p:cNvPr>
+          <p:cNvGrpSpPr/>
+          <p:nvPr/>
+        </p:nvGrpSpPr>
+        <p:grpSpPr>
+          <a:xfrm>
+            <a:off x="957529" y="4802568"/>
+            <a:ext cx="10516235" cy="811094"/>
+            <a:chOff x="957529" y="5259768"/>
+            <a:chExt cx="10516235" cy="811094"/>
+          </a:xfrm>
+        </p:grpSpPr>
+        <p:sp>
+          <p:nvSpPr>
+            <p:cNvPr id="7" name="TextBox 6">
+              <a:extLst>
+                <a:ext uri="{FF2B5EF4-FFF2-40B4-BE49-F238E27FC236}">
+                  <a16:creationId xmlns:a16="http://schemas.microsoft.com/office/drawing/2014/main" id="{30729CDA-0D00-76A3-D211-3C98CF5CBED5}"/>
+                </a:ext>
+              </a:extLst>
+            </p:cNvPr>
+            <p:cNvSpPr txBox="1"/>
+            <p:nvPr/>
+          </p:nvSpPr>
+          <p:spPr>
+            <a:xfrm>
+              <a:off x="957529" y="5259768"/>
+              <a:ext cx="10516235" cy="369332"/>
+            </a:xfrm>
+            <a:prstGeom prst="rect">
+              <a:avLst/>
+            </a:prstGeom>
+            <a:noFill/>
+          </p:spPr>
+          <p:txBody>
+            <a:bodyPr wrap="square" lIns="0" tIns="0" rIns="0" bIns="0" rtlCol="0">
+              <a:spAutoFit/>
+            </a:bodyPr>
+            <a:lstStyle/>
+            <a:p>
+              <a:r>
+                <a:rPr lang="de-DE" sz="2400" dirty="0"/>
+                <a:t>“v=BIMI1;</a:t>
+              </a:r>
+              <a:r>
+                <a:rPr lang="de-DE" sz="2400" dirty="0">
+                  <a:solidFill>
+                    <a:srgbClr val="339933"/>
+                  </a:solidFill>
+                </a:rPr>
+                <a:t>l=https://myetc.at/</a:t>
+              </a:r>
+              <a:r>
+                <a:rPr lang="de-DE" sz="2400" dirty="0" err="1">
+                  <a:solidFill>
+                    <a:srgbClr val="339933"/>
+                  </a:solidFill>
+                </a:rPr>
+                <a:t>bimi</a:t>
+              </a:r>
+              <a:r>
+                <a:rPr lang="de-DE" sz="2400" dirty="0">
+                  <a:solidFill>
+                    <a:srgbClr val="339933"/>
+                  </a:solidFill>
+                </a:rPr>
+                <a:t>/</a:t>
+              </a:r>
+              <a:r>
+                <a:rPr lang="de-DE" sz="2400" dirty="0" err="1">
+                  <a:solidFill>
+                    <a:srgbClr val="339933"/>
+                  </a:solidFill>
+                </a:rPr>
+                <a:t>logo.svg</a:t>
+              </a:r>
+              <a:r>
+                <a:rPr lang="de-DE" sz="2400" dirty="0" err="1"/>
+                <a:t>;</a:t>
+              </a:r>
+              <a:r>
+                <a:rPr lang="de-DE" sz="2400" dirty="0" err="1">
+                  <a:solidFill>
+                    <a:srgbClr val="FF0000"/>
+                  </a:solidFill>
+                </a:rPr>
+                <a:t>a</a:t>
+              </a:r>
+              <a:r>
+                <a:rPr lang="de-DE" sz="2400" dirty="0">
+                  <a:solidFill>
+                    <a:srgbClr val="FF0000"/>
+                  </a:solidFill>
+                </a:rPr>
+                <a:t>=https://myetc.at/</a:t>
+              </a:r>
+              <a:r>
+                <a:rPr lang="de-DE" sz="2400" dirty="0" err="1">
+                  <a:solidFill>
+                    <a:srgbClr val="FF0000"/>
+                  </a:solidFill>
+                </a:rPr>
+                <a:t>bimi</a:t>
+              </a:r>
+              <a:r>
+                <a:rPr lang="de-DE" sz="2400" dirty="0">
+                  <a:solidFill>
+                    <a:srgbClr val="FF0000"/>
+                  </a:solidFill>
+                </a:rPr>
+                <a:t>/</a:t>
+              </a:r>
+              <a:r>
+                <a:rPr lang="de-DE" sz="2400" dirty="0" err="1">
+                  <a:solidFill>
+                    <a:srgbClr val="FF0000"/>
+                  </a:solidFill>
+                </a:rPr>
+                <a:t>logo.pem</a:t>
+              </a:r>
+              <a:r>
+                <a:rPr lang="de-DE" sz="2400" dirty="0"/>
+                <a:t>“</a:t>
+              </a:r>
+            </a:p>
+          </p:txBody>
+        </p:sp>
+        <p:sp>
+          <p:nvSpPr>
+            <p:cNvPr id="8" name="TextBox 7">
+              <a:extLst>
+                <a:ext uri="{FF2B5EF4-FFF2-40B4-BE49-F238E27FC236}">
+                  <a16:creationId xmlns:a16="http://schemas.microsoft.com/office/drawing/2014/main" id="{40A36FAD-426D-2D70-C661-34186B1E5EB4}"/>
+                </a:ext>
+              </a:extLst>
+            </p:cNvPr>
+            <p:cNvSpPr txBox="1"/>
+            <p:nvPr/>
+          </p:nvSpPr>
+          <p:spPr>
+            <a:xfrm>
+              <a:off x="8311897" y="5763085"/>
+              <a:ext cx="2734056" cy="307777"/>
+            </a:xfrm>
+            <a:prstGeom prst="rect">
+              <a:avLst/>
+            </a:prstGeom>
+            <a:noFill/>
+          </p:spPr>
+          <p:txBody>
+            <a:bodyPr wrap="square" lIns="0" tIns="0" rIns="0" bIns="0" rtlCol="0">
+              <a:spAutoFit/>
+            </a:bodyPr>
+            <a:lstStyle/>
+            <a:p>
+              <a:pPr algn="l"/>
+              <a:r>
+                <a:rPr lang="de-DE" sz="2000" dirty="0" err="1">
+                  <a:solidFill>
+                    <a:srgbClr val="FF0000"/>
+                  </a:solidFill>
+                </a:rPr>
+                <a:t>Verified</a:t>
+              </a:r>
+              <a:r>
+                <a:rPr lang="de-DE" sz="2000" dirty="0">
+                  <a:solidFill>
+                    <a:srgbClr val="FF0000"/>
+                  </a:solidFill>
+                </a:rPr>
+                <a:t> Mark Certificate</a:t>
+              </a:r>
+            </a:p>
+          </p:txBody>
+        </p:sp>
+        <p:cxnSp>
+          <p:nvCxnSpPr>
+            <p:cNvPr id="10" name="Straight Arrow Connector 9">
+              <a:extLst>
+                <a:ext uri="{FF2B5EF4-FFF2-40B4-BE49-F238E27FC236}">
+                  <a16:creationId xmlns:a16="http://schemas.microsoft.com/office/drawing/2014/main" id="{5DD382CE-C1DD-E5D9-5976-606E47C624A1}"/>
+                </a:ext>
+              </a:extLst>
+            </p:cNvPr>
+            <p:cNvCxnSpPr>
+              <a:cxnSpLocks/>
+            </p:cNvCxnSpPr>
+            <p:nvPr/>
+          </p:nvCxnSpPr>
+          <p:spPr>
+            <a:xfrm flipH="1" flipV="1">
+              <a:off x="7781544" y="5629100"/>
+              <a:ext cx="484632" cy="305356"/>
+            </a:xfrm>
+            <a:prstGeom prst="straightConnector1">
+              <a:avLst/>
+            </a:prstGeom>
+            <a:ln>
+              <a:solidFill>
+                <a:srgbClr val="FF0000"/>
+              </a:solidFill>
+              <a:headEnd type="none" w="lg" len="med"/>
+              <a:tailEnd type="triangle"/>
+            </a:ln>
+          </p:spPr>
+          <p:style>
+            <a:lnRef idx="1">
+              <a:schemeClr val="accent1"/>
+            </a:lnRef>
+            <a:fillRef idx="0">
+              <a:schemeClr val="accent1"/>
+            </a:fillRef>
+            <a:effectRef idx="0">
+              <a:schemeClr val="accent1"/>
+            </a:effectRef>
+            <a:fontRef idx="minor">
+              <a:schemeClr val="tx1"/>
+            </a:fontRef>
+          </p:style>
+        </p:cxnSp>
+      </p:grpSp>
+    </p:spTree>
+    <p:extLst>
+      <p:ext uri="{BB962C8B-B14F-4D97-AF65-F5344CB8AC3E}">
+        <p14:creationId xmlns:p14="http://schemas.microsoft.com/office/powerpoint/2010/main" val="3030276542"/>
       </p:ext>
     </p:extLst>
   </p:cSld>

</xml_diff>

<commit_message>
Updates to slide deck
</commit_message>
<xml_diff>
--- a/SMEXOP/SMEXOP_V1.0.pptx
+++ b/SMEXOP/SMEXOP_V1.0.pptx
@@ -5,7 +5,7 @@
     <p:sldMasterId id="2147484821" r:id="rId4"/>
   </p:sldMasterIdLst>
   <p:notesMasterIdLst>
-    <p:notesMasterId r:id="rId48"/>
+    <p:notesMasterId r:id="rId44"/>
   </p:notesMasterIdLst>
   <p:sldIdLst>
     <p:sldId id="1758" r:id="rId5"/>
@@ -27,63 +27,59 @@
     <p:sldId id="1985" r:id="rId21"/>
     <p:sldId id="1842" r:id="rId22"/>
     <p:sldId id="1979" r:id="rId23"/>
-    <p:sldId id="1987" r:id="rId24"/>
-    <p:sldId id="1978" r:id="rId25"/>
-    <p:sldId id="1986" r:id="rId26"/>
-    <p:sldId id="1989" r:id="rId27"/>
-    <p:sldId id="2008" r:id="rId28"/>
-    <p:sldId id="2009" r:id="rId29"/>
-    <p:sldId id="1980" r:id="rId30"/>
-    <p:sldId id="1991" r:id="rId31"/>
-    <p:sldId id="1992" r:id="rId32"/>
-    <p:sldId id="1993" r:id="rId33"/>
-    <p:sldId id="1981" r:id="rId34"/>
-    <p:sldId id="2004" r:id="rId35"/>
-    <p:sldId id="2003" r:id="rId36"/>
-    <p:sldId id="1997" r:id="rId37"/>
-    <p:sldId id="1995" r:id="rId38"/>
-    <p:sldId id="1984" r:id="rId39"/>
-    <p:sldId id="2005" r:id="rId40"/>
-    <p:sldId id="1998" r:id="rId41"/>
-    <p:sldId id="1982" r:id="rId42"/>
-    <p:sldId id="1999" r:id="rId43"/>
-    <p:sldId id="1983" r:id="rId44"/>
-    <p:sldId id="2000" r:id="rId45"/>
-    <p:sldId id="2006" r:id="rId46"/>
-    <p:sldId id="2007" r:id="rId47"/>
+    <p:sldId id="1989" r:id="rId24"/>
+    <p:sldId id="1987" r:id="rId25"/>
+    <p:sldId id="1978" r:id="rId26"/>
+    <p:sldId id="1986" r:id="rId27"/>
+    <p:sldId id="1980" r:id="rId28"/>
+    <p:sldId id="1991" r:id="rId29"/>
+    <p:sldId id="1992" r:id="rId30"/>
+    <p:sldId id="1993" r:id="rId31"/>
+    <p:sldId id="1981" r:id="rId32"/>
+    <p:sldId id="2004" r:id="rId33"/>
+    <p:sldId id="2003" r:id="rId34"/>
+    <p:sldId id="1997" r:id="rId35"/>
+    <p:sldId id="1995" r:id="rId36"/>
+    <p:sldId id="1984" r:id="rId37"/>
+    <p:sldId id="2005" r:id="rId38"/>
+    <p:sldId id="1998" r:id="rId39"/>
+    <p:sldId id="1982" r:id="rId40"/>
+    <p:sldId id="1999" r:id="rId41"/>
+    <p:sldId id="1983" r:id="rId42"/>
+    <p:sldId id="2000" r:id="rId43"/>
   </p:sldIdLst>
   <p:sldSz cx="12436475" cy="6994525"/>
   <p:notesSz cx="6858000" cy="9144000"/>
   <p:embeddedFontLst>
     <p:embeddedFont>
       <p:font typeface="Consolas" panose="020B0609020204030204" pitchFamily="49" charset="0"/>
-      <p:regular r:id="rId49"/>
-      <p:bold r:id="rId50"/>
-      <p:italic r:id="rId51"/>
-      <p:boldItalic r:id="rId52"/>
+      <p:regular r:id="rId45"/>
+      <p:bold r:id="rId46"/>
+      <p:italic r:id="rId47"/>
+      <p:boldItalic r:id="rId48"/>
     </p:embeddedFont>
     <p:embeddedFont>
       <p:font typeface="Lucida Console" panose="020B0609040504020204" pitchFamily="49" charset="0"/>
-      <p:regular r:id="rId53"/>
+      <p:regular r:id="rId49"/>
     </p:embeddedFont>
     <p:embeddedFont>
       <p:font typeface="Open Sans" panose="020B0606030504020204" pitchFamily="34" charset="0"/>
+      <p:regular r:id="rId50"/>
+      <p:bold r:id="rId51"/>
+      <p:italic r:id="rId52"/>
+      <p:boldItalic r:id="rId53"/>
+    </p:embeddedFont>
+    <p:embeddedFont>
+      <p:font typeface="Segoe UI" panose="020B0502040204020203" pitchFamily="34" charset="0"/>
       <p:regular r:id="rId54"/>
       <p:bold r:id="rId55"/>
       <p:italic r:id="rId56"/>
       <p:boldItalic r:id="rId57"/>
     </p:embeddedFont>
     <p:embeddedFont>
-      <p:font typeface="Segoe UI" panose="020B0502040204020203" pitchFamily="34" charset="0"/>
-      <p:regular r:id="rId58"/>
-      <p:bold r:id="rId59"/>
-      <p:italic r:id="rId60"/>
-      <p:boldItalic r:id="rId61"/>
-    </p:embeddedFont>
-    <p:embeddedFont>
       <p:font typeface="Segoe UI Semibold" panose="020B0702040204020203" pitchFamily="34" charset="0"/>
-      <p:bold r:id="rId62"/>
-      <p:boldItalic r:id="rId63"/>
+      <p:bold r:id="rId58"/>
+      <p:boldItalic r:id="rId59"/>
     </p:embeddedFont>
   </p:embeddedFontLst>
   <p:defaultTextStyle>
@@ -214,14 +210,6 @@
 </p:presentation>
 </file>
 
-<file path=ppt/revisionInfo.xml><?xml version="1.0" encoding="utf-8"?>
-<p1510:revInfo xmlns:a="http://schemas.openxmlformats.org/drawingml/2006/main" xmlns:r="http://schemas.openxmlformats.org/officeDocument/2006/relationships" xmlns:p1510="http://schemas.microsoft.com/office/powerpoint/2015/10/main">
-  <p1510:revLst>
-    <p1510:client id="{B68B99D2-3DDC-4B57-934E-5654EBC90E91}" v="71" dt="2023-09-18T21:23:49.310"/>
-  </p1510:revLst>
-</p1510:revInfo>
-</file>
-
 <file path=ppt/notesMasters/notesMaster1.xml><?xml version="1.0" encoding="utf-8"?>
 <p:notesMaster xmlns:a="http://schemas.openxmlformats.org/drawingml/2006/main" xmlns:r="http://schemas.openxmlformats.org/officeDocument/2006/relationships" xmlns:p="http://schemas.openxmlformats.org/presentationml/2006/main">
   <p:cSld>
@@ -304,7 +292,7 @@
           <a:p>
             <a:fld id="{4AF1DCFC-0A24-40D5-A007-FBB29F036A66}" type="datetimeFigureOut">
               <a:rPr lang="en-US" smtClean="0"/>
-              <a:t>1/28/2024</a:t>
+              <a:t>6/28/2024</a:t>
             </a:fld>
             <a:endParaRPr lang="en-US" dirty="0"/>
           </a:p>
@@ -14721,7 +14709,7 @@
                 </a:solidFill>
                 <a:effectLst/>
               </a:rPr>
-              <a:t>SPF, DKIM, DMARC und MTA-STS </a:t>
+              <a:t>SPF, DKIM, DMARC, MTA-STS und DANE </a:t>
             </a:r>
             <a:r>
               <a:rPr lang="en-US" b="0" i="0" dirty="0" err="1">
@@ -16025,6 +16013,188 @@
 </file>
 
 <file path=ppt/slides/slide20.xml><?xml version="1.0" encoding="utf-8"?>
+<p:sld xmlns:a="http://schemas.openxmlformats.org/drawingml/2006/main" xmlns:r="http://schemas.openxmlformats.org/officeDocument/2006/relationships" xmlns:p="http://schemas.openxmlformats.org/presentationml/2006/main">
+  <p:cSld>
+    <p:spTree>
+      <p:nvGrpSpPr>
+        <p:cNvPr id="1" name=""/>
+        <p:cNvGrpSpPr/>
+        <p:nvPr/>
+      </p:nvGrpSpPr>
+      <p:grpSpPr>
+        <a:xfrm>
+          <a:off x="0" y="0"/>
+          <a:ext cx="0" cy="0"/>
+          <a:chOff x="0" y="0"/>
+          <a:chExt cx="0" cy="0"/>
+        </a:xfrm>
+      </p:grpSpPr>
+      <p:sp>
+        <p:nvSpPr>
+          <p:cNvPr id="2" name="Title 1">
+            <a:extLst>
+              <a:ext uri="{FF2B5EF4-FFF2-40B4-BE49-F238E27FC236}">
+                <a16:creationId xmlns:a16="http://schemas.microsoft.com/office/drawing/2014/main" id="{0ED65DEA-C249-9710-A73B-CCF7240504BF}"/>
+              </a:ext>
+            </a:extLst>
+          </p:cNvPr>
+          <p:cNvSpPr>
+            <a:spLocks noGrp="1"/>
+          </p:cNvSpPr>
+          <p:nvPr>
+            <p:ph type="title"/>
+          </p:nvPr>
+        </p:nvSpPr>
+        <p:spPr/>
+        <p:txBody>
+          <a:bodyPr/>
+          <a:lstStyle/>
+          <a:p>
+            <a:r>
+              <a:rPr lang="de-DE" dirty="0"/>
+              <a:t>Verschachtelung der SPF Records</a:t>
+            </a:r>
+          </a:p>
+        </p:txBody>
+      </p:sp>
+      <p:sp>
+        <p:nvSpPr>
+          <p:cNvPr id="3" name="Text Placeholder 2">
+            <a:extLst>
+              <a:ext uri="{FF2B5EF4-FFF2-40B4-BE49-F238E27FC236}">
+                <a16:creationId xmlns:a16="http://schemas.microsoft.com/office/drawing/2014/main" id="{57933DC4-85AE-53E4-BF8D-9D76ABA5BFD6}"/>
+              </a:ext>
+            </a:extLst>
+          </p:cNvPr>
+          <p:cNvSpPr>
+            <a:spLocks noGrp="1"/>
+          </p:cNvSpPr>
+          <p:nvPr>
+            <p:ph type="body" sz="quarter" idx="10"/>
+          </p:nvPr>
+        </p:nvSpPr>
+        <p:spPr>
+          <a:xfrm>
+            <a:off x="595915" y="1464075"/>
+            <a:ext cx="11239464" cy="4231671"/>
+          </a:xfrm>
+        </p:spPr>
+        <p:txBody>
+          <a:bodyPr/>
+          <a:lstStyle/>
+          <a:p>
+            <a:r>
+              <a:rPr lang="de-DE" dirty="0"/>
+              <a:t>SPF Records können verschachtelt werden</a:t>
+            </a:r>
+          </a:p>
+          <a:p>
+            <a:pPr lvl="1"/>
+            <a:r>
+              <a:rPr lang="de-DE" dirty="0"/>
+              <a:t>Um die Länge des Records zu verringern</a:t>
+            </a:r>
+          </a:p>
+          <a:p>
+            <a:r>
+              <a:rPr lang="de-DE" dirty="0"/>
+              <a:t>Auslagerung der SPF Records in eine eigene Zone (z.B.: spf.protection.outlook.com)</a:t>
+            </a:r>
+          </a:p>
+          <a:p>
+            <a:r>
+              <a:rPr lang="de-DE" dirty="0"/>
+              <a:t>Erlaubt es, Sender aus anderen Domänen zu autorisieren (Newsletter Versand, etc.)</a:t>
+            </a:r>
+          </a:p>
+          <a:p>
+            <a:r>
+              <a:rPr lang="de-DE" dirty="0"/>
+              <a:t>Verschachtelung bedingt zusätzliche DNS-Abfragen</a:t>
+            </a:r>
+          </a:p>
+          <a:p>
+            <a:pPr lvl="1"/>
+            <a:r>
+              <a:rPr lang="de-DE" dirty="0"/>
+              <a:t>Deshalb maximal 10 Verschachtelungen erlaubt (</a:t>
+            </a:r>
+            <a:r>
+              <a:rPr lang="de-DE" dirty="0" err="1"/>
+              <a:t>PermError</a:t>
+            </a:r>
+            <a:r>
+              <a:rPr lang="de-DE" dirty="0"/>
+              <a:t> bei Überschreitung)</a:t>
+            </a:r>
+          </a:p>
+          <a:p>
+            <a:r>
+              <a:rPr lang="de-DE" dirty="0"/>
+              <a:t>Folgende Keywords bedingen zusätzliche DNS-Abfragen:</a:t>
+            </a:r>
+          </a:p>
+          <a:p>
+            <a:pPr lvl="1"/>
+            <a:r>
+              <a:rPr lang="de-DE" dirty="0"/>
+              <a:t>A</a:t>
+            </a:r>
+          </a:p>
+          <a:p>
+            <a:pPr lvl="1"/>
+            <a:r>
+              <a:rPr lang="de-DE" dirty="0"/>
+              <a:t>MX</a:t>
+            </a:r>
+          </a:p>
+          <a:p>
+            <a:pPr lvl="1"/>
+            <a:r>
+              <a:rPr lang="de-DE" dirty="0"/>
+              <a:t>PTR</a:t>
+            </a:r>
+          </a:p>
+          <a:p>
+            <a:pPr lvl="1"/>
+            <a:r>
+              <a:rPr lang="de-DE" dirty="0"/>
+              <a:t>EXISTS</a:t>
+            </a:r>
+          </a:p>
+          <a:p>
+            <a:pPr lvl="1"/>
+            <a:r>
+              <a:rPr lang="de-DE" dirty="0"/>
+              <a:t>INCLUDE</a:t>
+            </a:r>
+          </a:p>
+          <a:p>
+            <a:pPr lvl="1"/>
+            <a:r>
+              <a:rPr lang="de-DE" dirty="0"/>
+              <a:t>REDIRECT</a:t>
+            </a:r>
+          </a:p>
+        </p:txBody>
+      </p:sp>
+    </p:spTree>
+    <p:extLst>
+      <p:ext uri="{BB962C8B-B14F-4D97-AF65-F5344CB8AC3E}">
+        <p14:creationId xmlns:p14="http://schemas.microsoft.com/office/powerpoint/2010/main" val="415205254"/>
+      </p:ext>
+    </p:extLst>
+  </p:cSld>
+  <p:clrMapOvr>
+    <a:masterClrMapping/>
+  </p:clrMapOvr>
+  <p:transition>
+    <p:fade/>
+  </p:transition>
+</p:sld>
+</file>
+
+<file path=ppt/slides/slide21.xml><?xml version="1.0" encoding="utf-8"?>
 <p:sld xmlns:a="http://schemas.openxmlformats.org/drawingml/2006/main" xmlns:r="http://schemas.openxmlformats.org/officeDocument/2006/relationships" xmlns:p="http://schemas.openxmlformats.org/presentationml/2006/main">
   <p:cSld>
     <p:spTree>
@@ -16756,7 +16926,7 @@
 </p:sld>
 </file>
 
-<file path=ppt/slides/slide21.xml><?xml version="1.0" encoding="utf-8"?>
+<file path=ppt/slides/slide22.xml><?xml version="1.0" encoding="utf-8"?>
 <p:sld xmlns:a="http://schemas.openxmlformats.org/drawingml/2006/main" xmlns:r="http://schemas.openxmlformats.org/officeDocument/2006/relationships" xmlns:p="http://schemas.openxmlformats.org/presentationml/2006/main">
   <p:cSld>
     <p:spTree>
@@ -17151,7 +17321,7 @@
 </p:sld>
 </file>
 
-<file path=ppt/slides/slide22.xml><?xml version="1.0" encoding="utf-8"?>
+<file path=ppt/slides/slide23.xml><?xml version="1.0" encoding="utf-8"?>
 <p:sld xmlns:a="http://schemas.openxmlformats.org/drawingml/2006/main" xmlns:r="http://schemas.openxmlformats.org/officeDocument/2006/relationships" xmlns:p="http://schemas.openxmlformats.org/presentationml/2006/main">
   <p:cSld>
     <p:spTree>
@@ -17245,112 +17415,44 @@
               <a:t>v=spf1 </a:t>
             </a:r>
             <a:r>
-              <a:rPr lang="de-AT" dirty="0" err="1">
-                <a:solidFill>
-                  <a:srgbClr val="339933"/>
-                </a:solidFill>
-              </a:rPr>
+              <a:rPr lang="de-AT" dirty="0" err="1"/>
               <a:t>include</a:t>
             </a:r>
             <a:r>
-              <a:rPr lang="de-AT" dirty="0">
-                <a:solidFill>
-                  <a:srgbClr val="339933"/>
-                </a:solidFill>
-              </a:rPr>
-              <a:t>:</a:t>
-            </a:r>
-            <a:r>
               <a:rPr lang="de-AT" dirty="0"/>
-              <a:t>_spf-a.microsoft.com </a:t>
-            </a:r>
-            <a:r>
-              <a:rPr lang="de-AT" dirty="0" err="1">
-                <a:solidFill>
-                  <a:srgbClr val="339933"/>
-                </a:solidFill>
-              </a:rPr>
+              <a:t>:_spf-a.microsoft.com </a:t>
+            </a:r>
+            <a:r>
+              <a:rPr lang="de-AT" dirty="0" err="1"/>
               <a:t>include</a:t>
             </a:r>
             <a:r>
-              <a:rPr lang="de-AT" dirty="0">
-                <a:solidFill>
-                  <a:srgbClr val="339933"/>
-                </a:solidFill>
-              </a:rPr>
-              <a:t>:</a:t>
-            </a:r>
-            <a:r>
               <a:rPr lang="de-AT" dirty="0"/>
-              <a:t>_spf-b.microsoft.com </a:t>
-            </a:r>
-            <a:r>
-              <a:rPr lang="de-AT" dirty="0" err="1">
-                <a:solidFill>
-                  <a:srgbClr val="339933"/>
-                </a:solidFill>
-              </a:rPr>
+              <a:t>:_spf-b.microsoft.com </a:t>
+            </a:r>
+            <a:r>
+              <a:rPr lang="de-AT" dirty="0" err="1"/>
               <a:t>include</a:t>
             </a:r>
             <a:r>
-              <a:rPr lang="de-AT" dirty="0">
-                <a:solidFill>
-                  <a:srgbClr val="339933"/>
-                </a:solidFill>
-              </a:rPr>
-              <a:t>:</a:t>
-            </a:r>
-            <a:r>
               <a:rPr lang="de-AT" dirty="0"/>
-              <a:t>_spf-c.microsoft.com </a:t>
-            </a:r>
-            <a:r>
-              <a:rPr lang="de-AT" dirty="0" err="1">
-                <a:solidFill>
-                  <a:srgbClr val="339933"/>
-                </a:solidFill>
-              </a:rPr>
+              <a:t>:_spf-c.microsoft.com </a:t>
+            </a:r>
+            <a:r>
+              <a:rPr lang="de-AT" dirty="0" err="1"/>
               <a:t>include</a:t>
             </a:r>
             <a:r>
-              <a:rPr lang="de-AT" dirty="0">
-                <a:solidFill>
-                  <a:srgbClr val="339933"/>
-                </a:solidFill>
-              </a:rPr>
-              <a:t>:</a:t>
-            </a:r>
-            <a:r>
               <a:rPr lang="de-AT" dirty="0"/>
-              <a:t>_spf-ssg-a.msft.net </a:t>
-            </a:r>
-            <a:r>
-              <a:rPr lang="de-AT" dirty="0" err="1">
-                <a:solidFill>
-                  <a:srgbClr val="339933"/>
-                </a:solidFill>
-              </a:rPr>
-              <a:t>include:</a:t>
+              <a:t>:_spf-ssg-a.msft.net </a:t>
             </a:r>
             <a:r>
               <a:rPr lang="de-AT" dirty="0" err="1"/>
-              <a:t>spf-a.hotmail.com</a:t>
+              <a:t>include:spf-a.hotmail.com</a:t>
             </a:r>
             <a:r>
               <a:rPr lang="de-AT" dirty="0"/>
-              <a:t> </a:t>
-            </a:r>
-            <a:r>
-              <a:rPr lang="de-AT" dirty="0">
-                <a:solidFill>
-                  <a:srgbClr val="339933"/>
-                </a:solidFill>
-              </a:rPr>
-              <a:t>include:</a:t>
-            </a:r>
-            <a:r>
-              <a:rPr lang="de-AT" dirty="0"/>
-              <a:t>_spf1-meo.microsoft.com </a:t>
+              <a:t> include:_spf1-meo.microsoft.com </a:t>
             </a:r>
             <a:r>
               <a:rPr lang="de-AT" dirty="0">
@@ -17377,19 +17479,7 @@
           <a:p>
             <a:r>
               <a:rPr lang="de-AT" dirty="0"/>
-              <a:t>v=spf1 </a:t>
-            </a:r>
-            <a:r>
-              <a:rPr lang="de-AT" dirty="0">
-                <a:solidFill>
-                  <a:srgbClr val="339933"/>
-                </a:solidFill>
-              </a:rPr>
-              <a:t>redirect</a:t>
-            </a:r>
-            <a:r>
-              <a:rPr lang="de-AT" dirty="0"/>
-              <a:t>=_spf.google.com</a:t>
+              <a:t>v=spf1 redirect=_spf.google.com</a:t>
             </a:r>
           </a:p>
           <a:p>
@@ -17398,48 +17488,12 @@
               <a:t>v=spf1 </a:t>
             </a:r>
             <a:r>
-              <a:rPr lang="de-AT" dirty="0" err="1">
-                <a:solidFill>
-                  <a:srgbClr val="339933"/>
-                </a:solidFill>
-              </a:rPr>
+              <a:rPr lang="de-AT" dirty="0" err="1"/>
               <a:t>include</a:t>
             </a:r>
             <a:r>
-              <a:rPr lang="de-AT" dirty="0">
-                <a:solidFill>
-                  <a:srgbClr val="339933"/>
-                </a:solidFill>
-              </a:rPr>
-              <a:t>:</a:t>
-            </a:r>
-            <a:r>
               <a:rPr lang="de-AT" dirty="0"/>
-              <a:t>_netblocks.google.com </a:t>
-            </a:r>
-            <a:r>
-              <a:rPr lang="de-AT" dirty="0">
-                <a:solidFill>
-                  <a:srgbClr val="339933"/>
-                </a:solidFill>
-              </a:rPr>
-              <a:t>include:</a:t>
-            </a:r>
-            <a:r>
-              <a:rPr lang="de-AT" dirty="0"/>
-              <a:t>_netblocks2.google.com </a:t>
-            </a:r>
-            <a:r>
-              <a:rPr lang="de-AT" dirty="0">
-                <a:solidFill>
-                  <a:srgbClr val="339933"/>
-                </a:solidFill>
-              </a:rPr>
-              <a:t>include:</a:t>
-            </a:r>
-            <a:r>
-              <a:rPr lang="de-AT" dirty="0"/>
-              <a:t>_netblocks3.google.com </a:t>
+              <a:t>:_netblocks.google.com include:_netblocks2.google.com include:_netblocks3.google.com </a:t>
             </a:r>
             <a:r>
               <a:rPr lang="de-AT" dirty="0">
@@ -17482,15 +17536,63 @@
                   <a:schemeClr val="tx1"/>
                 </a:solidFill>
               </a:rPr>
-              <a:t>v=spf1 </a:t>
+              <a:t>v=spf1 mx </a:t>
+            </a:r>
+            <a:r>
+              <a:rPr lang="de-AT" dirty="0" err="1">
+                <a:solidFill>
+                  <a:schemeClr val="tx1"/>
+                </a:solidFill>
+              </a:rPr>
+              <a:t>include</a:t>
             </a:r>
             <a:r>
               <a:rPr lang="de-AT" dirty="0">
                 <a:solidFill>
-                  <a:srgbClr val="339933"/>
+                  <a:schemeClr val="tx1"/>
                 </a:solidFill>
               </a:rPr>
-              <a:t>mx</a:t>
+              <a:t>:_spf.hp.com </a:t>
+            </a:r>
+            <a:r>
+              <a:rPr lang="de-AT" dirty="0" err="1">
+                <a:solidFill>
+                  <a:schemeClr val="tx1"/>
+                </a:solidFill>
+              </a:rPr>
+              <a:t>include</a:t>
+            </a:r>
+            <a:r>
+              <a:rPr lang="de-AT" dirty="0">
+                <a:solidFill>
+                  <a:schemeClr val="tx1"/>
+                </a:solidFill>
+              </a:rPr>
+              <a:t>:_spf.salesforce.com </a:t>
+            </a:r>
+            <a:r>
+              <a:rPr lang="de-AT" dirty="0" err="1">
+                <a:solidFill>
+                  <a:schemeClr val="tx1"/>
+                </a:solidFill>
+              </a:rPr>
+              <a:t>include:us</a:t>
+            </a:r>
+            <a:r>
+              <a:rPr lang="de-AT" dirty="0">
+                <a:solidFill>
+                  <a:schemeClr val="tx1"/>
+                </a:solidFill>
+              </a:rPr>
+              <a:t>._netblocks.mimecast.com </a:t>
+            </a:r>
+            <a:r>
+              <a:rPr lang="de-AT" dirty="0" err="1">
+                <a:solidFill>
+                  <a:schemeClr val="tx1"/>
+                </a:solidFill>
+              </a:rPr>
+              <a:t>include:spf.protection.outlook.com</a:t>
             </a:r>
             <a:r>
               <a:rPr lang="de-AT" dirty="0">
@@ -17503,18 +17605,10 @@
             <a:r>
               <a:rPr lang="de-AT" dirty="0" err="1">
                 <a:solidFill>
-                  <a:srgbClr val="339933"/>
+                  <a:schemeClr val="tx1"/>
                 </a:solidFill>
               </a:rPr>
-              <a:t>include</a:t>
-            </a:r>
-            <a:r>
-              <a:rPr lang="de-AT" dirty="0">
-                <a:solidFill>
-                  <a:srgbClr val="339933"/>
-                </a:solidFill>
-              </a:rPr>
-              <a:t>:</a:t>
+              <a:t>include:standardregisterSPF.smtp.com</a:t>
             </a:r>
             <a:r>
               <a:rPr lang="de-AT" dirty="0">
@@ -17522,199 +17616,7 @@
                   <a:schemeClr val="tx1"/>
                 </a:solidFill>
               </a:rPr>
-              <a:t>_spf.hp.com </a:t>
-            </a:r>
-            <a:r>
-              <a:rPr lang="de-AT" dirty="0" err="1">
-                <a:solidFill>
-                  <a:srgbClr val="339933"/>
-                </a:solidFill>
-              </a:rPr>
-              <a:t>include</a:t>
-            </a:r>
-            <a:r>
-              <a:rPr lang="de-AT" dirty="0">
-                <a:solidFill>
-                  <a:srgbClr val="339933"/>
-                </a:solidFill>
-              </a:rPr>
-              <a:t>:</a:t>
-            </a:r>
-            <a:r>
-              <a:rPr lang="de-AT" dirty="0">
-                <a:solidFill>
-                  <a:schemeClr val="tx1"/>
-                </a:solidFill>
-              </a:rPr>
-              <a:t>_spf.salesforce.com </a:t>
-            </a:r>
-            <a:r>
-              <a:rPr lang="de-AT" dirty="0" err="1">
-                <a:solidFill>
-                  <a:srgbClr val="339933"/>
-                </a:solidFill>
-              </a:rPr>
-              <a:t>include:</a:t>
-            </a:r>
-            <a:r>
-              <a:rPr lang="de-AT" dirty="0" err="1">
-                <a:solidFill>
-                  <a:schemeClr val="tx1"/>
-                </a:solidFill>
-              </a:rPr>
-              <a:t>us</a:t>
-            </a:r>
-            <a:r>
-              <a:rPr lang="de-AT" dirty="0">
-                <a:solidFill>
-                  <a:schemeClr val="tx1"/>
-                </a:solidFill>
-              </a:rPr>
-              <a:t>._netblocks.mimecast.com </a:t>
-            </a:r>
-            <a:r>
-              <a:rPr lang="de-AT" dirty="0" err="1">
-                <a:solidFill>
-                  <a:srgbClr val="339933"/>
-                </a:solidFill>
-              </a:rPr>
-              <a:t>include:</a:t>
-            </a:r>
-            <a:r>
-              <a:rPr lang="de-AT" dirty="0" err="1">
-                <a:solidFill>
-                  <a:schemeClr val="tx1"/>
-                </a:solidFill>
-              </a:rPr>
-              <a:t>spf.protection.outlook.com</a:t>
-            </a:r>
-            <a:r>
-              <a:rPr lang="de-AT" dirty="0">
-                <a:solidFill>
-                  <a:schemeClr val="tx1"/>
-                </a:solidFill>
-              </a:rPr>
-              <a:t> </a:t>
-            </a:r>
-            <a:r>
-              <a:rPr lang="de-AT" dirty="0" err="1">
-                <a:solidFill>
-                  <a:srgbClr val="339933"/>
-                </a:solidFill>
-              </a:rPr>
-              <a:t>include:</a:t>
-            </a:r>
-            <a:r>
-              <a:rPr lang="de-AT" dirty="0" err="1">
-                <a:solidFill>
-                  <a:schemeClr val="tx1"/>
-                </a:solidFill>
-              </a:rPr>
-              <a:t>standardregisterSPF.smtp.com</a:t>
-            </a:r>
-            <a:r>
-              <a:rPr lang="de-AT" dirty="0">
-                <a:solidFill>
-                  <a:schemeClr val="tx1"/>
-                </a:solidFill>
-              </a:rPr>
-              <a:t> </a:t>
-            </a:r>
-            <a:r>
-              <a:rPr lang="de-AT" dirty="0">
-                <a:solidFill>
-                  <a:srgbClr val="339933"/>
-                </a:solidFill>
-              </a:rPr>
-              <a:t>ip4:</a:t>
-            </a:r>
-            <a:r>
-              <a:rPr lang="de-AT" dirty="0">
-                <a:solidFill>
-                  <a:schemeClr val="tx1"/>
-                </a:solidFill>
-              </a:rPr>
-              <a:t>205.219.85.237 </a:t>
-            </a:r>
-            <a:r>
-              <a:rPr lang="de-AT" dirty="0">
-                <a:solidFill>
-                  <a:srgbClr val="339933"/>
-                </a:solidFill>
-              </a:rPr>
-              <a:t>ip4:</a:t>
-            </a:r>
-            <a:r>
-              <a:rPr lang="de-AT" dirty="0">
-                <a:solidFill>
-                  <a:schemeClr val="tx1"/>
-                </a:solidFill>
-              </a:rPr>
-              <a:t>74.209.251.23 </a:t>
-            </a:r>
-            <a:r>
-              <a:rPr lang="de-AT" dirty="0">
-                <a:solidFill>
-                  <a:srgbClr val="339933"/>
-                </a:solidFill>
-              </a:rPr>
-              <a:t>ip4:</a:t>
-            </a:r>
-            <a:r>
-              <a:rPr lang="de-AT" dirty="0">
-                <a:solidFill>
-                  <a:schemeClr val="tx1"/>
-                </a:solidFill>
-              </a:rPr>
-              <a:t>198.245.88.159 </a:t>
-            </a:r>
-            <a:r>
-              <a:rPr lang="de-AT" dirty="0">
-                <a:solidFill>
-                  <a:srgbClr val="339933"/>
-                </a:solidFill>
-              </a:rPr>
-              <a:t>ip4:</a:t>
-            </a:r>
-            <a:r>
-              <a:rPr lang="de-AT" dirty="0">
-                <a:solidFill>
-                  <a:schemeClr val="tx1"/>
-                </a:solidFill>
-              </a:rPr>
-              <a:t>198.245.88.160 </a:t>
-            </a:r>
-            <a:r>
-              <a:rPr lang="de-AT" dirty="0">
-                <a:solidFill>
-                  <a:srgbClr val="339933"/>
-                </a:solidFill>
-              </a:rPr>
-              <a:t>ip4:</a:t>
-            </a:r>
-            <a:r>
-              <a:rPr lang="de-AT" dirty="0">
-                <a:solidFill>
-                  <a:schemeClr val="tx1"/>
-                </a:solidFill>
-              </a:rPr>
-              <a:t>198.245.88.161 </a:t>
-            </a:r>
-            <a:r>
-              <a:rPr lang="de-AT" dirty="0">
-                <a:solidFill>
-                  <a:srgbClr val="339933"/>
-                </a:solidFill>
-              </a:rPr>
-              <a:t>ip4:</a:t>
-            </a:r>
-            <a:r>
-              <a:rPr lang="de-AT" dirty="0">
-                <a:solidFill>
-                  <a:schemeClr val="tx1"/>
-                </a:solidFill>
-              </a:rPr>
-              <a:t>198.245.88.162 </a:t>
+              <a:t> ip4:205.219.85.237 ip4:74.209.251.23 ip4:198.245.88.159 ip4:198.245.88.160 ip4:198.245.88.161 ip4:198.245.88.162 </a:t>
             </a:r>
             <a:r>
               <a:rPr lang="de-AT" dirty="0">
@@ -17743,1261 +17645,7 @@
 </p:sld>
 </file>
 
-<file path=ppt/slides/slide23.xml><?xml version="1.0" encoding="utf-8"?>
-<p:sld xmlns:a="http://schemas.openxmlformats.org/drawingml/2006/main" xmlns:r="http://schemas.openxmlformats.org/officeDocument/2006/relationships" xmlns:p="http://schemas.openxmlformats.org/presentationml/2006/main">
-  <p:cSld>
-    <p:spTree>
-      <p:nvGrpSpPr>
-        <p:cNvPr id="1" name=""/>
-        <p:cNvGrpSpPr/>
-        <p:nvPr/>
-      </p:nvGrpSpPr>
-      <p:grpSpPr>
-        <a:xfrm>
-          <a:off x="0" y="0"/>
-          <a:ext cx="0" cy="0"/>
-          <a:chOff x="0" y="0"/>
-          <a:chExt cx="0" cy="0"/>
-        </a:xfrm>
-      </p:grpSpPr>
-      <p:sp>
-        <p:nvSpPr>
-          <p:cNvPr id="2" name="Title 1">
-            <a:extLst>
-              <a:ext uri="{FF2B5EF4-FFF2-40B4-BE49-F238E27FC236}">
-                <a16:creationId xmlns:a16="http://schemas.microsoft.com/office/drawing/2014/main" id="{0ED65DEA-C249-9710-A73B-CCF7240504BF}"/>
-              </a:ext>
-            </a:extLst>
-          </p:cNvPr>
-          <p:cNvSpPr>
-            <a:spLocks noGrp="1"/>
-          </p:cNvSpPr>
-          <p:nvPr>
-            <p:ph type="title"/>
-          </p:nvPr>
-        </p:nvSpPr>
-        <p:spPr/>
-        <p:txBody>
-          <a:bodyPr/>
-          <a:lstStyle/>
-          <a:p>
-            <a:r>
-              <a:rPr lang="de-DE" dirty="0"/>
-              <a:t>Verschachtelung der SPF Records</a:t>
-            </a:r>
-          </a:p>
-        </p:txBody>
-      </p:sp>
-      <p:sp>
-        <p:nvSpPr>
-          <p:cNvPr id="3" name="Text Placeholder 2">
-            <a:extLst>
-              <a:ext uri="{FF2B5EF4-FFF2-40B4-BE49-F238E27FC236}">
-                <a16:creationId xmlns:a16="http://schemas.microsoft.com/office/drawing/2014/main" id="{57933DC4-85AE-53E4-BF8D-9D76ABA5BFD6}"/>
-              </a:ext>
-            </a:extLst>
-          </p:cNvPr>
-          <p:cNvSpPr>
-            <a:spLocks noGrp="1"/>
-          </p:cNvSpPr>
-          <p:nvPr>
-            <p:ph type="body" sz="quarter" idx="10"/>
-          </p:nvPr>
-        </p:nvSpPr>
-        <p:spPr>
-          <a:xfrm>
-            <a:off x="595915" y="1464075"/>
-            <a:ext cx="11239464" cy="4231671"/>
-          </a:xfrm>
-        </p:spPr>
-        <p:txBody>
-          <a:bodyPr/>
-          <a:lstStyle/>
-          <a:p>
-            <a:r>
-              <a:rPr lang="de-DE" dirty="0"/>
-              <a:t>SPF Records können verschachtelt werden</a:t>
-            </a:r>
-          </a:p>
-          <a:p>
-            <a:pPr lvl="1"/>
-            <a:r>
-              <a:rPr lang="de-DE" dirty="0"/>
-              <a:t>Um die Länge des Records zu verringern</a:t>
-            </a:r>
-          </a:p>
-          <a:p>
-            <a:r>
-              <a:rPr lang="de-DE" dirty="0"/>
-              <a:t>Auslagerung der SPF Records in eine eigene Zone (z.B.: spf.protection.outlook.com)</a:t>
-            </a:r>
-          </a:p>
-          <a:p>
-            <a:r>
-              <a:rPr lang="de-DE" dirty="0"/>
-              <a:t>Erlaubt es, Sender aus anderen Domänen zu autorisieren (Newsletter Versand, etc.)</a:t>
-            </a:r>
-          </a:p>
-          <a:p>
-            <a:r>
-              <a:rPr lang="de-DE" dirty="0"/>
-              <a:t>Verschachtelung bedingt zusätzliche DNS-Abfragen</a:t>
-            </a:r>
-          </a:p>
-          <a:p>
-            <a:pPr lvl="1"/>
-            <a:r>
-              <a:rPr lang="de-DE" dirty="0"/>
-              <a:t>Deshalb maximal 10 Verschachtelungen erlaubt (</a:t>
-            </a:r>
-            <a:r>
-              <a:rPr lang="de-DE" dirty="0" err="1"/>
-              <a:t>PermError</a:t>
-            </a:r>
-            <a:r>
-              <a:rPr lang="de-DE" dirty="0"/>
-              <a:t> bei Überschreitung)</a:t>
-            </a:r>
-          </a:p>
-          <a:p>
-            <a:r>
-              <a:rPr lang="de-DE" dirty="0"/>
-              <a:t>Folgende Keywords bedingen zusätzliche DNS-Abfragen:</a:t>
-            </a:r>
-          </a:p>
-          <a:p>
-            <a:pPr lvl="1"/>
-            <a:r>
-              <a:rPr lang="de-DE" dirty="0"/>
-              <a:t>A</a:t>
-            </a:r>
-          </a:p>
-          <a:p>
-            <a:pPr lvl="1"/>
-            <a:r>
-              <a:rPr lang="de-DE" dirty="0"/>
-              <a:t>MX</a:t>
-            </a:r>
-          </a:p>
-          <a:p>
-            <a:pPr lvl="1"/>
-            <a:r>
-              <a:rPr lang="de-DE" dirty="0"/>
-              <a:t>PTR</a:t>
-            </a:r>
-          </a:p>
-          <a:p>
-            <a:pPr lvl="1"/>
-            <a:r>
-              <a:rPr lang="de-DE" dirty="0"/>
-              <a:t>EXISTS</a:t>
-            </a:r>
-          </a:p>
-          <a:p>
-            <a:pPr lvl="1"/>
-            <a:r>
-              <a:rPr lang="de-DE" dirty="0"/>
-              <a:t>INCLUDE</a:t>
-            </a:r>
-          </a:p>
-          <a:p>
-            <a:pPr lvl="1"/>
-            <a:r>
-              <a:rPr lang="de-DE" dirty="0"/>
-              <a:t>REDIRECT</a:t>
-            </a:r>
-          </a:p>
-        </p:txBody>
-      </p:sp>
-    </p:spTree>
-    <p:extLst>
-      <p:ext uri="{BB962C8B-B14F-4D97-AF65-F5344CB8AC3E}">
-        <p14:creationId xmlns:p14="http://schemas.microsoft.com/office/powerpoint/2010/main" val="415205254"/>
-      </p:ext>
-    </p:extLst>
-  </p:cSld>
-  <p:clrMapOvr>
-    <a:masterClrMapping/>
-  </p:clrMapOvr>
-  <p:transition>
-    <p:fade/>
-  </p:transition>
-</p:sld>
-</file>
-
 <file path=ppt/slides/slide24.xml><?xml version="1.0" encoding="utf-8"?>
-<p:sld xmlns:a="http://schemas.openxmlformats.org/drawingml/2006/main" xmlns:r="http://schemas.openxmlformats.org/officeDocument/2006/relationships" xmlns:p="http://schemas.openxmlformats.org/presentationml/2006/main">
-  <p:cSld>
-    <p:spTree>
-      <p:nvGrpSpPr>
-        <p:cNvPr id="1" name=""/>
-        <p:cNvGrpSpPr/>
-        <p:nvPr/>
-      </p:nvGrpSpPr>
-      <p:grpSpPr>
-        <a:xfrm>
-          <a:off x="0" y="0"/>
-          <a:ext cx="0" cy="0"/>
-          <a:chOff x="0" y="0"/>
-          <a:chExt cx="0" cy="0"/>
-        </a:xfrm>
-      </p:grpSpPr>
-      <p:sp>
-        <p:nvSpPr>
-          <p:cNvPr id="2" name="Title 1">
-            <a:extLst>
-              <a:ext uri="{FF2B5EF4-FFF2-40B4-BE49-F238E27FC236}">
-                <a16:creationId xmlns:a16="http://schemas.microsoft.com/office/drawing/2014/main" id="{FF3F2F24-7B16-F538-688B-E99840900E9E}"/>
-              </a:ext>
-            </a:extLst>
-          </p:cNvPr>
-          <p:cNvSpPr>
-            <a:spLocks noGrp="1"/>
-          </p:cNvSpPr>
-          <p:nvPr>
-            <p:ph type="title"/>
-          </p:nvPr>
-        </p:nvSpPr>
-        <p:spPr/>
-        <p:txBody>
-          <a:bodyPr/>
-          <a:lstStyle/>
-          <a:p>
-            <a:r>
-              <a:rPr lang="de-DE" dirty="0"/>
-              <a:t>SPF </a:t>
-            </a:r>
-            <a:r>
-              <a:rPr lang="de-DE" dirty="0" err="1"/>
-              <a:t>Macros</a:t>
-            </a:r>
-            <a:endParaRPr lang="de-DE" dirty="0"/>
-          </a:p>
-        </p:txBody>
-      </p:sp>
-      <p:sp>
-        <p:nvSpPr>
-          <p:cNvPr id="3" name="Text Placeholder 2">
-            <a:extLst>
-              <a:ext uri="{FF2B5EF4-FFF2-40B4-BE49-F238E27FC236}">
-                <a16:creationId xmlns:a16="http://schemas.microsoft.com/office/drawing/2014/main" id="{7DCF55EB-C525-01BF-B9AF-6C8497BE3EBB}"/>
-              </a:ext>
-            </a:extLst>
-          </p:cNvPr>
-          <p:cNvSpPr>
-            <a:spLocks noGrp="1"/>
-          </p:cNvSpPr>
-          <p:nvPr>
-            <p:ph type="body" sz="quarter" idx="10"/>
-          </p:nvPr>
-        </p:nvSpPr>
-        <p:spPr>
-          <a:xfrm>
-            <a:off x="595915" y="1464075"/>
-            <a:ext cx="11239464" cy="2197461"/>
-          </a:xfrm>
-        </p:spPr>
-        <p:txBody>
-          <a:bodyPr/>
-          <a:lstStyle/>
-          <a:p>
-            <a:r>
-              <a:rPr lang="de-DE" dirty="0"/>
-              <a:t>Platzhalter, um den SPF-</a:t>
-            </a:r>
-            <a:r>
-              <a:rPr lang="de-DE" dirty="0" err="1"/>
-              <a:t>Record</a:t>
-            </a:r>
-            <a:r>
-              <a:rPr lang="de-DE" dirty="0"/>
-              <a:t> dynamisch zu gestalten</a:t>
-            </a:r>
-          </a:p>
-          <a:p>
-            <a:r>
-              <a:rPr lang="de-DE" dirty="0"/>
-              <a:t>Definiert in </a:t>
-            </a:r>
-            <a:r>
-              <a:rPr lang="de-DE" dirty="0">
-                <a:hlinkClick r:id="rId2"/>
-              </a:rPr>
-              <a:t>RFC 7208 </a:t>
-            </a:r>
-            <a:r>
-              <a:rPr lang="de-DE" dirty="0" err="1">
-                <a:hlinkClick r:id="rId2"/>
-              </a:rPr>
-              <a:t>Section</a:t>
-            </a:r>
-            <a:r>
-              <a:rPr lang="de-DE" dirty="0">
-                <a:hlinkClick r:id="rId2"/>
-              </a:rPr>
-              <a:t> 7</a:t>
-            </a:r>
-            <a:endParaRPr lang="de-DE" dirty="0"/>
-          </a:p>
-          <a:p>
-            <a:endParaRPr lang="de-DE" dirty="0"/>
-          </a:p>
-          <a:p>
-            <a:r>
-              <a:rPr lang="de-DE" dirty="0"/>
-              <a:t>Beispiel POST.AT</a:t>
-            </a:r>
-          </a:p>
-          <a:p>
-            <a:endParaRPr lang="de-DE" dirty="0"/>
-          </a:p>
-          <a:p>
-            <a:endParaRPr lang="de-DE" dirty="0"/>
-          </a:p>
-        </p:txBody>
-      </p:sp>
-      <p:grpSp>
-        <p:nvGrpSpPr>
-          <p:cNvPr id="17" name="Group 16">
-            <a:extLst>
-              <a:ext uri="{FF2B5EF4-FFF2-40B4-BE49-F238E27FC236}">
-                <a16:creationId xmlns:a16="http://schemas.microsoft.com/office/drawing/2014/main" id="{45170487-9680-750D-856C-7F6F99885D70}"/>
-              </a:ext>
-            </a:extLst>
-          </p:cNvPr>
-          <p:cNvGrpSpPr/>
-          <p:nvPr/>
-        </p:nvGrpSpPr>
-        <p:grpSpPr>
-          <a:xfrm>
-            <a:off x="1008139" y="3227832"/>
-            <a:ext cx="10415016" cy="1477330"/>
-            <a:chOff x="1008139" y="2697480"/>
-            <a:chExt cx="10415016" cy="1477330"/>
-          </a:xfrm>
-        </p:grpSpPr>
-        <p:sp>
-          <p:nvSpPr>
-            <p:cNvPr id="4" name="TextBox 3">
-              <a:extLst>
-                <a:ext uri="{FF2B5EF4-FFF2-40B4-BE49-F238E27FC236}">
-                  <a16:creationId xmlns:a16="http://schemas.microsoft.com/office/drawing/2014/main" id="{F7202796-66D2-F5DB-6FA7-F8255B9ACEE7}"/>
-                </a:ext>
-              </a:extLst>
-            </p:cNvPr>
-            <p:cNvSpPr txBox="1"/>
-            <p:nvPr/>
-          </p:nvSpPr>
-          <p:spPr>
-            <a:xfrm>
-              <a:off x="1008139" y="2697480"/>
-              <a:ext cx="10415016" cy="492443"/>
-            </a:xfrm>
-            <a:prstGeom prst="rect">
-              <a:avLst/>
-            </a:prstGeom>
-            <a:noFill/>
-          </p:spPr>
-          <p:txBody>
-            <a:bodyPr wrap="square" lIns="0" tIns="0" rIns="0" bIns="0" rtlCol="0">
-              <a:spAutoFit/>
-            </a:bodyPr>
-            <a:lstStyle/>
-            <a:p>
-              <a:pPr algn="l"/>
-              <a:r>
-                <a:rPr lang="de-DE" sz="3200" dirty="0">
-                  <a:gradFill>
-                    <a:gsLst>
-                      <a:gs pos="2917">
-                        <a:schemeClr val="tx1"/>
-                      </a:gs>
-                      <a:gs pos="30000">
-                        <a:schemeClr val="tx1"/>
-                      </a:gs>
-                    </a:gsLst>
-                    <a:lin ang="5400000" scaled="0"/>
-                  </a:gradFill>
-                </a:rPr>
-                <a:t>"v=spf1 </a:t>
-              </a:r>
-              <a:r>
-                <a:rPr lang="de-DE" sz="3200" dirty="0" err="1">
-                  <a:gradFill>
-                    <a:gsLst>
-                      <a:gs pos="2917">
-                        <a:schemeClr val="tx1"/>
-                      </a:gs>
-                      <a:gs pos="30000">
-                        <a:schemeClr val="tx1"/>
-                      </a:gs>
-                    </a:gsLst>
-                    <a:lin ang="5400000" scaled="0"/>
-                  </a:gradFill>
-                </a:rPr>
-                <a:t>include</a:t>
-              </a:r>
-              <a:r>
-                <a:rPr lang="de-DE" sz="3200" dirty="0">
-                  <a:gradFill>
-                    <a:gsLst>
-                      <a:gs pos="2917">
-                        <a:schemeClr val="tx1"/>
-                      </a:gs>
-                      <a:gs pos="30000">
-                        <a:schemeClr val="tx1"/>
-                      </a:gs>
-                    </a:gsLst>
-                    <a:lin ang="5400000" scaled="0"/>
-                  </a:gradFill>
-                </a:rPr>
-                <a:t>:</a:t>
-              </a:r>
-              <a:r>
-                <a:rPr lang="de-DE" sz="3200" dirty="0">
-                  <a:solidFill>
-                    <a:srgbClr val="339933"/>
-                  </a:solidFill>
-                </a:rPr>
-                <a:t>%{</a:t>
-              </a:r>
-              <a:r>
-                <a:rPr lang="de-DE" sz="3200" dirty="0" err="1">
-                  <a:solidFill>
-                    <a:srgbClr val="339933"/>
-                  </a:solidFill>
-                </a:rPr>
-                <a:t>ir</a:t>
-              </a:r>
-              <a:r>
-                <a:rPr lang="de-DE" sz="3200" dirty="0">
-                  <a:solidFill>
-                    <a:srgbClr val="339933"/>
-                  </a:solidFill>
-                </a:rPr>
-                <a:t>}.%{v}.%{d}</a:t>
-              </a:r>
-              <a:r>
-                <a:rPr lang="de-DE" sz="3200" dirty="0">
-                  <a:gradFill>
-                    <a:gsLst>
-                      <a:gs pos="2917">
-                        <a:schemeClr val="tx1"/>
-                      </a:gs>
-                      <a:gs pos="30000">
-                        <a:schemeClr val="tx1"/>
-                      </a:gs>
-                    </a:gsLst>
-                    <a:lin ang="5400000" scaled="0"/>
-                  </a:gradFill>
-                </a:rPr>
-                <a:t>.spf.has.pphosted.com -all"</a:t>
-              </a:r>
-            </a:p>
-          </p:txBody>
-        </p:sp>
-        <p:sp>
-          <p:nvSpPr>
-            <p:cNvPr id="5" name="TextBox 4">
-              <a:extLst>
-                <a:ext uri="{FF2B5EF4-FFF2-40B4-BE49-F238E27FC236}">
-                  <a16:creationId xmlns:a16="http://schemas.microsoft.com/office/drawing/2014/main" id="{95E0B2AE-124F-AFD4-0852-A2D5943E5DEE}"/>
-                </a:ext>
-              </a:extLst>
-            </p:cNvPr>
-            <p:cNvSpPr txBox="1"/>
-            <p:nvPr/>
-          </p:nvSpPr>
-          <p:spPr>
-            <a:xfrm>
-              <a:off x="1426464" y="3411062"/>
-              <a:ext cx="2871216" cy="307777"/>
-            </a:xfrm>
-            <a:prstGeom prst="rect">
-              <a:avLst/>
-            </a:prstGeom>
-            <a:noFill/>
-          </p:spPr>
-          <p:txBody>
-            <a:bodyPr wrap="square" lIns="0" tIns="0" rIns="0" bIns="0" rtlCol="0">
-              <a:spAutoFit/>
-            </a:bodyPr>
-            <a:lstStyle/>
-            <a:p>
-              <a:pPr algn="l"/>
-              <a:r>
-                <a:rPr lang="de-DE" sz="2000" dirty="0">
-                  <a:solidFill>
-                    <a:srgbClr val="339933"/>
-                  </a:solidFill>
-                </a:rPr>
-                <a:t>Source IP (reverse Order)</a:t>
-              </a:r>
-            </a:p>
-          </p:txBody>
-        </p:sp>
-        <p:sp>
-          <p:nvSpPr>
-            <p:cNvPr id="6" name="TextBox 5">
-              <a:extLst>
-                <a:ext uri="{FF2B5EF4-FFF2-40B4-BE49-F238E27FC236}">
-                  <a16:creationId xmlns:a16="http://schemas.microsoft.com/office/drawing/2014/main" id="{B7A561B4-4F66-CCCC-C086-F4418DD13E24}"/>
-                </a:ext>
-              </a:extLst>
-            </p:cNvPr>
-            <p:cNvSpPr txBox="1"/>
-            <p:nvPr/>
-          </p:nvSpPr>
-          <p:spPr>
-            <a:xfrm>
-              <a:off x="3860983" y="3867033"/>
-              <a:ext cx="2965069" cy="307777"/>
-            </a:xfrm>
-            <a:prstGeom prst="rect">
-              <a:avLst/>
-            </a:prstGeom>
-            <a:noFill/>
-          </p:spPr>
-          <p:txBody>
-            <a:bodyPr wrap="square" lIns="0" tIns="0" rIns="0" bIns="0" rtlCol="0">
-              <a:spAutoFit/>
-            </a:bodyPr>
-            <a:lstStyle/>
-            <a:p>
-              <a:pPr algn="l"/>
-              <a:r>
-                <a:rPr lang="de-DE" sz="2000" dirty="0">
-                  <a:solidFill>
-                    <a:srgbClr val="339933"/>
-                  </a:solidFill>
-                </a:rPr>
-                <a:t>Statischer „in-</a:t>
-              </a:r>
-              <a:r>
-                <a:rPr lang="de-DE" sz="2000" dirty="0" err="1">
-                  <a:solidFill>
-                    <a:srgbClr val="339933"/>
-                  </a:solidFill>
-                </a:rPr>
-                <a:t>addr</a:t>
-              </a:r>
-              <a:r>
-                <a:rPr lang="de-DE" sz="2000" dirty="0">
-                  <a:solidFill>
-                    <a:srgbClr val="339933"/>
-                  </a:solidFill>
-                </a:rPr>
-                <a:t>“ String</a:t>
-              </a:r>
-            </a:p>
-          </p:txBody>
-        </p:sp>
-        <p:sp>
-          <p:nvSpPr>
-            <p:cNvPr id="7" name="TextBox 6">
-              <a:extLst>
-                <a:ext uri="{FF2B5EF4-FFF2-40B4-BE49-F238E27FC236}">
-                  <a16:creationId xmlns:a16="http://schemas.microsoft.com/office/drawing/2014/main" id="{FD35D866-BDAC-7968-DD2C-56B4E22794EA}"/>
-                </a:ext>
-              </a:extLst>
-            </p:cNvPr>
-            <p:cNvSpPr txBox="1"/>
-            <p:nvPr/>
-          </p:nvSpPr>
-          <p:spPr>
-            <a:xfrm>
-              <a:off x="6389356" y="3411061"/>
-              <a:ext cx="4492003" cy="307777"/>
-            </a:xfrm>
-            <a:prstGeom prst="rect">
-              <a:avLst/>
-            </a:prstGeom>
-            <a:noFill/>
-          </p:spPr>
-          <p:txBody>
-            <a:bodyPr wrap="square" lIns="0" tIns="0" rIns="0" bIns="0" rtlCol="0">
-              <a:spAutoFit/>
-            </a:bodyPr>
-            <a:lstStyle/>
-            <a:p>
-              <a:pPr algn="l"/>
-              <a:r>
-                <a:rPr lang="de-DE" sz="2000" dirty="0">
-                  <a:solidFill>
-                    <a:srgbClr val="339933"/>
-                  </a:solidFill>
-                </a:rPr>
-                <a:t>Autoritative Domäne der SPF-Richtlinie</a:t>
-              </a:r>
-            </a:p>
-          </p:txBody>
-        </p:sp>
-        <p:cxnSp>
-          <p:nvCxnSpPr>
-            <p:cNvPr id="9" name="Straight Arrow Connector 8">
-              <a:extLst>
-                <a:ext uri="{FF2B5EF4-FFF2-40B4-BE49-F238E27FC236}">
-                  <a16:creationId xmlns:a16="http://schemas.microsoft.com/office/drawing/2014/main" id="{DD6317E8-7B30-6F02-7D4C-9D7E1EA6EE06}"/>
-                </a:ext>
-              </a:extLst>
-            </p:cNvPr>
-            <p:cNvCxnSpPr>
-              <a:cxnSpLocks/>
-              <a:stCxn id="5" idx="0"/>
-            </p:cNvCxnSpPr>
-            <p:nvPr/>
-          </p:nvCxnSpPr>
-          <p:spPr>
-            <a:xfrm flipV="1">
-              <a:off x="2862072" y="3171687"/>
-              <a:ext cx="1378331" cy="239375"/>
-            </a:xfrm>
-            <a:prstGeom prst="straightConnector1">
-              <a:avLst/>
-            </a:prstGeom>
-            <a:ln>
-              <a:solidFill>
-                <a:srgbClr val="339933"/>
-              </a:solidFill>
-              <a:headEnd type="none" w="lg" len="med"/>
-              <a:tailEnd type="triangle"/>
-            </a:ln>
-          </p:spPr>
-          <p:style>
-            <a:lnRef idx="1">
-              <a:schemeClr val="accent1"/>
-            </a:lnRef>
-            <a:fillRef idx="0">
-              <a:schemeClr val="accent1"/>
-            </a:fillRef>
-            <a:effectRef idx="0">
-              <a:schemeClr val="accent1"/>
-            </a:effectRef>
-            <a:fontRef idx="minor">
-              <a:schemeClr val="tx1"/>
-            </a:fontRef>
-          </p:style>
-        </p:cxnSp>
-        <p:cxnSp>
-          <p:nvCxnSpPr>
-            <p:cNvPr id="11" name="Straight Arrow Connector 10">
-              <a:extLst>
-                <a:ext uri="{FF2B5EF4-FFF2-40B4-BE49-F238E27FC236}">
-                  <a16:creationId xmlns:a16="http://schemas.microsoft.com/office/drawing/2014/main" id="{9C565427-7C98-EF1D-F468-035551C86E17}"/>
-                </a:ext>
-              </a:extLst>
-            </p:cNvPr>
-            <p:cNvCxnSpPr>
-              <a:cxnSpLocks/>
-            </p:cNvCxnSpPr>
-            <p:nvPr/>
-          </p:nvCxnSpPr>
-          <p:spPr>
-            <a:xfrm flipH="1" flipV="1">
-              <a:off x="5343517" y="3189923"/>
-              <a:ext cx="1" cy="600226"/>
-            </a:xfrm>
-            <a:prstGeom prst="straightConnector1">
-              <a:avLst/>
-            </a:prstGeom>
-            <a:ln>
-              <a:solidFill>
-                <a:srgbClr val="339933"/>
-              </a:solidFill>
-              <a:headEnd type="none" w="lg" len="med"/>
-              <a:tailEnd type="triangle"/>
-            </a:ln>
-          </p:spPr>
-          <p:style>
-            <a:lnRef idx="1">
-              <a:schemeClr val="accent1"/>
-            </a:lnRef>
-            <a:fillRef idx="0">
-              <a:schemeClr val="accent1"/>
-            </a:fillRef>
-            <a:effectRef idx="0">
-              <a:schemeClr val="accent1"/>
-            </a:effectRef>
-            <a:fontRef idx="minor">
-              <a:schemeClr val="tx1"/>
-            </a:fontRef>
-          </p:style>
-        </p:cxnSp>
-        <p:cxnSp>
-          <p:nvCxnSpPr>
-            <p:cNvPr id="14" name="Straight Arrow Connector 13">
-              <a:extLst>
-                <a:ext uri="{FF2B5EF4-FFF2-40B4-BE49-F238E27FC236}">
-                  <a16:creationId xmlns:a16="http://schemas.microsoft.com/office/drawing/2014/main" id="{A1CCFF0B-7F31-DEDC-46E0-1906B95BA3CB}"/>
-                </a:ext>
-              </a:extLst>
-            </p:cNvPr>
-            <p:cNvCxnSpPr>
-              <a:cxnSpLocks/>
-              <a:stCxn id="7" idx="0"/>
-            </p:cNvCxnSpPr>
-            <p:nvPr/>
-          </p:nvCxnSpPr>
-          <p:spPr>
-            <a:xfrm flipH="1" flipV="1">
-              <a:off x="6215647" y="3189923"/>
-              <a:ext cx="2419711" cy="221138"/>
-            </a:xfrm>
-            <a:prstGeom prst="straightConnector1">
-              <a:avLst/>
-            </a:prstGeom>
-            <a:ln>
-              <a:solidFill>
-                <a:srgbClr val="339933"/>
-              </a:solidFill>
-              <a:headEnd type="none" w="lg" len="med"/>
-              <a:tailEnd type="triangle"/>
-            </a:ln>
-          </p:spPr>
-          <p:style>
-            <a:lnRef idx="1">
-              <a:schemeClr val="accent1"/>
-            </a:lnRef>
-            <a:fillRef idx="0">
-              <a:schemeClr val="accent1"/>
-            </a:fillRef>
-            <a:effectRef idx="0">
-              <a:schemeClr val="accent1"/>
-            </a:effectRef>
-            <a:fontRef idx="minor">
-              <a:schemeClr val="tx1"/>
-            </a:fontRef>
-          </p:style>
-        </p:cxnSp>
-      </p:grpSp>
-    </p:spTree>
-    <p:extLst>
-      <p:ext uri="{BB962C8B-B14F-4D97-AF65-F5344CB8AC3E}">
-        <p14:creationId xmlns:p14="http://schemas.microsoft.com/office/powerpoint/2010/main" val="1374729980"/>
-      </p:ext>
-    </p:extLst>
-  </p:cSld>
-  <p:clrMapOvr>
-    <a:masterClrMapping/>
-  </p:clrMapOvr>
-  <p:transition>
-    <p:fade/>
-  </p:transition>
-</p:sld>
-</file>
-
-<file path=ppt/slides/slide25.xml><?xml version="1.0" encoding="utf-8"?>
-<p:sld xmlns:a="http://schemas.openxmlformats.org/drawingml/2006/main" xmlns:r="http://schemas.openxmlformats.org/officeDocument/2006/relationships" xmlns:p="http://schemas.openxmlformats.org/presentationml/2006/main">
-  <p:cSld>
-    <p:spTree>
-      <p:nvGrpSpPr>
-        <p:cNvPr id="1" name=""/>
-        <p:cNvGrpSpPr/>
-        <p:nvPr/>
-      </p:nvGrpSpPr>
-      <p:grpSpPr>
-        <a:xfrm>
-          <a:off x="0" y="0"/>
-          <a:ext cx="0" cy="0"/>
-          <a:chOff x="0" y="0"/>
-          <a:chExt cx="0" cy="0"/>
-        </a:xfrm>
-      </p:grpSpPr>
-      <p:sp>
-        <p:nvSpPr>
-          <p:cNvPr id="2" name="Title 1">
-            <a:extLst>
-              <a:ext uri="{FF2B5EF4-FFF2-40B4-BE49-F238E27FC236}">
-                <a16:creationId xmlns:a16="http://schemas.microsoft.com/office/drawing/2014/main" id="{253D39A9-8C4D-9875-B2C2-1F452CF28C93}"/>
-              </a:ext>
-            </a:extLst>
-          </p:cNvPr>
-          <p:cNvSpPr>
-            <a:spLocks noGrp="1"/>
-          </p:cNvSpPr>
-          <p:nvPr>
-            <p:ph type="title"/>
-          </p:nvPr>
-        </p:nvSpPr>
-        <p:spPr/>
-        <p:txBody>
-          <a:bodyPr/>
-          <a:lstStyle/>
-          <a:p>
-            <a:r>
-              <a:rPr lang="de-DE" dirty="0"/>
-              <a:t>SPF </a:t>
-            </a:r>
-            <a:r>
-              <a:rPr lang="de-DE" dirty="0" err="1"/>
-              <a:t>Macro</a:t>
-            </a:r>
-            <a:r>
-              <a:rPr lang="de-DE" dirty="0"/>
-              <a:t> Platzhalter</a:t>
-            </a:r>
-          </a:p>
-        </p:txBody>
-      </p:sp>
-      <p:graphicFrame>
-        <p:nvGraphicFramePr>
-          <p:cNvPr id="4" name="Table 3">
-            <a:extLst>
-              <a:ext uri="{FF2B5EF4-FFF2-40B4-BE49-F238E27FC236}">
-                <a16:creationId xmlns:a16="http://schemas.microsoft.com/office/drawing/2014/main" id="{628333AA-E433-C5A9-EC13-221CB06545CD}"/>
-              </a:ext>
-            </a:extLst>
-          </p:cNvPr>
-          <p:cNvGraphicFramePr>
-            <a:graphicFrameLocks noGrp="1"/>
-          </p:cNvGraphicFramePr>
-          <p:nvPr>
-            <p:extLst>
-              <p:ext uri="{D42A27DB-BD31-4B8C-83A1-F6EECF244321}">
-                <p14:modId xmlns:p14="http://schemas.microsoft.com/office/powerpoint/2010/main" val="614359555"/>
-              </p:ext>
-            </p:extLst>
-          </p:nvPr>
-        </p:nvGraphicFramePr>
-        <p:xfrm>
-          <a:off x="2072746" y="1777792"/>
-          <a:ext cx="8290984" cy="3712210"/>
-        </p:xfrm>
-        <a:graphic>
-          <a:graphicData uri="http://schemas.openxmlformats.org/drawingml/2006/table">
-            <a:tbl>
-              <a:tblPr firstRow="1" bandRow="1">
-                <a:tableStyleId>{5C22544A-7EE6-4342-B048-85BDC9FD1C3A}</a:tableStyleId>
-              </a:tblPr>
-              <a:tblGrid>
-                <a:gridCol w="1017926">
-                  <a:extLst>
-                    <a:ext uri="{9D8B030D-6E8A-4147-A177-3AD203B41FA5}">
-                      <a16:colId xmlns:a16="http://schemas.microsoft.com/office/drawing/2014/main" val="3089028256"/>
-                    </a:ext>
-                  </a:extLst>
-                </a:gridCol>
-                <a:gridCol w="7273058">
-                  <a:extLst>
-                    <a:ext uri="{9D8B030D-6E8A-4147-A177-3AD203B41FA5}">
-                      <a16:colId xmlns:a16="http://schemas.microsoft.com/office/drawing/2014/main" val="549014472"/>
-                    </a:ext>
-                  </a:extLst>
-                </a:gridCol>
-              </a:tblGrid>
-              <a:tr h="370840">
-                <a:tc>
-                  <a:txBody>
-                    <a:bodyPr/>
-                    <a:lstStyle/>
-                    <a:p>
-                      <a:pPr algn="ctr"/>
-                      <a:r>
-                        <a:rPr lang="de-DE" dirty="0" err="1"/>
-                        <a:t>Macro</a:t>
-                      </a:r>
-                      <a:endParaRPr lang="de-DE" dirty="0"/>
-                    </a:p>
-                  </a:txBody>
-                  <a:tcPr anchor="ctr"/>
-                </a:tc>
-                <a:tc>
-                  <a:txBody>
-                    <a:bodyPr/>
-                    <a:lstStyle/>
-                    <a:p>
-                      <a:r>
-                        <a:rPr lang="de-DE" noProof="0" dirty="0"/>
-                        <a:t>Bedeutung</a:t>
-                      </a:r>
-                    </a:p>
-                  </a:txBody>
-                  <a:tcPr/>
-                </a:tc>
-                <a:extLst>
-                  <a:ext uri="{0D108BD9-81ED-4DB2-BD59-A6C34878D82A}">
-                    <a16:rowId xmlns:a16="http://schemas.microsoft.com/office/drawing/2014/main" val="190463916"/>
-                  </a:ext>
-                </a:extLst>
-              </a:tr>
-              <a:tr h="370840">
-                <a:tc>
-                  <a:txBody>
-                    <a:bodyPr/>
-                    <a:lstStyle/>
-                    <a:p>
-                      <a:pPr algn="ctr"/>
-                      <a:r>
-                        <a:rPr lang="de-DE" dirty="0"/>
-                        <a:t>%{s}</a:t>
-                      </a:r>
-                    </a:p>
-                  </a:txBody>
-                  <a:tcPr anchor="ctr"/>
-                </a:tc>
-                <a:tc>
-                  <a:txBody>
-                    <a:bodyPr/>
-                    <a:lstStyle/>
-                    <a:p>
-                      <a:r>
-                        <a:rPr lang="de-DE" noProof="0" dirty="0"/>
-                        <a:t>Der Absender der zu empfangenden Email. e.g. joe@example.com.</a:t>
-                      </a:r>
-                    </a:p>
-                  </a:txBody>
-                  <a:tcPr/>
-                </a:tc>
-                <a:extLst>
-                  <a:ext uri="{0D108BD9-81ED-4DB2-BD59-A6C34878D82A}">
-                    <a16:rowId xmlns:a16="http://schemas.microsoft.com/office/drawing/2014/main" val="480839123"/>
-                  </a:ext>
-                </a:extLst>
-              </a:tr>
-              <a:tr h="370840">
-                <a:tc>
-                  <a:txBody>
-                    <a:bodyPr/>
-                    <a:lstStyle/>
-                    <a:p>
-                      <a:pPr algn="ctr"/>
-                      <a:r>
-                        <a:rPr lang="de-DE" dirty="0"/>
-                        <a:t>%{l}</a:t>
-                      </a:r>
-                    </a:p>
-                  </a:txBody>
-                  <a:tcPr anchor="ctr"/>
-                </a:tc>
-                <a:tc>
-                  <a:txBody>
-                    <a:bodyPr/>
-                    <a:lstStyle/>
-                    <a:p>
-                      <a:r>
-                        <a:rPr lang="de-DE" noProof="0" dirty="0"/>
-                        <a:t>Der Name des Absenders, e.g. </a:t>
-                      </a:r>
-                      <a:r>
-                        <a:rPr lang="de-DE" noProof="0" dirty="0" err="1"/>
-                        <a:t>joe</a:t>
-                      </a:r>
-                      <a:endParaRPr lang="de-DE" noProof="0" dirty="0"/>
-                    </a:p>
-                  </a:txBody>
-                  <a:tcPr/>
-                </a:tc>
-                <a:extLst>
-                  <a:ext uri="{0D108BD9-81ED-4DB2-BD59-A6C34878D82A}">
-                    <a16:rowId xmlns:a16="http://schemas.microsoft.com/office/drawing/2014/main" val="2655614981"/>
-                  </a:ext>
-                </a:extLst>
-              </a:tr>
-              <a:tr h="370840">
-                <a:tc>
-                  <a:txBody>
-                    <a:bodyPr/>
-                    <a:lstStyle/>
-                    <a:p>
-                      <a:pPr algn="ctr"/>
-                      <a:r>
-                        <a:rPr lang="de-DE" dirty="0"/>
-                        <a:t>%{o}</a:t>
-                      </a:r>
-                    </a:p>
-                  </a:txBody>
-                  <a:tcPr anchor="ctr"/>
-                </a:tc>
-                <a:tc>
-                  <a:txBody>
-                    <a:bodyPr/>
-                    <a:lstStyle/>
-                    <a:p>
-                      <a:r>
-                        <a:rPr lang="de-DE" noProof="0" dirty="0"/>
-                        <a:t>Domäne des Absenders</a:t>
-                      </a:r>
-                    </a:p>
-                  </a:txBody>
-                  <a:tcPr/>
-                </a:tc>
-                <a:extLst>
-                  <a:ext uri="{0D108BD9-81ED-4DB2-BD59-A6C34878D82A}">
-                    <a16:rowId xmlns:a16="http://schemas.microsoft.com/office/drawing/2014/main" val="1595282138"/>
-                  </a:ext>
-                </a:extLst>
-              </a:tr>
-              <a:tr h="370840">
-                <a:tc>
-                  <a:txBody>
-                    <a:bodyPr/>
-                    <a:lstStyle/>
-                    <a:p>
-                      <a:pPr algn="ctr"/>
-                      <a:r>
-                        <a:rPr lang="de-DE" dirty="0"/>
-                        <a:t>%{d}</a:t>
-                      </a:r>
-                    </a:p>
-                  </a:txBody>
-                  <a:tcPr anchor="ctr"/>
-                </a:tc>
-                <a:tc>
-                  <a:txBody>
-                    <a:bodyPr/>
-                    <a:lstStyle/>
-                    <a:p>
-                      <a:r>
-                        <a:rPr lang="de-DE" noProof="0" dirty="0"/>
-                        <a:t>Die autoritative Domäne der aktuellen SPF </a:t>
-                      </a:r>
-                      <a:r>
-                        <a:rPr lang="de-DE" noProof="0" dirty="0" err="1"/>
-                        <a:t>Richtilinie</a:t>
-                      </a:r>
-                      <a:endParaRPr lang="de-DE" noProof="0" dirty="0"/>
-                    </a:p>
-                  </a:txBody>
-                  <a:tcPr/>
-                </a:tc>
-                <a:extLst>
-                  <a:ext uri="{0D108BD9-81ED-4DB2-BD59-A6C34878D82A}">
-                    <a16:rowId xmlns:a16="http://schemas.microsoft.com/office/drawing/2014/main" val="4221636510"/>
-                  </a:ext>
-                </a:extLst>
-              </a:tr>
-              <a:tr h="370840">
-                <a:tc>
-                  <a:txBody>
-                    <a:bodyPr/>
-                    <a:lstStyle/>
-                    <a:p>
-                      <a:pPr algn="ctr"/>
-                      <a:r>
-                        <a:rPr lang="de-DE" dirty="0"/>
-                        <a:t>%{i}</a:t>
-                      </a:r>
-                    </a:p>
-                  </a:txBody>
-                  <a:tcPr anchor="ctr"/>
-                </a:tc>
-                <a:tc>
-                  <a:txBody>
-                    <a:bodyPr/>
-                    <a:lstStyle/>
-                    <a:p>
-                      <a:r>
-                        <a:rPr lang="de-DE" noProof="0" dirty="0"/>
-                        <a:t>Die Quell-IP der Nachricht</a:t>
-                      </a:r>
-                    </a:p>
-                  </a:txBody>
-                  <a:tcPr/>
-                </a:tc>
-                <a:extLst>
-                  <a:ext uri="{0D108BD9-81ED-4DB2-BD59-A6C34878D82A}">
-                    <a16:rowId xmlns:a16="http://schemas.microsoft.com/office/drawing/2014/main" val="3211720426"/>
-                  </a:ext>
-                </a:extLst>
-              </a:tr>
-              <a:tr h="370840">
-                <a:tc>
-                  <a:txBody>
-                    <a:bodyPr/>
-                    <a:lstStyle/>
-                    <a:p>
-                      <a:pPr algn="ctr"/>
-                      <a:r>
-                        <a:rPr lang="de-DE" dirty="0"/>
-                        <a:t>%{p}</a:t>
-                      </a:r>
-                    </a:p>
-                  </a:txBody>
-                  <a:tcPr anchor="ctr"/>
-                </a:tc>
-                <a:tc>
-                  <a:txBody>
-                    <a:bodyPr/>
-                    <a:lstStyle/>
-                    <a:p>
-                      <a:r>
-                        <a:rPr lang="de-DE" noProof="0" dirty="0"/>
-                        <a:t>Die validierte Reverse-Lookup Domäne der Quell-IP</a:t>
-                      </a:r>
-                    </a:p>
-                  </a:txBody>
-                  <a:tcPr/>
-                </a:tc>
-                <a:extLst>
-                  <a:ext uri="{0D108BD9-81ED-4DB2-BD59-A6C34878D82A}">
-                    <a16:rowId xmlns:a16="http://schemas.microsoft.com/office/drawing/2014/main" val="2814321009"/>
-                  </a:ext>
-                </a:extLst>
-              </a:tr>
-              <a:tr h="370840">
-                <a:tc>
-                  <a:txBody>
-                    <a:bodyPr/>
-                    <a:lstStyle/>
-                    <a:p>
-                      <a:pPr algn="ctr"/>
-                      <a:r>
-                        <a:rPr lang="de-DE" dirty="0"/>
-                        <a:t>%{v}</a:t>
-                      </a:r>
-                    </a:p>
-                  </a:txBody>
-                  <a:tcPr anchor="ctr"/>
-                </a:tc>
-                <a:tc>
-                  <a:txBody>
-                    <a:bodyPr/>
-                    <a:lstStyle/>
-                    <a:p>
-                      <a:r>
-                        <a:rPr lang="de-DE" noProof="0" dirty="0"/>
-                        <a:t>Statischer „in-</a:t>
-                      </a:r>
-                      <a:r>
-                        <a:rPr lang="de-DE" noProof="0" dirty="0" err="1"/>
-                        <a:t>addr</a:t>
-                      </a:r>
-                      <a:r>
-                        <a:rPr lang="de-DE" noProof="0" dirty="0"/>
-                        <a:t>“ String (für Reverse Lookup)</a:t>
-                      </a:r>
-                    </a:p>
-                  </a:txBody>
-                  <a:tcPr/>
-                </a:tc>
-                <a:extLst>
-                  <a:ext uri="{0D108BD9-81ED-4DB2-BD59-A6C34878D82A}">
-                    <a16:rowId xmlns:a16="http://schemas.microsoft.com/office/drawing/2014/main" val="3236108336"/>
-                  </a:ext>
-                </a:extLst>
-              </a:tr>
-              <a:tr h="370840">
-                <a:tc>
-                  <a:txBody>
-                    <a:bodyPr/>
-                    <a:lstStyle/>
-                    <a:p>
-                      <a:pPr algn="ctr"/>
-                      <a:r>
-                        <a:rPr lang="de-DE" dirty="0"/>
-                        <a:t>%{h}</a:t>
-                      </a:r>
-                    </a:p>
-                  </a:txBody>
-                  <a:tcPr anchor="ctr"/>
-                </a:tc>
-                <a:tc>
-                  <a:txBody>
-                    <a:bodyPr/>
-                    <a:lstStyle/>
-                    <a:p>
-                      <a:r>
-                        <a:rPr lang="en-US" noProof="0" dirty="0" err="1"/>
-                        <a:t>Domäne</a:t>
-                      </a:r>
-                      <a:r>
-                        <a:rPr lang="en-US" noProof="0" dirty="0"/>
-                        <a:t> die </a:t>
-                      </a:r>
-                      <a:r>
-                        <a:rPr lang="en-US" noProof="0" dirty="0" err="1"/>
-                        <a:t>im</a:t>
-                      </a:r>
-                      <a:r>
-                        <a:rPr lang="en-US" noProof="0" dirty="0"/>
-                        <a:t> SMTP HELO or EHLO command </a:t>
-                      </a:r>
-                      <a:r>
-                        <a:rPr lang="en-US" noProof="0" dirty="0" err="1"/>
-                        <a:t>benutzt</a:t>
-                      </a:r>
-                      <a:r>
-                        <a:rPr lang="en-US" noProof="0" dirty="0"/>
-                        <a:t> </a:t>
-                      </a:r>
-                      <a:r>
-                        <a:rPr lang="en-US" noProof="0" dirty="0" err="1"/>
-                        <a:t>wird</a:t>
-                      </a:r>
-                      <a:endParaRPr lang="de-DE" noProof="0" dirty="0"/>
-                    </a:p>
-                  </a:txBody>
-                  <a:tcPr/>
-                </a:tc>
-                <a:extLst>
-                  <a:ext uri="{0D108BD9-81ED-4DB2-BD59-A6C34878D82A}">
-                    <a16:rowId xmlns:a16="http://schemas.microsoft.com/office/drawing/2014/main" val="3511241766"/>
-                  </a:ext>
-                </a:extLst>
-              </a:tr>
-              <a:tr h="370840">
-                <a:tc>
-                  <a:txBody>
-                    <a:bodyPr/>
-                    <a:lstStyle/>
-                    <a:p>
-                      <a:pPr algn="ctr"/>
-                      <a:r>
-                        <a:rPr lang="de-DE" dirty="0"/>
-                        <a:t>r</a:t>
-                      </a:r>
-                    </a:p>
-                  </a:txBody>
-                  <a:tcPr anchor="ctr"/>
-                </a:tc>
-                <a:tc>
-                  <a:txBody>
-                    <a:bodyPr/>
-                    <a:lstStyle/>
-                    <a:p>
-                      <a:r>
-                        <a:rPr lang="de-DE" noProof="0" dirty="0"/>
-                        <a:t>Zusätzlicher </a:t>
-                      </a:r>
-                      <a:r>
-                        <a:rPr lang="de-DE" noProof="0" dirty="0" err="1"/>
-                        <a:t>Modifier</a:t>
-                      </a:r>
-                      <a:r>
-                        <a:rPr lang="de-DE" noProof="0" dirty="0"/>
-                        <a:t> für Umgekehrte Evaluierung</a:t>
-                      </a:r>
-                    </a:p>
-                  </a:txBody>
-                  <a:tcPr/>
-                </a:tc>
-                <a:extLst>
-                  <a:ext uri="{0D108BD9-81ED-4DB2-BD59-A6C34878D82A}">
-                    <a16:rowId xmlns:a16="http://schemas.microsoft.com/office/drawing/2014/main" val="2290087415"/>
-                  </a:ext>
-                </a:extLst>
-              </a:tr>
-            </a:tbl>
-          </a:graphicData>
-        </a:graphic>
-      </p:graphicFrame>
-    </p:spTree>
-    <p:extLst>
-      <p:ext uri="{BB962C8B-B14F-4D97-AF65-F5344CB8AC3E}">
-        <p14:creationId xmlns:p14="http://schemas.microsoft.com/office/powerpoint/2010/main" val="2720347774"/>
-      </p:ext>
-    </p:extLst>
-  </p:cSld>
-  <p:clrMapOvr>
-    <a:masterClrMapping/>
-  </p:clrMapOvr>
-  <p:transition>
-    <p:fade/>
-  </p:transition>
-</p:sld>
-</file>
-
-<file path=ppt/slides/slide26.xml><?xml version="1.0" encoding="utf-8"?>
 <p:sld xmlns:a="http://schemas.openxmlformats.org/drawingml/2006/main" xmlns:r="http://schemas.openxmlformats.org/officeDocument/2006/relationships" xmlns:p="http://schemas.openxmlformats.org/presentationml/2006/main">
   <p:cSld>
     <p:spTree>
@@ -19178,7 +17826,7 @@
 </p:sld>
 </file>
 
-<file path=ppt/slides/slide27.xml><?xml version="1.0" encoding="utf-8"?>
+<file path=ppt/slides/slide25.xml><?xml version="1.0" encoding="utf-8"?>
 <p:sld xmlns:a="http://schemas.openxmlformats.org/drawingml/2006/main" xmlns:r="http://schemas.openxmlformats.org/officeDocument/2006/relationships" xmlns:p="http://schemas.openxmlformats.org/presentationml/2006/main">
   <p:cSld>
     <p:spTree>
@@ -19328,23 +17976,7 @@
                   <a:schemeClr val="tx1"/>
                 </a:solidFill>
               </a:rPr>
-              <a:t>myetc.at </a:t>
-            </a:r>
-            <a:r>
-              <a:rPr lang="de-DE" sz="1800" dirty="0">
-                <a:solidFill>
-                  <a:srgbClr val="C00000"/>
-                </a:solidFill>
-              </a:rPr>
-              <a:t>-&gt;</a:t>
-            </a:r>
-            <a:r>
-              <a:rPr lang="de-DE" sz="1800" dirty="0">
-                <a:solidFill>
-                  <a:schemeClr val="tx1"/>
-                </a:solidFill>
-              </a:rPr>
-              <a:t> selector1-myetc-at._domainkey. myetcat.onmicrosoft.com</a:t>
+              <a:t>myetc.at -&gt; selector1-myetc-at._domainkey.ntxbocgat.onmicrosoft.com</a:t>
             </a:r>
           </a:p>
           <a:p>
@@ -19379,23 +18011,7 @@
                   <a:schemeClr val="tx1"/>
                 </a:solidFill>
               </a:rPr>
-              <a:t>myetc.at </a:t>
-            </a:r>
-            <a:r>
-              <a:rPr lang="de-DE" sz="2000" dirty="0">
-                <a:solidFill>
-                  <a:srgbClr val="C00000"/>
-                </a:solidFill>
-              </a:rPr>
-              <a:t>-&gt;</a:t>
-            </a:r>
-            <a:r>
-              <a:rPr lang="de-DE" sz="2000" dirty="0">
-                <a:solidFill>
-                  <a:schemeClr val="tx1"/>
-                </a:solidFill>
-              </a:rPr>
-              <a:t> dkim2.mcsv.net</a:t>
+              <a:t>myetc.at -&gt; dkim2.mcsv.net</a:t>
             </a:r>
           </a:p>
         </p:txBody>
@@ -19416,7 +18032,7 @@
 </p:sld>
 </file>
 
-<file path=ppt/slides/slide28.xml><?xml version="1.0" encoding="utf-8"?>
+<file path=ppt/slides/slide26.xml><?xml version="1.0" encoding="utf-8"?>
 <p:sld xmlns:a="http://schemas.openxmlformats.org/drawingml/2006/main" xmlns:r="http://schemas.openxmlformats.org/officeDocument/2006/relationships" xmlns:p="http://schemas.openxmlformats.org/presentationml/2006/main">
   <p:cSld>
     <p:spTree>
@@ -19518,7 +18134,7 @@
             </a:r>
             <a:r>
               <a:rPr lang="de-DE" dirty="0"/>
-              <a:t> die selbst DKIM unterstützen</a:t>
+              <a:t> die selbst DKIM beherrschen</a:t>
             </a:r>
           </a:p>
           <a:p>
@@ -19585,7 +18201,7 @@
 </p:sld>
 </file>
 
-<file path=ppt/slides/slide29.xml><?xml version="1.0" encoding="utf-8"?>
+<file path=ppt/slides/slide27.xml><?xml version="1.0" encoding="utf-8"?>
 <p:sld xmlns:a="http://schemas.openxmlformats.org/drawingml/2006/main" xmlns:r="http://schemas.openxmlformats.org/officeDocument/2006/relationships" xmlns:p="http://schemas.openxmlformats.org/presentationml/2006/main">
   <p:cSld>
     <p:spTree>
@@ -19755,80 +18371,7 @@
 </p:sld>
 </file>
 
-<file path=ppt/slides/slide3.xml><?xml version="1.0" encoding="utf-8"?>
-<p:sld xmlns:a="http://schemas.openxmlformats.org/drawingml/2006/main" xmlns:r="http://schemas.openxmlformats.org/officeDocument/2006/relationships" xmlns:p="http://schemas.openxmlformats.org/presentationml/2006/main">
-  <p:cSld>
-    <p:spTree>
-      <p:nvGrpSpPr>
-        <p:cNvPr id="1" name=""/>
-        <p:cNvGrpSpPr/>
-        <p:nvPr/>
-      </p:nvGrpSpPr>
-      <p:grpSpPr>
-        <a:xfrm>
-          <a:off x="0" y="0"/>
-          <a:ext cx="0" cy="0"/>
-          <a:chOff x="0" y="0"/>
-          <a:chExt cx="0" cy="0"/>
-        </a:xfrm>
-      </p:grpSpPr>
-      <p:sp>
-        <p:nvSpPr>
-          <p:cNvPr id="4" name="Title 3">
-            <a:extLst>
-              <a:ext uri="{FF2B5EF4-FFF2-40B4-BE49-F238E27FC236}">
-                <a16:creationId xmlns:a16="http://schemas.microsoft.com/office/drawing/2014/main" id="{841CB59B-EF9E-4E47-BF33-B8075EB6C7A1}"/>
-              </a:ext>
-            </a:extLst>
-          </p:cNvPr>
-          <p:cNvSpPr>
-            <a:spLocks noGrp="1"/>
-          </p:cNvSpPr>
-          <p:nvPr>
-            <p:ph type="title"/>
-          </p:nvPr>
-        </p:nvSpPr>
-        <p:spPr>
-          <a:xfrm>
-            <a:off x="437277" y="1966763"/>
-            <a:ext cx="6000845" cy="2444900"/>
-          </a:xfrm>
-        </p:spPr>
-        <p:txBody>
-          <a:bodyPr/>
-          <a:lstStyle/>
-          <a:p>
-            <a:r>
-              <a:rPr lang="de-DE" noProof="0" dirty="0"/>
-              <a:t>Modul 01:</a:t>
-            </a:r>
-            <a:br>
-              <a:rPr lang="de-DE" noProof="0" dirty="0"/>
-            </a:br>
-            <a:r>
-              <a:rPr lang="de-DE" noProof="0" dirty="0"/>
-              <a:t>Überblick/Architektur</a:t>
-            </a:r>
-          </a:p>
-        </p:txBody>
-      </p:sp>
-    </p:spTree>
-    <p:extLst>
-      <p:ext uri="{BB962C8B-B14F-4D97-AF65-F5344CB8AC3E}">
-        <p14:creationId xmlns:p14="http://schemas.microsoft.com/office/powerpoint/2010/main" val="3018641981"/>
-      </p:ext>
-    </p:extLst>
-  </p:cSld>
-  <p:clrMapOvr>
-    <a:masterClrMapping/>
-  </p:clrMapOvr>
-  <p:transition>
-    <p:fade/>
-  </p:transition>
-</p:sld>
-</file>
-
-<file path=ppt/slides/slide30.xml><?xml version="1.0" encoding="utf-8"?>
+<file path=ppt/slides/slide28.xml><?xml version="1.0" encoding="utf-8"?>
 <p:sld xmlns:a="http://schemas.openxmlformats.org/drawingml/2006/main" xmlns:r="http://schemas.openxmlformats.org/officeDocument/2006/relationships" xmlns:p="http://schemas.openxmlformats.org/presentationml/2006/main">
   <p:cSld>
     <p:spTree>
@@ -20059,7 +18602,7 @@
 </p:sld>
 </file>
 
-<file path=ppt/slides/slide31.xml><?xml version="1.0" encoding="utf-8"?>
+<file path=ppt/slides/slide29.xml><?xml version="1.0" encoding="utf-8"?>
 <p:sld xmlns:a="http://schemas.openxmlformats.org/drawingml/2006/main" xmlns:r="http://schemas.openxmlformats.org/officeDocument/2006/relationships" xmlns:p="http://schemas.openxmlformats.org/presentationml/2006/main">
   <p:cSld>
     <p:spTree>
@@ -20154,7 +18697,7 @@
           <p:nvPr>
             <p:extLst>
               <p:ext uri="{D42A27DB-BD31-4B8C-83A1-F6EECF244321}">
-                <p14:modId xmlns:p14="http://schemas.microsoft.com/office/powerpoint/2010/main" val="1552381041"/>
+                <p14:modId xmlns:p14="http://schemas.microsoft.com/office/powerpoint/2010/main" val="2414809775"/>
               </p:ext>
             </p:extLst>
           </p:nvPr>
@@ -20331,7 +18874,7 @@
                       </a:r>
                       <a:r>
                         <a:rPr lang="de-DE" sz="1400" dirty="0"/>
-                        <a:t> der Nachrichten die entsprechend der Policy („p“) gefiltert werden</a:t>
+                        <a:t> der Nachrichten die entsprechend „p“ gefiltert werden</a:t>
                       </a:r>
                     </a:p>
                   </a:txBody>
@@ -20714,7 +19257,80 @@
 </p:sld>
 </file>
 
-<file path=ppt/slides/slide32.xml><?xml version="1.0" encoding="utf-8"?>
+<file path=ppt/slides/slide3.xml><?xml version="1.0" encoding="utf-8"?>
+<p:sld xmlns:a="http://schemas.openxmlformats.org/drawingml/2006/main" xmlns:r="http://schemas.openxmlformats.org/officeDocument/2006/relationships" xmlns:p="http://schemas.openxmlformats.org/presentationml/2006/main">
+  <p:cSld>
+    <p:spTree>
+      <p:nvGrpSpPr>
+        <p:cNvPr id="1" name=""/>
+        <p:cNvGrpSpPr/>
+        <p:nvPr/>
+      </p:nvGrpSpPr>
+      <p:grpSpPr>
+        <a:xfrm>
+          <a:off x="0" y="0"/>
+          <a:ext cx="0" cy="0"/>
+          <a:chOff x="0" y="0"/>
+          <a:chExt cx="0" cy="0"/>
+        </a:xfrm>
+      </p:grpSpPr>
+      <p:sp>
+        <p:nvSpPr>
+          <p:cNvPr id="4" name="Title 3">
+            <a:extLst>
+              <a:ext uri="{FF2B5EF4-FFF2-40B4-BE49-F238E27FC236}">
+                <a16:creationId xmlns:a16="http://schemas.microsoft.com/office/drawing/2014/main" id="{841CB59B-EF9E-4E47-BF33-B8075EB6C7A1}"/>
+              </a:ext>
+            </a:extLst>
+          </p:cNvPr>
+          <p:cNvSpPr>
+            <a:spLocks noGrp="1"/>
+          </p:cNvSpPr>
+          <p:nvPr>
+            <p:ph type="title"/>
+          </p:nvPr>
+        </p:nvSpPr>
+        <p:spPr>
+          <a:xfrm>
+            <a:off x="437277" y="1966763"/>
+            <a:ext cx="6000845" cy="2444900"/>
+          </a:xfrm>
+        </p:spPr>
+        <p:txBody>
+          <a:bodyPr/>
+          <a:lstStyle/>
+          <a:p>
+            <a:r>
+              <a:rPr lang="de-DE" noProof="0" dirty="0"/>
+              <a:t>Modul 01:</a:t>
+            </a:r>
+            <a:br>
+              <a:rPr lang="de-DE" noProof="0" dirty="0"/>
+            </a:br>
+            <a:r>
+              <a:rPr lang="de-DE" noProof="0" dirty="0"/>
+              <a:t>Überblick/Architektur</a:t>
+            </a:r>
+          </a:p>
+        </p:txBody>
+      </p:sp>
+    </p:spTree>
+    <p:extLst>
+      <p:ext uri="{BB962C8B-B14F-4D97-AF65-F5344CB8AC3E}">
+        <p14:creationId xmlns:p14="http://schemas.microsoft.com/office/powerpoint/2010/main" val="3018641981"/>
+      </p:ext>
+    </p:extLst>
+  </p:cSld>
+  <p:clrMapOvr>
+    <a:masterClrMapping/>
+  </p:clrMapOvr>
+  <p:transition>
+    <p:fade/>
+  </p:transition>
+</p:sld>
+</file>
+
+<file path=ppt/slides/slide30.xml><?xml version="1.0" encoding="utf-8"?>
 <p:sld xmlns:a="http://schemas.openxmlformats.org/drawingml/2006/main" xmlns:r="http://schemas.openxmlformats.org/officeDocument/2006/relationships" xmlns:p="http://schemas.openxmlformats.org/presentationml/2006/main">
   <p:cSld>
     <p:spTree>
@@ -21027,7 +19643,7 @@
 </p:sld>
 </file>
 
-<file path=ppt/slides/slide33.xml><?xml version="1.0" encoding="utf-8"?>
+<file path=ppt/slides/slide31.xml><?xml version="1.0" encoding="utf-8"?>
 <p:sld xmlns:a="http://schemas.openxmlformats.org/drawingml/2006/main" xmlns:r="http://schemas.openxmlformats.org/officeDocument/2006/relationships" xmlns:p="http://schemas.openxmlformats.org/presentationml/2006/main">
   <p:cSld>
     <p:spTree>
@@ -21119,7 +19735,7 @@
 </p:sld>
 </file>
 
-<file path=ppt/slides/slide34.xml><?xml version="1.0" encoding="utf-8"?>
+<file path=ppt/slides/slide32.xml><?xml version="1.0" encoding="utf-8"?>
 <p:sld xmlns:a="http://schemas.openxmlformats.org/drawingml/2006/main" xmlns:r="http://schemas.openxmlformats.org/officeDocument/2006/relationships" xmlns:p="http://schemas.openxmlformats.org/presentationml/2006/main">
   <p:cSld>
     <p:spTree>
@@ -21212,7 +19828,7 @@
           <a:p>
             <a:r>
               <a:rPr lang="de-DE" dirty="0"/>
-              <a:t>Seit 10.8.2023 befolgt EOP den DMARC DNS </a:t>
+              <a:t>Seit 10.8.23 befolgt EOP den DMARC DNS </a:t>
             </a:r>
             <a:r>
               <a:rPr lang="de-DE" dirty="0" err="1"/>
@@ -21306,7 +19922,7 @@
 </p:sld>
 </file>
 
-<file path=ppt/slides/slide35.xml><?xml version="1.0" encoding="utf-8"?>
+<file path=ppt/slides/slide33.xml><?xml version="1.0" encoding="utf-8"?>
 <p:sld xmlns:a="http://schemas.openxmlformats.org/drawingml/2006/main" xmlns:r="http://schemas.openxmlformats.org/officeDocument/2006/relationships" xmlns:p="http://schemas.openxmlformats.org/presentationml/2006/main">
   <p:cSld>
     <p:spTree>
@@ -21547,9 +20163,9 @@
         <p:grpSpPr>
           <a:xfrm>
             <a:off x="3324406" y="5294523"/>
-            <a:ext cx="8663378" cy="1600423"/>
+            <a:ext cx="8515117" cy="1600423"/>
             <a:chOff x="3324406" y="5294523"/>
-            <a:chExt cx="8663378" cy="1600423"/>
+            <a:chExt cx="8515117" cy="1600423"/>
           </a:xfrm>
         </p:grpSpPr>
         <p:pic>
@@ -21591,15 +20207,13 @@
                 </a:ext>
               </a:extLst>
             </p:cNvPr>
-            <p:cNvCxnSpPr>
-              <a:cxnSpLocks/>
-            </p:cNvCxnSpPr>
+            <p:cNvCxnSpPr/>
             <p:nvPr/>
           </p:nvCxnSpPr>
           <p:spPr>
             <a:xfrm flipH="1">
               <a:off x="8488392" y="5736566"/>
-              <a:ext cx="814965" cy="170458"/>
+              <a:ext cx="1138687" cy="103517"/>
             </a:xfrm>
             <a:prstGeom prst="straightConnector1">
               <a:avLst/>
@@ -21641,8 +20255,8 @@
           </p:nvSpPr>
           <p:spPr>
             <a:xfrm>
-              <a:off x="9368922" y="5527703"/>
-              <a:ext cx="2618862" cy="307777"/>
+              <a:off x="9303357" y="5428789"/>
+              <a:ext cx="2536166" cy="615553"/>
             </a:xfrm>
             <a:prstGeom prst="rect">
               <a:avLst/>
@@ -22069,7 +20683,7 @@
 </p:sld>
 </file>
 
-<file path=ppt/slides/slide36.xml><?xml version="1.0" encoding="utf-8"?>
+<file path=ppt/slides/slide34.xml><?xml version="1.0" encoding="utf-8"?>
 <p:sld xmlns:a="http://schemas.openxmlformats.org/drawingml/2006/main" xmlns:r="http://schemas.openxmlformats.org/officeDocument/2006/relationships" xmlns:p="http://schemas.openxmlformats.org/presentationml/2006/main">
   <p:cSld>
     <p:spTree>
@@ -22299,7 +20913,7 @@
 </p:sld>
 </file>
 
-<file path=ppt/slides/slide37.xml><?xml version="1.0" encoding="utf-8"?>
+<file path=ppt/slides/slide35.xml><?xml version="1.0" encoding="utf-8"?>
 <p:sld xmlns:a="http://schemas.openxmlformats.org/drawingml/2006/main" xmlns:r="http://schemas.openxmlformats.org/officeDocument/2006/relationships" xmlns:p="http://schemas.openxmlformats.org/presentationml/2006/main">
   <p:cSld>
     <p:spTree>
@@ -22412,7 +21026,7 @@
 </p:sld>
 </file>
 
-<file path=ppt/slides/slide38.xml><?xml version="1.0" encoding="utf-8"?>
+<file path=ppt/slides/slide36.xml><?xml version="1.0" encoding="utf-8"?>
 <p:sld xmlns:a="http://schemas.openxmlformats.org/drawingml/2006/main" xmlns:r="http://schemas.openxmlformats.org/officeDocument/2006/relationships" xmlns:p="http://schemas.openxmlformats.org/presentationml/2006/main">
   <p:cSld>
     <p:spTree>
@@ -22727,7 +21341,7 @@
 </p:sld>
 </file>
 
-<file path=ppt/slides/slide39.xml><?xml version="1.0" encoding="utf-8"?>
+<file path=ppt/slides/slide37.xml><?xml version="1.0" encoding="utf-8"?>
 <p:sld xmlns:a="http://schemas.openxmlformats.org/drawingml/2006/main" xmlns:r="http://schemas.openxmlformats.org/officeDocument/2006/relationships" xmlns:p="http://schemas.openxmlformats.org/presentationml/2006/main">
   <p:cSld>
     <p:spTree>
@@ -23075,157 +21689,7 @@
 </p:sld>
 </file>
 
-<file path=ppt/slides/slide4.xml><?xml version="1.0" encoding="utf-8"?>
-<p:sld xmlns:a="http://schemas.openxmlformats.org/drawingml/2006/main" xmlns:r="http://schemas.openxmlformats.org/officeDocument/2006/relationships" xmlns:p="http://schemas.openxmlformats.org/presentationml/2006/main">
-  <p:cSld>
-    <p:spTree>
-      <p:nvGrpSpPr>
-        <p:cNvPr id="1" name=""/>
-        <p:cNvGrpSpPr/>
-        <p:nvPr/>
-      </p:nvGrpSpPr>
-      <p:grpSpPr>
-        <a:xfrm>
-          <a:off x="0" y="0"/>
-          <a:ext cx="0" cy="0"/>
-          <a:chOff x="0" y="0"/>
-          <a:chExt cx="0" cy="0"/>
-        </a:xfrm>
-      </p:grpSpPr>
-      <p:sp>
-        <p:nvSpPr>
-          <p:cNvPr id="9" name="Title 8">
-            <a:extLst>
-              <a:ext uri="{FF2B5EF4-FFF2-40B4-BE49-F238E27FC236}">
-                <a16:creationId xmlns:a16="http://schemas.microsoft.com/office/drawing/2014/main" id="{38119FA4-F7C9-920C-19B6-CA74C5A6C013}"/>
-              </a:ext>
-            </a:extLst>
-          </p:cNvPr>
-          <p:cNvSpPr>
-            <a:spLocks noGrp="1"/>
-          </p:cNvSpPr>
-          <p:nvPr>
-            <p:ph type="title"/>
-          </p:nvPr>
-        </p:nvSpPr>
-        <p:spPr/>
-        <p:txBody>
-          <a:bodyPr/>
-          <a:lstStyle/>
-          <a:p>
-            <a:r>
-              <a:rPr lang="de-DE" noProof="0" dirty="0"/>
-              <a:t>Exchange Online </a:t>
-            </a:r>
-            <a:r>
-              <a:rPr lang="de-DE" noProof="0" dirty="0" err="1"/>
-              <a:t>Protection</a:t>
-            </a:r>
-            <a:r>
-              <a:rPr lang="de-DE" noProof="0" dirty="0"/>
-              <a:t> (EOP) Portfolio</a:t>
-            </a:r>
-          </a:p>
-        </p:txBody>
-      </p:sp>
-      <p:sp>
-        <p:nvSpPr>
-          <p:cNvPr id="24" name="Text Placeholder 23">
-            <a:extLst>
-              <a:ext uri="{FF2B5EF4-FFF2-40B4-BE49-F238E27FC236}">
-                <a16:creationId xmlns:a16="http://schemas.microsoft.com/office/drawing/2014/main" id="{0ED4F7FF-5C75-5FE1-619E-FAF399231CA1}"/>
-              </a:ext>
-            </a:extLst>
-          </p:cNvPr>
-          <p:cNvSpPr>
-            <a:spLocks noGrp="1"/>
-          </p:cNvSpPr>
-          <p:nvPr>
-            <p:ph type="body" sz="quarter" idx="10"/>
-          </p:nvPr>
-        </p:nvSpPr>
-        <p:spPr>
-          <a:xfrm>
-            <a:off x="595915" y="1464075"/>
-            <a:ext cx="11239464" cy="2348143"/>
-          </a:xfrm>
-        </p:spPr>
-        <p:txBody>
-          <a:bodyPr/>
-          <a:lstStyle/>
-          <a:p>
-            <a:r>
-              <a:rPr lang="de-DE" noProof="0" dirty="0"/>
-              <a:t>Email Hygiene in der Microsoft 365 Cloud</a:t>
-            </a:r>
-          </a:p>
-          <a:p>
-            <a:r>
-              <a:rPr lang="de-DE" noProof="0" dirty="0"/>
-              <a:t>Lösung für mehrere Szenarien</a:t>
-            </a:r>
-          </a:p>
-          <a:p>
-            <a:pPr lvl="1"/>
-            <a:r>
-              <a:rPr lang="de-DE" noProof="0" dirty="0"/>
-              <a:t>Nur Exchange Online Postfächer</a:t>
-            </a:r>
-          </a:p>
-          <a:p>
-            <a:pPr lvl="1"/>
-            <a:r>
-              <a:rPr lang="de-DE" noProof="0" dirty="0"/>
-              <a:t>Hybrid Umgebungen</a:t>
-            </a:r>
-          </a:p>
-          <a:p>
-            <a:pPr lvl="1"/>
-            <a:r>
-              <a:rPr lang="de-DE" noProof="0" dirty="0"/>
-              <a:t>Nur Exchange On </a:t>
-            </a:r>
-            <a:r>
-              <a:rPr lang="de-DE" noProof="0" dirty="0" err="1"/>
-              <a:t>Premises</a:t>
-            </a:r>
-            <a:r>
-              <a:rPr lang="de-DE" noProof="0" dirty="0"/>
-              <a:t> Postfächer</a:t>
-            </a:r>
-          </a:p>
-          <a:p>
-            <a:r>
-              <a:rPr lang="de-DE" noProof="0" dirty="0"/>
-              <a:t>Funktionen abhängig von der Lizenz</a:t>
-            </a:r>
-          </a:p>
-          <a:p>
-            <a:pPr lvl="1"/>
-            <a:r>
-              <a:rPr lang="de-DE" noProof="0" dirty="0"/>
-              <a:t>Wichtig! Unterscheidung zwischen „EOP“ und „Microsoft Defender for Office 365“</a:t>
-            </a:r>
-          </a:p>
-        </p:txBody>
-      </p:sp>
-    </p:spTree>
-    <p:extLst>
-      <p:ext uri="{BB962C8B-B14F-4D97-AF65-F5344CB8AC3E}">
-        <p14:creationId xmlns:p14="http://schemas.microsoft.com/office/powerpoint/2010/main" val="2886627387"/>
-      </p:ext>
-    </p:extLst>
-  </p:cSld>
-  <p:clrMapOvr>
-    <a:masterClrMapping/>
-  </p:clrMapOvr>
-  <p:transition>
-    <p:fade/>
-  </p:transition>
-</p:sld>
-</file>
-
-<file path=ppt/slides/slide40.xml><?xml version="1.0" encoding="utf-8"?>
+<file path=ppt/slides/slide38.xml><?xml version="1.0" encoding="utf-8"?>
 <p:sld xmlns:a="http://schemas.openxmlformats.org/drawingml/2006/main" xmlns:r="http://schemas.openxmlformats.org/officeDocument/2006/relationships" xmlns:p="http://schemas.openxmlformats.org/presentationml/2006/main">
   <p:cSld>
     <p:spTree>
@@ -23294,7 +21758,7 @@
         <p:spPr>
           <a:xfrm>
             <a:off x="595915" y="1464075"/>
-            <a:ext cx="11239464" cy="4332148"/>
+            <a:ext cx="11239464" cy="3779624"/>
           </a:xfrm>
         </p:spPr>
         <p:txBody>
@@ -23385,16 +21849,6 @@
                 <a:hlinkClick r:id="rId2"/>
               </a:rPr>
               <a:t>https://www.microsoft.com/en-us/microsoft-365/roadmap?filters=Exchange%2CIn%20development</a:t>
-            </a:r>
-            <a:endParaRPr lang="de-AT" dirty="0"/>
-          </a:p>
-          <a:p>
-            <a:pPr lvl="1"/>
-            <a:r>
-              <a:rPr lang="de-AT" dirty="0">
-                <a:hlinkClick r:id="rId3"/>
-              </a:rPr>
-              <a:t>https://techcommunity.microsoft.com/t5/exchange-team-blog/implementing-inbound-smtp-dane-with-dnssec-for-exchange-online/ba-p/3939694</a:t>
             </a:r>
             <a:endParaRPr lang="de-AT" dirty="0"/>
           </a:p>
@@ -23433,7 +21887,7 @@
           <a:p>
             <a:r>
               <a:rPr lang="de-DE" dirty="0">
-                <a:hlinkClick r:id="rId4"/>
+                <a:hlinkClick r:id="rId3"/>
               </a:rPr>
               <a:t>https://learn.microsoft.com/en-us/purview/how-smtp-dane-works#what-are-the-components-of-dane</a:t>
             </a:r>
@@ -23457,7 +21911,7 @@
 </p:sld>
 </file>
 
-<file path=ppt/slides/slide41.xml><?xml version="1.0" encoding="utf-8"?>
+<file path=ppt/slides/slide39.xml><?xml version="1.0" encoding="utf-8"?>
 <p:sld xmlns:a="http://schemas.openxmlformats.org/drawingml/2006/main" xmlns:r="http://schemas.openxmlformats.org/officeDocument/2006/relationships" xmlns:p="http://schemas.openxmlformats.org/presentationml/2006/main">
   <p:cSld>
     <p:spTree>
@@ -23553,7 +22007,7 @@
 </p:sld>
 </file>
 
-<file path=ppt/slides/slide42.xml><?xml version="1.0" encoding="utf-8"?>
+<file path=ppt/slides/slide4.xml><?xml version="1.0" encoding="utf-8"?>
 <p:sld xmlns:a="http://schemas.openxmlformats.org/drawingml/2006/main" xmlns:r="http://schemas.openxmlformats.org/officeDocument/2006/relationships" xmlns:p="http://schemas.openxmlformats.org/presentationml/2006/main">
   <p:cSld>
     <p:spTree>
@@ -23572,10 +22026,10 @@
       </p:grpSpPr>
       <p:sp>
         <p:nvSpPr>
-          <p:cNvPr id="2" name="Title 1">
+          <p:cNvPr id="9" name="Title 8">
             <a:extLst>
               <a:ext uri="{FF2B5EF4-FFF2-40B4-BE49-F238E27FC236}">
-                <a16:creationId xmlns:a16="http://schemas.microsoft.com/office/drawing/2014/main" id="{525A5377-EA0F-DB2A-3805-900B3E606466}"/>
+                <a16:creationId xmlns:a16="http://schemas.microsoft.com/office/drawing/2014/main" id="{38119FA4-F7C9-920C-19B6-CA74C5A6C013}"/>
               </a:ext>
             </a:extLst>
           </p:cNvPr>
@@ -23592,18 +22046,26 @@
           <a:lstStyle/>
           <a:p>
             <a:r>
-              <a:rPr lang="de-DE" dirty="0"/>
-              <a:t>DANE-Implementierung in EOP</a:t>
+              <a:rPr lang="de-DE" noProof="0" dirty="0"/>
+              <a:t>Exchange Online </a:t>
+            </a:r>
+            <a:r>
+              <a:rPr lang="de-DE" noProof="0" dirty="0" err="1"/>
+              <a:t>Protection</a:t>
+            </a:r>
+            <a:r>
+              <a:rPr lang="de-DE" noProof="0" dirty="0"/>
+              <a:t> (EOP) Portfolio</a:t>
             </a:r>
           </a:p>
         </p:txBody>
       </p:sp>
       <p:sp>
         <p:nvSpPr>
-          <p:cNvPr id="3" name="Text Placeholder 2">
+          <p:cNvPr id="24" name="Text Placeholder 23">
             <a:extLst>
               <a:ext uri="{FF2B5EF4-FFF2-40B4-BE49-F238E27FC236}">
-                <a16:creationId xmlns:a16="http://schemas.microsoft.com/office/drawing/2014/main" id="{854184DC-22C1-4A57-8CCF-D88340E93CB2}"/>
+                <a16:creationId xmlns:a16="http://schemas.microsoft.com/office/drawing/2014/main" id="{0ED4F7FF-5C75-5FE1-619E-FAF399231CA1}"/>
               </a:ext>
             </a:extLst>
           </p:cNvPr>
@@ -23617,7 +22079,7 @@
         <p:spPr>
           <a:xfrm>
             <a:off x="595915" y="1464075"/>
-            <a:ext cx="11239464" cy="4771627"/>
+            <a:ext cx="11239464" cy="2348143"/>
           </a:xfrm>
         </p:spPr>
         <p:txBody>
@@ -23625,848 +22087,64 @@
           <a:lstStyle/>
           <a:p>
             <a:r>
-              <a:rPr lang="de-DE" dirty="0"/>
-              <a:t>Beding Umstellung auf neue Zieldomain </a:t>
-            </a:r>
-            <a:r>
-              <a:rPr lang="de-DE" b="1" dirty="0"/>
-              <a:t>„</a:t>
-            </a:r>
-            <a:r>
-              <a:rPr lang="de-DE" b="1" dirty="0" err="1"/>
-              <a:t>mx.microsoft</a:t>
-            </a:r>
-            <a:r>
-              <a:rPr lang="de-DE" b="1" dirty="0"/>
-              <a:t>“</a:t>
-            </a:r>
-            <a:r>
-              <a:rPr lang="de-DE" dirty="0"/>
-              <a:t> im MX </a:t>
-            </a:r>
-            <a:r>
-              <a:rPr lang="de-DE" dirty="0" err="1"/>
-              <a:t>Record</a:t>
-            </a:r>
-            <a:r>
-              <a:rPr lang="de-DE" dirty="0"/>
-              <a:t> (Unterstützt DNSSEC)</a:t>
-            </a:r>
-          </a:p>
-          <a:p>
-            <a:r>
-              <a:rPr lang="de-DE" dirty="0"/>
-              <a:t>Altes Format für MX-Ziel:</a:t>
-            </a:r>
-          </a:p>
-          <a:p>
-            <a:endParaRPr lang="de-DE" dirty="0"/>
-          </a:p>
-          <a:p>
-            <a:r>
-              <a:rPr lang="de-DE" dirty="0"/>
-              <a:t>Neues Format für MX-Ziel: </a:t>
-            </a:r>
-          </a:p>
-          <a:p>
-            <a:endParaRPr lang="de-DE" dirty="0">
-              <a:solidFill>
-                <a:schemeClr val="tx1"/>
-              </a:solidFill>
-            </a:endParaRPr>
-          </a:p>
-          <a:p>
-            <a:endParaRPr lang="de-DE" dirty="0">
-              <a:solidFill>
-                <a:schemeClr val="tx1"/>
-              </a:solidFill>
-            </a:endParaRPr>
-          </a:p>
-          <a:p>
-            <a:r>
-              <a:rPr lang="de-DE" dirty="0">
-                <a:solidFill>
-                  <a:schemeClr val="tx1"/>
-                </a:solidFill>
-              </a:rPr>
-              <a:t>Graph API zur Abfrage der DNS Records:</a:t>
-            </a:r>
-          </a:p>
-          <a:p>
-            <a:r>
-              <a:rPr lang="de-DE" dirty="0">
-                <a:hlinkClick r:id="rId2"/>
-              </a:rPr>
-              <a:t>https://learn.microsoft.com/graph/api/domain-list-serviceconfigurationrecords?view=graph-rest-1.0&amp;tabs=http</a:t>
-            </a:r>
-            <a:endParaRPr lang="de-DE" dirty="0"/>
-          </a:p>
-          <a:p>
-            <a:endParaRPr lang="de-DE" b="1" dirty="0">
-              <a:solidFill>
-                <a:schemeClr val="tx1"/>
-              </a:solidFill>
-            </a:endParaRPr>
-          </a:p>
-          <a:p>
-            <a:r>
-              <a:rPr lang="de-DE" b="1" dirty="0">
-                <a:solidFill>
-                  <a:schemeClr val="tx1"/>
-                </a:solidFill>
-              </a:rPr>
-              <a:t>Timeline für Umstellung:</a:t>
-            </a:r>
-          </a:p>
-          <a:p>
-            <a:r>
-              <a:rPr lang="de-DE" dirty="0"/>
-              <a:t>03/2024: Public Preview mit Opt-In Möglichkeit</a:t>
-            </a:r>
-          </a:p>
-          <a:p>
-            <a:r>
-              <a:rPr lang="de-DE" dirty="0"/>
-              <a:t>07-12/2024 : General Availability und sukzessive Umstellung aller Tenants</a:t>
+              <a:rPr lang="de-DE" noProof="0" dirty="0"/>
+              <a:t>Email Hygiene in der Microsoft 365 Cloud</a:t>
+            </a:r>
+          </a:p>
+          <a:p>
+            <a:r>
+              <a:rPr lang="de-DE" noProof="0" dirty="0"/>
+              <a:t>Lösung für mehrere Szenarien</a:t>
+            </a:r>
+          </a:p>
+          <a:p>
+            <a:pPr lvl="1"/>
+            <a:r>
+              <a:rPr lang="de-DE" noProof="0" dirty="0"/>
+              <a:t>Nur Exchange Online Postfächer</a:t>
+            </a:r>
+          </a:p>
+          <a:p>
+            <a:pPr lvl="1"/>
+            <a:r>
+              <a:rPr lang="de-DE" noProof="0" dirty="0"/>
+              <a:t>Hybrid Umgebungen</a:t>
+            </a:r>
+          </a:p>
+          <a:p>
+            <a:pPr lvl="1"/>
+            <a:r>
+              <a:rPr lang="de-DE" noProof="0" dirty="0"/>
+              <a:t>Nur Exchange On </a:t>
+            </a:r>
+            <a:r>
+              <a:rPr lang="de-DE" noProof="0" dirty="0" err="1"/>
+              <a:t>Premises</a:t>
+            </a:r>
+            <a:r>
+              <a:rPr lang="de-DE" noProof="0" dirty="0"/>
+              <a:t> Postfächer</a:t>
+            </a:r>
+          </a:p>
+          <a:p>
+            <a:r>
+              <a:rPr lang="de-DE" noProof="0" dirty="0"/>
+              <a:t>Funktionen abhängig von der Lizenz</a:t>
+            </a:r>
+          </a:p>
+          <a:p>
+            <a:pPr lvl="1"/>
+            <a:r>
+              <a:rPr lang="de-DE" noProof="0" dirty="0"/>
+              <a:t>Wichtig! Unterscheidung zwischen „EOP“ und „Microsoft Defender for Office 365“</a:t>
             </a:r>
           </a:p>
         </p:txBody>
       </p:sp>
-      <p:sp>
-        <p:nvSpPr>
-          <p:cNvPr id="5" name="TextBox 4">
-            <a:extLst>
-              <a:ext uri="{FF2B5EF4-FFF2-40B4-BE49-F238E27FC236}">
-                <a16:creationId xmlns:a16="http://schemas.microsoft.com/office/drawing/2014/main" id="{BFF07E57-D03D-B37E-F1A3-DFF39446AB0E}"/>
-              </a:ext>
-            </a:extLst>
-          </p:cNvPr>
-          <p:cNvSpPr txBox="1"/>
-          <p:nvPr/>
-        </p:nvSpPr>
-        <p:spPr>
-          <a:xfrm>
-            <a:off x="3968496" y="1794643"/>
-            <a:ext cx="5148072" cy="369332"/>
-          </a:xfrm>
-          <a:prstGeom prst="rect">
-            <a:avLst/>
-          </a:prstGeom>
-          <a:noFill/>
-        </p:spPr>
-        <p:txBody>
-          <a:bodyPr wrap="square" lIns="0" tIns="0" rIns="0" bIns="0" rtlCol="0">
-            <a:spAutoFit/>
-          </a:bodyPr>
-          <a:lstStyle/>
-          <a:p>
-            <a:r>
-              <a:rPr lang="de-DE" sz="2400" dirty="0"/>
-              <a:t>myetc-at.</a:t>
-            </a:r>
-            <a:r>
-              <a:rPr lang="de-DE" sz="2400" dirty="0">
-                <a:solidFill>
-                  <a:srgbClr val="339933"/>
-                </a:solidFill>
-              </a:rPr>
-              <a:t>mail.protection.outlook.com</a:t>
-            </a:r>
-          </a:p>
-        </p:txBody>
-      </p:sp>
-      <p:grpSp>
-        <p:nvGrpSpPr>
-          <p:cNvPr id="9" name="Group 8">
-            <a:extLst>
-              <a:ext uri="{FF2B5EF4-FFF2-40B4-BE49-F238E27FC236}">
-                <a16:creationId xmlns:a16="http://schemas.microsoft.com/office/drawing/2014/main" id="{9242F1D0-6B35-16C8-A3C5-1B14B1CFDE00}"/>
-              </a:ext>
-            </a:extLst>
-          </p:cNvPr>
-          <p:cNvGrpSpPr/>
-          <p:nvPr/>
-        </p:nvGrpSpPr>
-        <p:grpSpPr>
-          <a:xfrm>
-            <a:off x="3968496" y="2528545"/>
-            <a:ext cx="4359415" cy="840708"/>
-            <a:chOff x="3968496" y="2939026"/>
-            <a:chExt cx="4359415" cy="840708"/>
-          </a:xfrm>
-        </p:grpSpPr>
-        <p:sp>
-          <p:nvSpPr>
-            <p:cNvPr id="4" name="TextBox 3">
-              <a:extLst>
-                <a:ext uri="{FF2B5EF4-FFF2-40B4-BE49-F238E27FC236}">
-                  <a16:creationId xmlns:a16="http://schemas.microsoft.com/office/drawing/2014/main" id="{7247C7A8-E26E-3464-DB7E-68B2DDE4D774}"/>
-                </a:ext>
-              </a:extLst>
-            </p:cNvPr>
-            <p:cNvSpPr txBox="1"/>
-            <p:nvPr/>
-          </p:nvSpPr>
-          <p:spPr>
-            <a:xfrm>
-              <a:off x="3968496" y="2939026"/>
-              <a:ext cx="4098786" cy="369332"/>
-            </a:xfrm>
-            <a:prstGeom prst="rect">
-              <a:avLst/>
-            </a:prstGeom>
-            <a:noFill/>
-          </p:spPr>
-          <p:txBody>
-            <a:bodyPr wrap="square" lIns="0" tIns="0" rIns="0" bIns="0" rtlCol="0">
-              <a:spAutoFit/>
-            </a:bodyPr>
-            <a:lstStyle/>
-            <a:p>
-              <a:r>
-                <a:rPr lang="de-DE" sz="2400" dirty="0" err="1"/>
-                <a:t>myetc-at.</a:t>
-              </a:r>
-              <a:r>
-                <a:rPr lang="de-DE" sz="2400" dirty="0" err="1">
-                  <a:solidFill>
-                    <a:srgbClr val="FF0000"/>
-                  </a:solidFill>
-                </a:rPr>
-                <a:t>abc-yz</a:t>
-              </a:r>
-              <a:r>
-                <a:rPr lang="de-DE" sz="2400" dirty="0" err="1"/>
-                <a:t>.</a:t>
-              </a:r>
-              <a:r>
-                <a:rPr lang="de-DE" sz="2400" dirty="0" err="1">
-                  <a:solidFill>
-                    <a:srgbClr val="339933"/>
-                  </a:solidFill>
-                </a:rPr>
-                <a:t>mx.microsoft</a:t>
-              </a:r>
-              <a:endParaRPr lang="de-DE" sz="2400" dirty="0">
-                <a:solidFill>
-                  <a:srgbClr val="339933"/>
-                </a:solidFill>
-              </a:endParaRPr>
-            </a:p>
-          </p:txBody>
-        </p:sp>
-        <p:sp>
-          <p:nvSpPr>
-            <p:cNvPr id="6" name="TextBox 5">
-              <a:extLst>
-                <a:ext uri="{FF2B5EF4-FFF2-40B4-BE49-F238E27FC236}">
-                  <a16:creationId xmlns:a16="http://schemas.microsoft.com/office/drawing/2014/main" id="{81831FF0-4C1A-AAA1-E916-D7A744EC57EB}"/>
-                </a:ext>
-              </a:extLst>
-            </p:cNvPr>
-            <p:cNvSpPr txBox="1"/>
-            <p:nvPr/>
-          </p:nvSpPr>
-          <p:spPr>
-            <a:xfrm>
-              <a:off x="6215647" y="3471957"/>
-              <a:ext cx="2112264" cy="307777"/>
-            </a:xfrm>
-            <a:prstGeom prst="rect">
-              <a:avLst/>
-            </a:prstGeom>
-            <a:noFill/>
-          </p:spPr>
-          <p:txBody>
-            <a:bodyPr wrap="square" lIns="0" tIns="0" rIns="0" bIns="0" rtlCol="0">
-              <a:spAutoFit/>
-            </a:bodyPr>
-            <a:lstStyle/>
-            <a:p>
-              <a:pPr algn="l"/>
-              <a:r>
-                <a:rPr lang="de-DE" sz="2000" dirty="0">
-                  <a:solidFill>
-                    <a:srgbClr val="FF0000"/>
-                  </a:solidFill>
-                </a:rPr>
-                <a:t>Random Identifier</a:t>
-              </a:r>
-            </a:p>
-          </p:txBody>
-        </p:sp>
-        <p:cxnSp>
-          <p:nvCxnSpPr>
-            <p:cNvPr id="8" name="Straight Arrow Connector 7">
-              <a:extLst>
-                <a:ext uri="{FF2B5EF4-FFF2-40B4-BE49-F238E27FC236}">
-                  <a16:creationId xmlns:a16="http://schemas.microsoft.com/office/drawing/2014/main" id="{1C08AE13-C8FF-A795-3DA2-E060F316D137}"/>
-                </a:ext>
-              </a:extLst>
-            </p:cNvPr>
-            <p:cNvCxnSpPr/>
-            <p:nvPr/>
-          </p:nvCxnSpPr>
-          <p:spPr>
-            <a:xfrm flipH="1" flipV="1">
-              <a:off x="5742432" y="3308358"/>
-              <a:ext cx="365760" cy="312666"/>
-            </a:xfrm>
-            <a:prstGeom prst="straightConnector1">
-              <a:avLst/>
-            </a:prstGeom>
-            <a:ln>
-              <a:solidFill>
-                <a:srgbClr val="FF0000"/>
-              </a:solidFill>
-              <a:headEnd type="none" w="lg" len="med"/>
-              <a:tailEnd type="triangle"/>
-            </a:ln>
-          </p:spPr>
-          <p:style>
-            <a:lnRef idx="1">
-              <a:schemeClr val="accent1"/>
-            </a:lnRef>
-            <a:fillRef idx="0">
-              <a:schemeClr val="accent1"/>
-            </a:fillRef>
-            <a:effectRef idx="0">
-              <a:schemeClr val="accent1"/>
-            </a:effectRef>
-            <a:fontRef idx="minor">
-              <a:schemeClr val="tx1"/>
-            </a:fontRef>
-          </p:style>
-        </p:cxnSp>
-      </p:grpSp>
     </p:spTree>
     <p:extLst>
       <p:ext uri="{BB962C8B-B14F-4D97-AF65-F5344CB8AC3E}">
-        <p14:creationId xmlns:p14="http://schemas.microsoft.com/office/powerpoint/2010/main" val="1252773324"/>
-      </p:ext>
-    </p:extLst>
-  </p:cSld>
-  <p:clrMapOvr>
-    <a:masterClrMapping/>
-  </p:clrMapOvr>
-  <p:transition>
-    <p:fade/>
-  </p:transition>
-</p:sld>
-</file>
-
-<file path=ppt/slides/slide43.xml><?xml version="1.0" encoding="utf-8"?>
-<p:sld xmlns:a="http://schemas.openxmlformats.org/drawingml/2006/main" xmlns:r="http://schemas.openxmlformats.org/officeDocument/2006/relationships" xmlns:p="http://schemas.openxmlformats.org/presentationml/2006/main">
-  <p:cSld>
-    <p:spTree>
-      <p:nvGrpSpPr>
-        <p:cNvPr id="1" name=""/>
-        <p:cNvGrpSpPr/>
-        <p:nvPr/>
-      </p:nvGrpSpPr>
-      <p:grpSpPr>
-        <a:xfrm>
-          <a:off x="0" y="0"/>
-          <a:ext cx="0" cy="0"/>
-          <a:chOff x="0" y="0"/>
-          <a:chExt cx="0" cy="0"/>
-        </a:xfrm>
-      </p:grpSpPr>
-      <p:sp>
-        <p:nvSpPr>
-          <p:cNvPr id="2" name="Title 1">
-            <a:extLst>
-              <a:ext uri="{FF2B5EF4-FFF2-40B4-BE49-F238E27FC236}">
-                <a16:creationId xmlns:a16="http://schemas.microsoft.com/office/drawing/2014/main" id="{F968B895-DCA8-639C-EA1A-6FFCA8C04327}"/>
-              </a:ext>
-            </a:extLst>
-          </p:cNvPr>
-          <p:cNvSpPr>
-            <a:spLocks noGrp="1"/>
-          </p:cNvSpPr>
-          <p:nvPr>
-            <p:ph type="title"/>
-          </p:nvPr>
-        </p:nvSpPr>
-        <p:spPr>
-          <a:xfrm>
-            <a:off x="600059" y="519291"/>
-            <a:ext cx="11239464" cy="439479"/>
-          </a:xfrm>
-        </p:spPr>
-        <p:txBody>
-          <a:bodyPr/>
-          <a:lstStyle/>
-          <a:p>
-            <a:r>
-              <a:rPr lang="de-DE" dirty="0"/>
-              <a:t>Brand </a:t>
-            </a:r>
-            <a:r>
-              <a:rPr lang="de-DE" dirty="0" err="1"/>
-              <a:t>Indicators</a:t>
-            </a:r>
-            <a:r>
-              <a:rPr lang="de-DE" dirty="0"/>
-              <a:t> for Message </a:t>
-            </a:r>
-            <a:r>
-              <a:rPr lang="de-DE" dirty="0" err="1"/>
-              <a:t>Identification</a:t>
-            </a:r>
-            <a:r>
-              <a:rPr lang="de-DE" dirty="0"/>
-              <a:t> (BIMI)</a:t>
-            </a:r>
-          </a:p>
-        </p:txBody>
-      </p:sp>
-      <p:sp>
-        <p:nvSpPr>
-          <p:cNvPr id="3" name="Text Placeholder 2">
-            <a:extLst>
-              <a:ext uri="{FF2B5EF4-FFF2-40B4-BE49-F238E27FC236}">
-                <a16:creationId xmlns:a16="http://schemas.microsoft.com/office/drawing/2014/main" id="{E60EC72F-FF53-0FDD-688D-6B55C0057B96}"/>
-              </a:ext>
-            </a:extLst>
-          </p:cNvPr>
-          <p:cNvSpPr>
-            <a:spLocks noGrp="1"/>
-          </p:cNvSpPr>
-          <p:nvPr>
-            <p:ph type="body" sz="quarter" idx="10"/>
-          </p:nvPr>
-        </p:nvSpPr>
-        <p:spPr>
-          <a:xfrm>
-            <a:off x="595915" y="1464075"/>
-            <a:ext cx="11239464" cy="4759060"/>
-          </a:xfrm>
-        </p:spPr>
-        <p:txBody>
-          <a:bodyPr/>
-          <a:lstStyle/>
-          <a:p>
-            <a:r>
-              <a:rPr lang="de-DE" dirty="0"/>
-              <a:t>Anzeige von Firmenlogos in der Kopfzeile einer Nachricht</a:t>
-            </a:r>
-          </a:p>
-          <a:p>
-            <a:r>
-              <a:rPr lang="de-DE" dirty="0"/>
-              <a:t>Weitere Maßnahme, um Phishing zu reduzieren</a:t>
-            </a:r>
-          </a:p>
-          <a:p>
-            <a:r>
-              <a:rPr lang="de-DE" dirty="0"/>
-              <a:t>Erfordert, dass SPF/DKIM/DMARC konfiguriert sind!</a:t>
-            </a:r>
-          </a:p>
-          <a:p>
-            <a:endParaRPr lang="de-DE" dirty="0"/>
-          </a:p>
-          <a:p>
-            <a:r>
-              <a:rPr lang="de-DE" b="1" dirty="0"/>
-              <a:t>Implementierung</a:t>
-            </a:r>
-            <a:r>
-              <a:rPr lang="de-DE" dirty="0"/>
-              <a:t>:</a:t>
-            </a:r>
-          </a:p>
-          <a:p>
-            <a:r>
-              <a:rPr lang="de-DE" dirty="0"/>
-              <a:t>Firma erzeugt </a:t>
-            </a:r>
-            <a:r>
-              <a:rPr lang="de-DE" u="sng" dirty="0"/>
-              <a:t>SVG</a:t>
-            </a:r>
-            <a:r>
-              <a:rPr lang="de-DE" dirty="0"/>
-              <a:t>-Datei ihres Logos nach </a:t>
-            </a:r>
-            <a:r>
-              <a:rPr lang="de-AT" b="0" i="0" u="none" strike="noStrike" dirty="0">
-                <a:solidFill>
-                  <a:srgbClr val="2EA3F2"/>
-                </a:solidFill>
-                <a:effectLst/>
-                <a:latin typeface="Open Sans" panose="020B0606030504020204" pitchFamily="34" charset="0"/>
-                <a:hlinkClick r:id="rId2"/>
-              </a:rPr>
-              <a:t>Tiny PS </a:t>
-            </a:r>
-            <a:r>
-              <a:rPr lang="de-AT" b="0" i="0" u="none" strike="noStrike" dirty="0" err="1">
-                <a:solidFill>
-                  <a:srgbClr val="2EA3F2"/>
-                </a:solidFill>
-                <a:effectLst/>
-                <a:latin typeface="Open Sans" panose="020B0606030504020204" pitchFamily="34" charset="0"/>
-                <a:hlinkClick r:id="rId2"/>
-              </a:rPr>
-              <a:t>Specification</a:t>
-            </a:r>
-            <a:endParaRPr lang="de-DE" dirty="0"/>
-          </a:p>
-          <a:p>
-            <a:r>
-              <a:rPr lang="de-DE" dirty="0"/>
-              <a:t>SVG-Datei wird mittels </a:t>
-            </a:r>
-            <a:r>
-              <a:rPr lang="de-AT" b="1" i="0" dirty="0" err="1">
-                <a:solidFill>
-                  <a:srgbClr val="333333"/>
-                </a:solidFill>
-                <a:effectLst/>
-                <a:latin typeface="SegoeUI"/>
-              </a:rPr>
-              <a:t>Verified</a:t>
-            </a:r>
-            <a:r>
-              <a:rPr lang="de-AT" b="1" i="0" dirty="0">
-                <a:solidFill>
-                  <a:srgbClr val="333333"/>
-                </a:solidFill>
-                <a:effectLst/>
-                <a:latin typeface="SegoeUI"/>
-              </a:rPr>
-              <a:t> Mark Certificate </a:t>
-            </a:r>
-            <a:r>
-              <a:rPr lang="de-AT" b="0" i="0" dirty="0">
-                <a:solidFill>
-                  <a:srgbClr val="333333"/>
-                </a:solidFill>
-                <a:effectLst/>
-                <a:latin typeface="SegoeUI"/>
-              </a:rPr>
-              <a:t>(VMC) </a:t>
-            </a:r>
-            <a:r>
-              <a:rPr lang="de-DE" dirty="0"/>
-              <a:t>in Zertifikat eingebettet</a:t>
-            </a:r>
-          </a:p>
-          <a:p>
-            <a:pPr lvl="1"/>
-            <a:r>
-              <a:rPr lang="de-DE" dirty="0"/>
-              <a:t>Verhindert Spoofing</a:t>
-            </a:r>
-          </a:p>
-          <a:p>
-            <a:r>
-              <a:rPr lang="de-DE" dirty="0"/>
-              <a:t>DNS TXT </a:t>
-            </a:r>
-            <a:r>
-              <a:rPr lang="de-DE" dirty="0" err="1"/>
-              <a:t>Record</a:t>
-            </a:r>
-            <a:r>
-              <a:rPr lang="de-DE" dirty="0"/>
-              <a:t> publizieren: </a:t>
-            </a:r>
-            <a:r>
-              <a:rPr lang="de-DE" dirty="0">
-                <a:solidFill>
-                  <a:srgbClr val="C00000"/>
-                </a:solidFill>
-              </a:rPr>
-              <a:t>default._bimi</a:t>
-            </a:r>
-            <a:r>
-              <a:rPr lang="de-DE" dirty="0"/>
-              <a:t>.myetc.at </a:t>
-            </a:r>
-          </a:p>
-          <a:p>
-            <a:endParaRPr lang="de-DE" dirty="0"/>
-          </a:p>
-          <a:p>
-            <a:endParaRPr lang="de-DE" dirty="0"/>
-          </a:p>
-          <a:p>
-            <a:endParaRPr lang="de-DE" dirty="0"/>
-          </a:p>
-          <a:p>
-            <a:r>
-              <a:rPr lang="de-DE" dirty="0"/>
-              <a:t>Derzeit keine Unterstützung für eingehende Nachrichten bei Microsoft (kein ETA)</a:t>
-            </a:r>
-          </a:p>
-        </p:txBody>
-      </p:sp>
-      <p:pic>
-        <p:nvPicPr>
-          <p:cNvPr id="6" name="Picture 5">
-            <a:extLst>
-              <a:ext uri="{FF2B5EF4-FFF2-40B4-BE49-F238E27FC236}">
-                <a16:creationId xmlns:a16="http://schemas.microsoft.com/office/drawing/2014/main" id="{39FF2361-1F13-4937-A9D3-89F7CFBD1317}"/>
-              </a:ext>
-            </a:extLst>
-          </p:cNvPr>
-          <p:cNvPicPr>
-            <a:picLocks noChangeAspect="1"/>
-          </p:cNvPicPr>
-          <p:nvPr/>
-        </p:nvPicPr>
-        <p:blipFill>
-          <a:blip r:embed="rId3"/>
-          <a:stretch>
-            <a:fillRect/>
-          </a:stretch>
-        </p:blipFill>
-        <p:spPr>
-          <a:xfrm>
-            <a:off x="8997697" y="1137990"/>
-            <a:ext cx="2476067" cy="2359272"/>
-          </a:xfrm>
-          <a:prstGeom prst="rect">
-            <a:avLst/>
-          </a:prstGeom>
-        </p:spPr>
-      </p:pic>
-      <p:grpSp>
-        <p:nvGrpSpPr>
-          <p:cNvPr id="14" name="Group 13">
-            <a:extLst>
-              <a:ext uri="{FF2B5EF4-FFF2-40B4-BE49-F238E27FC236}">
-                <a16:creationId xmlns:a16="http://schemas.microsoft.com/office/drawing/2014/main" id="{DC3D91C7-A063-6300-A473-CF9EE2A8CEEC}"/>
-              </a:ext>
-            </a:extLst>
-          </p:cNvPr>
-          <p:cNvGrpSpPr/>
-          <p:nvPr/>
-        </p:nvGrpSpPr>
-        <p:grpSpPr>
-          <a:xfrm>
-            <a:off x="957529" y="4802568"/>
-            <a:ext cx="10516235" cy="811094"/>
-            <a:chOff x="957529" y="5259768"/>
-            <a:chExt cx="10516235" cy="811094"/>
-          </a:xfrm>
-        </p:grpSpPr>
-        <p:sp>
-          <p:nvSpPr>
-            <p:cNvPr id="7" name="TextBox 6">
-              <a:extLst>
-                <a:ext uri="{FF2B5EF4-FFF2-40B4-BE49-F238E27FC236}">
-                  <a16:creationId xmlns:a16="http://schemas.microsoft.com/office/drawing/2014/main" id="{30729CDA-0D00-76A3-D211-3C98CF5CBED5}"/>
-                </a:ext>
-              </a:extLst>
-            </p:cNvPr>
-            <p:cNvSpPr txBox="1"/>
-            <p:nvPr/>
-          </p:nvSpPr>
-          <p:spPr>
-            <a:xfrm>
-              <a:off x="957529" y="5259768"/>
-              <a:ext cx="10516235" cy="369332"/>
-            </a:xfrm>
-            <a:prstGeom prst="rect">
-              <a:avLst/>
-            </a:prstGeom>
-            <a:noFill/>
-          </p:spPr>
-          <p:txBody>
-            <a:bodyPr wrap="square" lIns="0" tIns="0" rIns="0" bIns="0" rtlCol="0">
-              <a:spAutoFit/>
-            </a:bodyPr>
-            <a:lstStyle/>
-            <a:p>
-              <a:r>
-                <a:rPr lang="de-DE" sz="2400" dirty="0"/>
-                <a:t>“v=BIMI1;</a:t>
-              </a:r>
-              <a:r>
-                <a:rPr lang="de-DE" sz="2400" dirty="0">
-                  <a:solidFill>
-                    <a:srgbClr val="339933"/>
-                  </a:solidFill>
-                </a:rPr>
-                <a:t>l=https://myetc.at/</a:t>
-              </a:r>
-              <a:r>
-                <a:rPr lang="de-DE" sz="2400" dirty="0" err="1">
-                  <a:solidFill>
-                    <a:srgbClr val="339933"/>
-                  </a:solidFill>
-                </a:rPr>
-                <a:t>bimi</a:t>
-              </a:r>
-              <a:r>
-                <a:rPr lang="de-DE" sz="2400" dirty="0">
-                  <a:solidFill>
-                    <a:srgbClr val="339933"/>
-                  </a:solidFill>
-                </a:rPr>
-                <a:t>/</a:t>
-              </a:r>
-              <a:r>
-                <a:rPr lang="de-DE" sz="2400" dirty="0" err="1">
-                  <a:solidFill>
-                    <a:srgbClr val="339933"/>
-                  </a:solidFill>
-                </a:rPr>
-                <a:t>logo.svg</a:t>
-              </a:r>
-              <a:r>
-                <a:rPr lang="de-DE" sz="2400" dirty="0" err="1"/>
-                <a:t>;</a:t>
-              </a:r>
-              <a:r>
-                <a:rPr lang="de-DE" sz="2400" dirty="0" err="1">
-                  <a:solidFill>
-                    <a:srgbClr val="FF0000"/>
-                  </a:solidFill>
-                </a:rPr>
-                <a:t>a</a:t>
-              </a:r>
-              <a:r>
-                <a:rPr lang="de-DE" sz="2400" dirty="0">
-                  <a:solidFill>
-                    <a:srgbClr val="FF0000"/>
-                  </a:solidFill>
-                </a:rPr>
-                <a:t>=https://myetc.at/</a:t>
-              </a:r>
-              <a:r>
-                <a:rPr lang="de-DE" sz="2400" dirty="0" err="1">
-                  <a:solidFill>
-                    <a:srgbClr val="FF0000"/>
-                  </a:solidFill>
-                </a:rPr>
-                <a:t>bimi</a:t>
-              </a:r>
-              <a:r>
-                <a:rPr lang="de-DE" sz="2400" dirty="0">
-                  <a:solidFill>
-                    <a:srgbClr val="FF0000"/>
-                  </a:solidFill>
-                </a:rPr>
-                <a:t>/</a:t>
-              </a:r>
-              <a:r>
-                <a:rPr lang="de-DE" sz="2400" dirty="0" err="1">
-                  <a:solidFill>
-                    <a:srgbClr val="FF0000"/>
-                  </a:solidFill>
-                </a:rPr>
-                <a:t>logo.pem</a:t>
-              </a:r>
-              <a:r>
-                <a:rPr lang="de-DE" sz="2400" dirty="0"/>
-                <a:t>“</a:t>
-              </a:r>
-            </a:p>
-          </p:txBody>
-        </p:sp>
-        <p:sp>
-          <p:nvSpPr>
-            <p:cNvPr id="8" name="TextBox 7">
-              <a:extLst>
-                <a:ext uri="{FF2B5EF4-FFF2-40B4-BE49-F238E27FC236}">
-                  <a16:creationId xmlns:a16="http://schemas.microsoft.com/office/drawing/2014/main" id="{40A36FAD-426D-2D70-C661-34186B1E5EB4}"/>
-                </a:ext>
-              </a:extLst>
-            </p:cNvPr>
-            <p:cNvSpPr txBox="1"/>
-            <p:nvPr/>
-          </p:nvSpPr>
-          <p:spPr>
-            <a:xfrm>
-              <a:off x="8311897" y="5763085"/>
-              <a:ext cx="2734056" cy="307777"/>
-            </a:xfrm>
-            <a:prstGeom prst="rect">
-              <a:avLst/>
-            </a:prstGeom>
-            <a:noFill/>
-          </p:spPr>
-          <p:txBody>
-            <a:bodyPr wrap="square" lIns="0" tIns="0" rIns="0" bIns="0" rtlCol="0">
-              <a:spAutoFit/>
-            </a:bodyPr>
-            <a:lstStyle/>
-            <a:p>
-              <a:pPr algn="l"/>
-              <a:r>
-                <a:rPr lang="de-DE" sz="2000" dirty="0" err="1">
-                  <a:solidFill>
-                    <a:srgbClr val="FF0000"/>
-                  </a:solidFill>
-                </a:rPr>
-                <a:t>Verified</a:t>
-              </a:r>
-              <a:r>
-                <a:rPr lang="de-DE" sz="2000" dirty="0">
-                  <a:solidFill>
-                    <a:srgbClr val="FF0000"/>
-                  </a:solidFill>
-                </a:rPr>
-                <a:t> Mark Certificate</a:t>
-              </a:r>
-            </a:p>
-          </p:txBody>
-        </p:sp>
-        <p:cxnSp>
-          <p:nvCxnSpPr>
-            <p:cNvPr id="10" name="Straight Arrow Connector 9">
-              <a:extLst>
-                <a:ext uri="{FF2B5EF4-FFF2-40B4-BE49-F238E27FC236}">
-                  <a16:creationId xmlns:a16="http://schemas.microsoft.com/office/drawing/2014/main" id="{5DD382CE-C1DD-E5D9-5976-606E47C624A1}"/>
-                </a:ext>
-              </a:extLst>
-            </p:cNvPr>
-            <p:cNvCxnSpPr>
-              <a:cxnSpLocks/>
-            </p:cNvCxnSpPr>
-            <p:nvPr/>
-          </p:nvCxnSpPr>
-          <p:spPr>
-            <a:xfrm flipH="1" flipV="1">
-              <a:off x="7781544" y="5629100"/>
-              <a:ext cx="484632" cy="305356"/>
-            </a:xfrm>
-            <a:prstGeom prst="straightConnector1">
-              <a:avLst/>
-            </a:prstGeom>
-            <a:ln>
-              <a:solidFill>
-                <a:srgbClr val="FF0000"/>
-              </a:solidFill>
-              <a:headEnd type="none" w="lg" len="med"/>
-              <a:tailEnd type="triangle"/>
-            </a:ln>
-          </p:spPr>
-          <p:style>
-            <a:lnRef idx="1">
-              <a:schemeClr val="accent1"/>
-            </a:lnRef>
-            <a:fillRef idx="0">
-              <a:schemeClr val="accent1"/>
-            </a:fillRef>
-            <a:effectRef idx="0">
-              <a:schemeClr val="accent1"/>
-            </a:effectRef>
-            <a:fontRef idx="minor">
-              <a:schemeClr val="tx1"/>
-            </a:fontRef>
-          </p:style>
-        </p:cxnSp>
-      </p:grpSp>
-    </p:spTree>
-    <p:extLst>
-      <p:ext uri="{BB962C8B-B14F-4D97-AF65-F5344CB8AC3E}">
-        <p14:creationId xmlns:p14="http://schemas.microsoft.com/office/powerpoint/2010/main" val="3030276542"/>
+        <p14:creationId xmlns:p14="http://schemas.microsoft.com/office/powerpoint/2010/main" val="2886627387"/>
       </p:ext>
     </p:extLst>
   </p:cSld>
@@ -25989,6 +23667,18 @@
 </file>
 
 <file path=customXml/item1.xml><?xml version="1.0" encoding="utf-8"?>
+<p:properties xmlns:p="http://schemas.microsoft.com/office/2006/metadata/properties" xmlns:xsi="http://www.w3.org/2001/XMLSchema-instance" xmlns:pc="http://schemas.microsoft.com/office/infopath/2007/PartnerControls">
+  <documentManagement>
+    <MediaServiceKeyPoints xmlns="6e26bd3e-26a1-49ef-a711-f93878600d1b" xsi:nil="true"/>
+    <lcf76f155ced4ddcb4097134ff3c332f xmlns="6e26bd3e-26a1-49ef-a711-f93878600d1b">
+      <Terms xmlns="http://schemas.microsoft.com/office/infopath/2007/PartnerControls"/>
+    </lcf76f155ced4ddcb4097134ff3c332f>
+    <TaxCatchAll xmlns="3b7c1a63-589f-43fc-8fe7-5d1c1c7abab8" xsi:nil="true"/>
+  </documentManagement>
+</p:properties>
+</file>
+
+<file path=customXml/item2.xml><?xml version="1.0" encoding="utf-8"?>
 <?mso-contentType ?>
 <FormTemplates xmlns="http://schemas.microsoft.com/sharepoint/v3/contenttype/forms">
   <Display>DocumentLibraryForm</Display>
@@ -25997,9 +23687,9 @@
 </FormTemplates>
 </file>
 
-<file path=customXml/item2.xml><?xml version="1.0" encoding="utf-8"?>
-<ct:contentTypeSchema xmlns:ct="http://schemas.microsoft.com/office/2006/metadata/contentType" xmlns:ma="http://schemas.microsoft.com/office/2006/metadata/properties/metaAttributes" ct:_="" ma:_="" ma:contentTypeName="Dokument" ma:contentTypeID="0x010100ED6F75BC7090174AA980D673A413155B" ma:contentTypeVersion="17" ma:contentTypeDescription="Ein neues Dokument erstellen." ma:contentTypeScope="" ma:versionID="d79b8df0974a88a32e0e6d1a937553f8">
-  <xsd:schema xmlns:xsd="http://www.w3.org/2001/XMLSchema" xmlns:xs="http://www.w3.org/2001/XMLSchema" xmlns:p="http://schemas.microsoft.com/office/2006/metadata/properties" xmlns:ns2="6e26bd3e-26a1-49ef-a711-f93878600d1b" xmlns:ns3="3b7c1a63-589f-43fc-8fe7-5d1c1c7abab8" targetNamespace="http://schemas.microsoft.com/office/2006/metadata/properties" ma:root="true" ma:fieldsID="607ef667033e2fcc1d49a25f9c3e70d4" ns2:_="" ns3:_="">
+<file path=customXml/item3.xml><?xml version="1.0" encoding="utf-8"?>
+<ct:contentTypeSchema xmlns:ct="http://schemas.microsoft.com/office/2006/metadata/contentType" xmlns:ma="http://schemas.microsoft.com/office/2006/metadata/properties/metaAttributes" ct:_="" ma:_="" ma:contentTypeName="Dokument" ma:contentTypeID="0x010100ED6F75BC7090174AA980D673A413155B" ma:contentTypeVersion="17" ma:contentTypeDescription="Ein neues Dokument erstellen." ma:contentTypeScope="" ma:versionID="d4c24a27fc12aabde03486f8b445c73e">
+  <xsd:schema xmlns:xsd="http://www.w3.org/2001/XMLSchema" xmlns:xs="http://www.w3.org/2001/XMLSchema" xmlns:p="http://schemas.microsoft.com/office/2006/metadata/properties" xmlns:ns2="6e26bd3e-26a1-49ef-a711-f93878600d1b" xmlns:ns3="3b7c1a63-589f-43fc-8fe7-5d1c1c7abab8" targetNamespace="http://schemas.microsoft.com/office/2006/metadata/properties" ma:root="true" ma:fieldsID="b0405fd7545d691b7911d42f76a2ba61" ns2:_="" ns3:_="">
     <xsd:import namespace="6e26bd3e-26a1-49ef-a711-f93878600d1b"/>
     <xsd:import namespace="3b7c1a63-589f-43fc-8fe7-5d1c1c7abab8"/>
     <xsd:element name="properties">
@@ -26240,46 +23930,7 @@
 </ct:contentTypeSchema>
 </file>
 
-<file path=customXml/item3.xml><?xml version="1.0" encoding="utf-8"?>
-<p:properties xmlns:p="http://schemas.microsoft.com/office/2006/metadata/properties" xmlns:xsi="http://www.w3.org/2001/XMLSchema-instance" xmlns:pc="http://schemas.microsoft.com/office/infopath/2007/PartnerControls">
-  <documentManagement>
-    <MediaServiceKeyPoints xmlns="6e26bd3e-26a1-49ef-a711-f93878600d1b" xsi:nil="true"/>
-    <lcf76f155ced4ddcb4097134ff3c332f xmlns="6e26bd3e-26a1-49ef-a711-f93878600d1b">
-      <Terms xmlns="http://schemas.microsoft.com/office/infopath/2007/PartnerControls"/>
-    </lcf76f155ced4ddcb4097134ff3c332f>
-    <TaxCatchAll xmlns="3b7c1a63-589f-43fc-8fe7-5d1c1c7abab8" xsi:nil="true"/>
-  </documentManagement>
-</p:properties>
-</file>
-
 <file path=customXml/itemProps1.xml><?xml version="1.0" encoding="utf-8"?>
-<ds:datastoreItem xmlns:ds="http://schemas.openxmlformats.org/officeDocument/2006/customXml" ds:itemID="{B763F203-3722-4D22-B31D-AA35DA0DC141}">
-  <ds:schemaRefs>
-    <ds:schemaRef ds:uri="http://schemas.microsoft.com/sharepoint/v3/contenttype/forms"/>
-  </ds:schemaRefs>
-</ds:datastoreItem>
-</file>
-
-<file path=customXml/itemProps2.xml><?xml version="1.0" encoding="utf-8"?>
-<ds:datastoreItem xmlns:ds="http://schemas.openxmlformats.org/officeDocument/2006/customXml" ds:itemID="{FCA9AEA5-5559-4622-9EEA-EA3011963D02}">
-  <ds:schemaRefs>
-    <ds:schemaRef ds:uri="http://schemas.microsoft.com/office/2006/metadata/contentType"/>
-    <ds:schemaRef ds:uri="http://schemas.microsoft.com/office/2006/metadata/properties/metaAttributes"/>
-    <ds:schemaRef ds:uri="http://www.w3.org/2001/XMLSchema"/>
-    <ds:schemaRef ds:uri="http://schemas.microsoft.com/office/2006/metadata/properties"/>
-    <ds:schemaRef ds:uri="6e26bd3e-26a1-49ef-a711-f93878600d1b"/>
-    <ds:schemaRef ds:uri="3b7c1a63-589f-43fc-8fe7-5d1c1c7abab8"/>
-    <ds:schemaRef ds:uri="http://schemas.microsoft.com/office/2006/documentManagement/types"/>
-    <ds:schemaRef ds:uri="http://schemas.microsoft.com/office/infopath/2007/PartnerControls"/>
-    <ds:schemaRef ds:uri="http://schemas.openxmlformats.org/package/2006/metadata/core-properties"/>
-    <ds:schemaRef ds:uri="http://purl.org/dc/elements/1.1/"/>
-    <ds:schemaRef ds:uri="http://purl.org/dc/terms/"/>
-    <ds:schemaRef ds:uri="http://schemas.microsoft.com/internal/obd"/>
-  </ds:schemaRefs>
-</ds:datastoreItem>
-</file>
-
-<file path=customXml/itemProps3.xml><?xml version="1.0" encoding="utf-8"?>
 <ds:datastoreItem xmlns:ds="http://schemas.openxmlformats.org/officeDocument/2006/customXml" ds:itemID="{95D36474-37E5-4DEF-97CF-193944B34282}">
   <ds:schemaRefs>
     <ds:schemaRef ds:uri="http://schemas.openxmlformats.org/package/2006/metadata/core-properties"/>
@@ -26297,4 +23948,16 @@
     <ds:schemaRef ds:uri="3b7c1a63-589f-43fc-8fe7-5d1c1c7abab8"/>
   </ds:schemaRefs>
 </ds:datastoreItem>
+</file>
+
+<file path=customXml/itemProps2.xml><?xml version="1.0" encoding="utf-8"?>
+<ds:datastoreItem xmlns:ds="http://schemas.openxmlformats.org/officeDocument/2006/customXml" ds:itemID="{B763F203-3722-4D22-B31D-AA35DA0DC141}">
+  <ds:schemaRefs>
+    <ds:schemaRef ds:uri="http://schemas.microsoft.com/sharepoint/v3/contenttype/forms"/>
+  </ds:schemaRefs>
+</ds:datastoreItem>
+</file>
+
+<file path=customXml/itemProps3.xml><?xml version="1.0" encoding="utf-8"?>
+<ds:datastoreItem xmlns:ds="http://schemas.openxmlformats.org/officeDocument/2006/customXml" ds:itemID="{330CFBF0-AC4E-4E6D-9A9A-B1DC85884065}"/>
 </file>
</xml_diff>